<commit_message>
Showtime 1 samples added
</commit_message>
<xml_diff>
--- a/nancyFx.pptx
+++ b/nancyFx.pptx
@@ -5,7 +5,7 @@
     <p:sldMasterId id="2147483648" r:id="rId1"/>
   </p:sldMasterIdLst>
   <p:notesMasterIdLst>
-    <p:notesMasterId r:id="rId23"/>
+    <p:notesMasterId r:id="rId12"/>
   </p:notesMasterIdLst>
   <p:sldIdLst>
     <p:sldId id="256" r:id="rId2"/>
@@ -15,20 +15,9 @@
     <p:sldId id="277" r:id="rId6"/>
     <p:sldId id="278" r:id="rId7"/>
     <p:sldId id="279" r:id="rId8"/>
-    <p:sldId id="273" r:id="rId9"/>
+    <p:sldId id="280" r:id="rId9"/>
     <p:sldId id="266" r:id="rId10"/>
     <p:sldId id="269" r:id="rId11"/>
-    <p:sldId id="265" r:id="rId12"/>
-    <p:sldId id="259" r:id="rId13"/>
-    <p:sldId id="260" r:id="rId14"/>
-    <p:sldId id="262" r:id="rId15"/>
-    <p:sldId id="261" r:id="rId16"/>
-    <p:sldId id="263" r:id="rId17"/>
-    <p:sldId id="264" r:id="rId18"/>
-    <p:sldId id="272" r:id="rId19"/>
-    <p:sldId id="271" r:id="rId20"/>
-    <p:sldId id="270" r:id="rId21"/>
-    <p:sldId id="274" r:id="rId22"/>
   </p:sldIdLst>
   <p:sldSz cx="12192000" cy="6858000"/>
   <p:notesSz cx="6858000" cy="9144000"/>
@@ -217,7 +206,7 @@
           <a:p>
             <a:fld id="{C328CA5A-09E4-4726-8295-C267034F4634}" type="datetimeFigureOut">
               <a:rPr lang="en-US" smtClean="0"/>
-              <a:t>12/29/2016</a:t>
+              <a:t>12/30/2016</a:t>
             </a:fld>
             <a:endParaRPr lang="en-US"/>
           </a:p>
@@ -797,6 +786,130 @@
 </p:notes>
 </file>
 
+<file path=ppt/notesSlides/notesSlide2.xml><?xml version="1.0" encoding="utf-8"?>
+<p:notes xmlns:a="http://schemas.openxmlformats.org/drawingml/2006/main" xmlns:r="http://schemas.openxmlformats.org/officeDocument/2006/relationships" xmlns:p="http://schemas.openxmlformats.org/presentationml/2006/main">
+  <p:cSld>
+    <p:spTree>
+      <p:nvGrpSpPr>
+        <p:cNvPr id="1" name=""/>
+        <p:cNvGrpSpPr/>
+        <p:nvPr/>
+      </p:nvGrpSpPr>
+      <p:grpSpPr>
+        <a:xfrm>
+          <a:off x="0" y="0"/>
+          <a:ext cx="0" cy="0"/>
+          <a:chOff x="0" y="0"/>
+          <a:chExt cx="0" cy="0"/>
+        </a:xfrm>
+      </p:grpSpPr>
+      <p:sp>
+        <p:nvSpPr>
+          <p:cNvPr id="2" name="Marcador de imagen de diapositiva 1"/>
+          <p:cNvSpPr>
+            <a:spLocks noGrp="1" noRot="1" noChangeAspect="1"/>
+          </p:cNvSpPr>
+          <p:nvPr>
+            <p:ph type="sldImg"/>
+          </p:nvPr>
+        </p:nvSpPr>
+        <p:spPr/>
+      </p:sp>
+      <p:sp>
+        <p:nvSpPr>
+          <p:cNvPr id="3" name="Marcador de notas 2"/>
+          <p:cNvSpPr>
+            <a:spLocks noGrp="1"/>
+          </p:cNvSpPr>
+          <p:nvPr>
+            <p:ph type="body" idx="1"/>
+          </p:nvPr>
+        </p:nvSpPr>
+        <p:spPr/>
+        <p:txBody>
+          <a:bodyPr/>
+          <a:lstStyle/>
+          <a:p>
+            <a:r>
+              <a:rPr lang="es-ES" dirty="0" smtClean="0"/>
+              <a:t>Vamos a hacer un </a:t>
+            </a:r>
+            <a:r>
+              <a:rPr lang="es-ES" dirty="0" err="1" smtClean="0"/>
+              <a:t>microservicio</a:t>
+            </a:r>
+            <a:r>
+              <a:rPr lang="es-ES" dirty="0" smtClean="0"/>
+              <a:t> (aunque</a:t>
+            </a:r>
+            <a:r>
+              <a:rPr lang="es-ES" baseline="0" dirty="0" smtClean="0"/>
+              <a:t> no quiero polémicas) con .NET </a:t>
+            </a:r>
+            <a:r>
+              <a:rPr lang="es-ES" baseline="0" dirty="0" err="1" smtClean="0"/>
+              <a:t>core</a:t>
+            </a:r>
+            <a:r>
+              <a:rPr lang="es-ES" baseline="0" dirty="0" smtClean="0"/>
+              <a:t>. Sera un api para gestionar un catalogo de un </a:t>
+            </a:r>
+            <a:r>
+              <a:rPr lang="es-ES" baseline="0" dirty="0" err="1" smtClean="0"/>
+              <a:t>eCommerce</a:t>
+            </a:r>
+            <a:r>
+              <a:rPr lang="es-ES" baseline="0" dirty="0" smtClean="0"/>
+              <a:t> (</a:t>
+            </a:r>
+            <a:r>
+              <a:rPr lang="es-ES" baseline="0" dirty="0" err="1" smtClean="0"/>
+              <a:t>ncbs</a:t>
+            </a:r>
+            <a:r>
+              <a:rPr lang="es-ES" baseline="0" dirty="0" smtClean="0"/>
+              <a:t>??)</a:t>
+            </a:r>
+            <a:endParaRPr lang="en-US" dirty="0"/>
+          </a:p>
+        </p:txBody>
+      </p:sp>
+      <p:sp>
+        <p:nvSpPr>
+          <p:cNvPr id="4" name="Marcador de número de diapositiva 3"/>
+          <p:cNvSpPr>
+            <a:spLocks noGrp="1"/>
+          </p:cNvSpPr>
+          <p:nvPr>
+            <p:ph type="sldNum" sz="quarter" idx="10"/>
+          </p:nvPr>
+        </p:nvSpPr>
+        <p:spPr/>
+        <p:txBody>
+          <a:bodyPr/>
+          <a:lstStyle/>
+          <a:p>
+            <a:fld id="{D747081D-8EB8-4652-8843-002442BDA9DD}" type="slidenum">
+              <a:rPr lang="en-US" smtClean="0"/>
+              <a:t>7</a:t>
+            </a:fld>
+            <a:endParaRPr lang="en-US"/>
+          </a:p>
+        </p:txBody>
+      </p:sp>
+    </p:spTree>
+    <p:extLst>
+      <p:ext uri="{BB962C8B-B14F-4D97-AF65-F5344CB8AC3E}">
+        <p14:creationId xmlns:p14="http://schemas.microsoft.com/office/powerpoint/2010/main" val="2195317237"/>
+      </p:ext>
+    </p:extLst>
+  </p:cSld>
+  <p:clrMapOvr>
+    <a:masterClrMapping/>
+  </p:clrMapOvr>
+</p:notes>
+</file>
+
 <file path=ppt/slideLayouts/slideLayout1.xml><?xml version="1.0" encoding="utf-8"?>
 <p:sldLayout xmlns:a="http://schemas.openxmlformats.org/drawingml/2006/main" xmlns:r="http://schemas.openxmlformats.org/officeDocument/2006/relationships" xmlns:p="http://schemas.openxmlformats.org/presentationml/2006/main" type="title" preserve="1">
   <p:cSld name="Title Slide">
@@ -968,7 +1081,7 @@
           <a:p>
             <a:fld id="{48A87A34-81AB-432B-8DAE-1953F412C126}" type="datetimeFigureOut">
               <a:rPr lang="en-US" dirty="0"/>
-              <a:t>12/29/2016</a:t>
+              <a:t>12/30/2016</a:t>
             </a:fld>
             <a:endParaRPr lang="en-US" dirty="0"/>
           </a:p>
@@ -1275,7 +1388,7 @@
           <a:p>
             <a:fld id="{48A87A34-81AB-432B-8DAE-1953F412C126}" type="datetimeFigureOut">
               <a:rPr lang="en-US" dirty="0"/>
-              <a:t>12/29/2016</a:t>
+              <a:t>12/30/2016</a:t>
             </a:fld>
             <a:endParaRPr lang="en-US" dirty="0"/>
           </a:p>
@@ -1492,7 +1605,7 @@
           <a:p>
             <a:fld id="{48A87A34-81AB-432B-8DAE-1953F412C126}" type="datetimeFigureOut">
               <a:rPr lang="en-US" dirty="0"/>
-              <a:t>12/29/2016</a:t>
+              <a:t>12/30/2016</a:t>
             </a:fld>
             <a:endParaRPr lang="en-US" dirty="0"/>
           </a:p>
@@ -1778,7 +1891,7 @@
           <a:p>
             <a:fld id="{48A87A34-81AB-432B-8DAE-1953F412C126}" type="datetimeFigureOut">
               <a:rPr lang="en-US" dirty="0"/>
-              <a:t>12/29/2016</a:t>
+              <a:t>12/30/2016</a:t>
             </a:fld>
             <a:endParaRPr lang="en-US" dirty="0"/>
           </a:p>
@@ -2227,7 +2340,7 @@
           <a:p>
             <a:fld id="{48A87A34-81AB-432B-8DAE-1953F412C126}" type="datetimeFigureOut">
               <a:rPr lang="en-US" dirty="0"/>
-              <a:t>12/29/2016</a:t>
+              <a:t>12/30/2016</a:t>
             </a:fld>
             <a:endParaRPr lang="en-US" dirty="0"/>
           </a:p>
@@ -2798,7 +2911,7 @@
           <a:p>
             <a:fld id="{48A87A34-81AB-432B-8DAE-1953F412C126}" type="datetimeFigureOut">
               <a:rPr lang="en-US" dirty="0"/>
-              <a:t>12/29/2016</a:t>
+              <a:t>12/30/2016</a:t>
             </a:fld>
             <a:endParaRPr lang="en-US" dirty="0"/>
           </a:p>
@@ -3645,7 +3758,7 @@
           <a:p>
             <a:fld id="{48A87A34-81AB-432B-8DAE-1953F412C126}" type="datetimeFigureOut">
               <a:rPr lang="en-US" dirty="0"/>
-              <a:t>12/29/2016</a:t>
+              <a:t>12/30/2016</a:t>
             </a:fld>
             <a:endParaRPr lang="en-US" dirty="0"/>
           </a:p>
@@ -3845,7 +3958,7 @@
           <a:p>
             <a:fld id="{48A87A34-81AB-432B-8DAE-1953F412C126}" type="datetimeFigureOut">
               <a:rPr lang="en-US" dirty="0"/>
-              <a:t>12/29/2016</a:t>
+              <a:t>12/30/2016</a:t>
             </a:fld>
             <a:endParaRPr lang="en-US" dirty="0"/>
           </a:p>
@@ -4054,7 +4167,7 @@
           <a:p>
             <a:fld id="{48A87A34-81AB-432B-8DAE-1953F412C126}" type="datetimeFigureOut">
               <a:rPr lang="en-US" dirty="0"/>
-              <a:t>12/29/2016</a:t>
+              <a:t>12/30/2016</a:t>
             </a:fld>
             <a:endParaRPr lang="en-US" dirty="0"/>
           </a:p>
@@ -4254,7 +4367,7 @@
           <a:p>
             <a:fld id="{48A87A34-81AB-432B-8DAE-1953F412C126}" type="datetimeFigureOut">
               <a:rPr lang="en-US" dirty="0"/>
-              <a:t>12/29/2016</a:t>
+              <a:t>12/30/2016</a:t>
             </a:fld>
             <a:endParaRPr lang="en-US" dirty="0"/>
           </a:p>
@@ -4529,7 +4642,7 @@
           <a:p>
             <a:fld id="{48A87A34-81AB-432B-8DAE-1953F412C126}" type="datetimeFigureOut">
               <a:rPr lang="en-US" dirty="0"/>
-              <a:t>12/29/2016</a:t>
+              <a:t>12/30/2016</a:t>
             </a:fld>
             <a:endParaRPr lang="en-US" dirty="0"/>
           </a:p>
@@ -4791,7 +4904,7 @@
           <a:p>
             <a:fld id="{48A87A34-81AB-432B-8DAE-1953F412C126}" type="datetimeFigureOut">
               <a:rPr lang="en-US" dirty="0"/>
-              <a:t>12/29/2016</a:t>
+              <a:t>12/30/2016</a:t>
             </a:fld>
             <a:endParaRPr lang="en-US" dirty="0"/>
           </a:p>
@@ -5201,7 +5314,7 @@
           <a:p>
             <a:fld id="{48A87A34-81AB-432B-8DAE-1953F412C126}" type="datetimeFigureOut">
               <a:rPr lang="en-US" dirty="0"/>
-              <a:t>12/29/2016</a:t>
+              <a:t>12/30/2016</a:t>
             </a:fld>
             <a:endParaRPr lang="en-US" dirty="0"/>
           </a:p>
@@ -5344,7 +5457,7 @@
           <a:p>
             <a:fld id="{48A87A34-81AB-432B-8DAE-1953F412C126}" type="datetimeFigureOut">
               <a:rPr lang="en-US" dirty="0"/>
-              <a:t>12/29/2016</a:t>
+              <a:t>12/30/2016</a:t>
             </a:fld>
             <a:endParaRPr lang="en-US" dirty="0"/>
           </a:p>
@@ -5464,7 +5577,7 @@
           <a:p>
             <a:fld id="{48A87A34-81AB-432B-8DAE-1953F412C126}" type="datetimeFigureOut">
               <a:rPr lang="en-US" dirty="0"/>
-              <a:t>12/29/2016</a:t>
+              <a:t>12/30/2016</a:t>
             </a:fld>
             <a:endParaRPr lang="en-US" dirty="0"/>
           </a:p>
@@ -5738,7 +5851,7 @@
           <a:p>
             <a:fld id="{48A87A34-81AB-432B-8DAE-1953F412C126}" type="datetimeFigureOut">
               <a:rPr lang="en-US" dirty="0"/>
-              <a:t>12/29/2016</a:t>
+              <a:t>12/30/2016</a:t>
             </a:fld>
             <a:endParaRPr lang="en-US" dirty="0"/>
           </a:p>
@@ -6045,7 +6158,7 @@
           <a:p>
             <a:fld id="{48A87A34-81AB-432B-8DAE-1953F412C126}" type="datetimeFigureOut">
               <a:rPr lang="en-US" dirty="0"/>
-              <a:t>12/29/2016</a:t>
+              <a:t>12/30/2016</a:t>
             </a:fld>
             <a:endParaRPr lang="en-US" dirty="0"/>
           </a:p>
@@ -6294,7 +6407,7 @@
             <a:fld id="{48A87A34-81AB-432B-8DAE-1953F412C126}" type="datetimeFigureOut">
               <a:rPr lang="en-US" dirty="0"/>
               <a:pPr/>
-              <a:t>12/29/2016</a:t>
+              <a:t>12/30/2016</a:t>
             </a:fld>
             <a:endParaRPr lang="en-US" dirty="0"/>
           </a:p>
@@ -6887,22 +7000,19 @@
             <p:ph type="title"/>
           </p:nvPr>
         </p:nvSpPr>
-        <p:spPr/>
+        <p:spPr>
+          <a:xfrm>
+            <a:off x="913775" y="85780"/>
+            <a:ext cx="10364451" cy="1596177"/>
+          </a:xfrm>
+        </p:spPr>
         <p:txBody>
           <a:bodyPr/>
           <a:lstStyle/>
           <a:p>
             <a:r>
               <a:rPr lang="es-ES_tradnl" dirty="0" err="1" smtClean="0"/>
-              <a:t>Avaliable</a:t>
-            </a:r>
-            <a:r>
-              <a:rPr lang="es-ES_tradnl" dirty="0" smtClean="0"/>
-              <a:t> </a:t>
-            </a:r>
-            <a:r>
-              <a:rPr lang="es-ES_tradnl" dirty="0" err="1" smtClean="0"/>
-              <a:t>posibilities</a:t>
+              <a:t>resources</a:t>
             </a:r>
             <a:endParaRPr lang="en-GB" dirty="0"/>
           </a:p>
@@ -6916,8 +7026,8 @@
         </p:nvSpPr>
         <p:spPr>
           <a:xfrm>
-            <a:off x="913775" y="2214694"/>
-            <a:ext cx="9955116" cy="2585323"/>
+            <a:off x="913775" y="1395710"/>
+            <a:ext cx="9955116" cy="4985980"/>
           </a:xfrm>
           <a:prstGeom prst="rect">
             <a:avLst/>
@@ -6941,46 +7051,28 @@
               <a:buChar char="•"/>
             </a:pPr>
             <a:r>
-              <a:rPr lang="es-ES" dirty="0" err="1" smtClean="0"/>
-              <a:t>Azure</a:t>
-            </a:r>
-            <a:r>
-              <a:rPr lang="es-ES" dirty="0" smtClean="0"/>
-              <a:t> </a:t>
-            </a:r>
-            <a:r>
-              <a:rPr lang="es-ES" dirty="0" err="1" smtClean="0"/>
-              <a:t>Scheduler</a:t>
-            </a:r>
-            <a:r>
-              <a:rPr lang="es-ES" dirty="0"/>
-              <a:t> </a:t>
-            </a:r>
-            <a:r>
-              <a:rPr lang="es-ES" dirty="0" smtClean="0"/>
-              <a:t>( </a:t>
-            </a:r>
-            <a:r>
-              <a:rPr lang="es-ES" dirty="0" smtClean="0">
+              <a:rPr lang="es-ES" sz="2000" dirty="0" err="1" smtClean="0"/>
+              <a:t>NancyFx</a:t>
+            </a:r>
+            <a:r>
+              <a:rPr lang="es-ES" sz="2000" dirty="0"/>
+              <a:t>: </a:t>
+            </a:r>
+            <a:r>
+              <a:rPr lang="es-ES" sz="2000" dirty="0">
                 <a:hlinkClick r:id="rId2"/>
               </a:rPr>
-              <a:t>https</a:t>
-            </a:r>
-            <a:r>
-              <a:rPr lang="es-ES" dirty="0">
-                <a:hlinkClick r:id="rId2"/>
-              </a:rPr>
-              <a:t>://azure.microsoft.com/en-us/services/scheduler</a:t>
-            </a:r>
-            <a:r>
-              <a:rPr lang="es-ES" dirty="0" smtClean="0">
+              <a:t>http://nancyfx.org</a:t>
+            </a:r>
+            <a:r>
+              <a:rPr lang="es-ES" sz="2000" dirty="0" smtClean="0">
                 <a:hlinkClick r:id="rId2"/>
               </a:rPr>
               <a:t>/</a:t>
             </a:r>
             <a:r>
-              <a:rPr lang="es-ES" dirty="0" smtClean="0"/>
-              <a:t> )</a:t>
+              <a:rPr lang="es-ES" sz="2000" dirty="0" smtClean="0"/>
+              <a:t> </a:t>
             </a:r>
           </a:p>
           <a:p>
@@ -6988,7 +7080,7 @@
               <a:buFont typeface="Arial" panose="020B0604020202020204" pitchFamily="34" charset="0"/>
               <a:buChar char="•"/>
             </a:pPr>
-            <a:endParaRPr lang="es-ES" dirty="0" smtClean="0"/>
+            <a:endParaRPr lang="es-ES" sz="2000" dirty="0" smtClean="0"/>
           </a:p>
           <a:p>
             <a:pPr marL="285750" indent="-285750">
@@ -6996,34 +7088,91 @@
               <a:buChar char="•"/>
             </a:pPr>
             <a:r>
-              <a:rPr lang="es-ES" dirty="0"/>
-              <a:t>Quartz.NET </a:t>
-            </a:r>
-            <a:r>
-              <a:rPr lang="es-ES" dirty="0" smtClean="0"/>
-              <a:t>( </a:t>
-            </a:r>
-            <a:r>
-              <a:rPr lang="es-ES" dirty="0" smtClean="0">
+              <a:rPr lang="es-ES" sz="2000" dirty="0" err="1" smtClean="0"/>
+              <a:t>Books</a:t>
+            </a:r>
+            <a:r>
+              <a:rPr lang="es-ES" sz="2000" dirty="0" smtClean="0"/>
+              <a:t>:</a:t>
+            </a:r>
+          </a:p>
+          <a:p>
+            <a:endParaRPr lang="es-ES" sz="2000" dirty="0" smtClean="0"/>
+          </a:p>
+          <a:p>
+            <a:pPr marL="742950" lvl="1" indent="-285750">
+              <a:buFont typeface="Arial" panose="020B0604020202020204" pitchFamily="34" charset="0"/>
+              <a:buChar char="•"/>
+            </a:pPr>
+            <a:r>
+              <a:rPr lang="es-ES" sz="2000" dirty="0" err="1" smtClean="0"/>
+              <a:t>NancyFx</a:t>
+            </a:r>
+            <a:r>
+              <a:rPr lang="es-ES" sz="2000" dirty="0"/>
+              <a:t> </a:t>
+            </a:r>
+            <a:r>
+              <a:rPr lang="es-ES" sz="2000" dirty="0" err="1" smtClean="0"/>
+              <a:t>Succinctly</a:t>
+            </a:r>
+            <a:r>
+              <a:rPr lang="es-ES" sz="2000" dirty="0"/>
+              <a:t>: </a:t>
+            </a:r>
+            <a:r>
+              <a:rPr lang="es-ES" sz="2000" dirty="0">
                 <a:hlinkClick r:id="rId3"/>
               </a:rPr>
-              <a:t>http</a:t>
-            </a:r>
-            <a:r>
-              <a:rPr lang="es-ES" dirty="0">
+              <a:t>https://</a:t>
+            </a:r>
+            <a:r>
+              <a:rPr lang="es-ES" sz="2000" dirty="0" smtClean="0">
                 <a:hlinkClick r:id="rId3"/>
               </a:rPr>
-              <a:t>://www.quartz-scheduler.net</a:t>
-            </a:r>
-            <a:r>
-              <a:rPr lang="es-ES" dirty="0" smtClean="0">
-                <a:hlinkClick r:id="rId3"/>
+              <a:t>www.syncfusion.com/resources/techportal/details/ebooks/nancyfx</a:t>
+            </a:r>
+            <a:r>
+              <a:rPr lang="es-ES" sz="2000" dirty="0" smtClean="0"/>
+              <a:t> </a:t>
+            </a:r>
+          </a:p>
+          <a:p>
+            <a:pPr marL="742950" lvl="1" indent="-285750">
+              <a:buFont typeface="Arial" panose="020B0604020202020204" pitchFamily="34" charset="0"/>
+              <a:buChar char="•"/>
+            </a:pPr>
+            <a:r>
+              <a:rPr lang="es-ES" sz="2000" dirty="0" err="1" smtClean="0"/>
+              <a:t>Microservices</a:t>
+            </a:r>
+            <a:r>
+              <a:rPr lang="es-ES" sz="2000" dirty="0" smtClean="0"/>
+              <a:t> in </a:t>
+            </a:r>
+            <a:r>
+              <a:rPr lang="es-ES" sz="2000" dirty="0" err="1" smtClean="0"/>
+              <a:t>.Net</a:t>
+            </a:r>
+            <a:r>
+              <a:rPr lang="es-ES" sz="2000" dirty="0"/>
+              <a:t> Core: </a:t>
+            </a:r>
+            <a:r>
+              <a:rPr lang="es-ES" sz="2000" dirty="0">
+                <a:hlinkClick r:id="rId4"/>
               </a:rPr>
-              <a:t>/</a:t>
-            </a:r>
-            <a:r>
-              <a:rPr lang="es-ES" dirty="0" smtClean="0"/>
-              <a:t> )</a:t>
+              <a:t>https://</a:t>
+            </a:r>
+            <a:r>
+              <a:rPr lang="es-ES" sz="2000" dirty="0" smtClean="0">
+                <a:hlinkClick r:id="rId4"/>
+              </a:rPr>
+              <a:t>www.manning.com/books/microservices-in-net-core</a:t>
+            </a:r>
+            <a:r>
+              <a:rPr lang="es-ES" sz="2000" dirty="0" smtClean="0"/>
+              <a:t> </a:t>
             </a:r>
           </a:p>
           <a:p>
@@ -7031,7 +7180,7 @@
               <a:buFont typeface="Arial" panose="020B0604020202020204" pitchFamily="34" charset="0"/>
               <a:buChar char="•"/>
             </a:pPr>
-            <a:endParaRPr lang="es-ES" dirty="0"/>
+            <a:endParaRPr lang="es-ES" sz="2000" dirty="0"/>
           </a:p>
           <a:p>
             <a:pPr marL="285750" indent="-285750">
@@ -7039,38 +7188,16 @@
               <a:buChar char="•"/>
             </a:pPr>
             <a:r>
-              <a:rPr lang="es-ES" dirty="0" err="1" smtClean="0"/>
-              <a:t>HangFire</a:t>
-            </a:r>
-            <a:r>
-              <a:rPr lang="es-ES" dirty="0"/>
-              <a:t>! </a:t>
-            </a:r>
-            <a:r>
-              <a:rPr lang="es-ES" dirty="0" smtClean="0"/>
-              <a:t>( </a:t>
-            </a:r>
-            <a:r>
-              <a:rPr lang="es-ES" dirty="0" smtClean="0">
-                <a:hlinkClick r:id="rId4"/>
-              </a:rPr>
-              <a:t>http</a:t>
-            </a:r>
-            <a:r>
-              <a:rPr lang="es-ES" dirty="0">
-                <a:hlinkClick r:id="rId4"/>
-              </a:rPr>
-              <a:t>://hangfire.io</a:t>
-            </a:r>
-            <a:r>
-              <a:rPr lang="es-ES" dirty="0" smtClean="0">
-                <a:hlinkClick r:id="rId4"/>
-              </a:rPr>
-              <a:t>/</a:t>
-            </a:r>
-            <a:r>
-              <a:rPr lang="es-ES" dirty="0" smtClean="0"/>
-              <a:t> )</a:t>
+              <a:rPr lang="es-ES" sz="2000" dirty="0" smtClean="0"/>
+              <a:t>Online </a:t>
+            </a:r>
+            <a:r>
+              <a:rPr lang="es-ES" sz="2000" dirty="0" err="1" smtClean="0"/>
+              <a:t>courses</a:t>
+            </a:r>
+            <a:r>
+              <a:rPr lang="es-ES" sz="2000" dirty="0" smtClean="0"/>
+              <a:t>:</a:t>
             </a:r>
           </a:p>
           <a:p>
@@ -7078,40 +7205,96 @@
               <a:buFont typeface="Arial" panose="020B0604020202020204" pitchFamily="34" charset="0"/>
               <a:buChar char="•"/>
             </a:pPr>
-            <a:endParaRPr lang="es-ES" dirty="0"/>
-          </a:p>
-          <a:p>
-            <a:pPr marL="285750" indent="-285750">
+            <a:endParaRPr lang="es-ES" sz="2000" dirty="0" smtClean="0"/>
+          </a:p>
+          <a:p>
+            <a:pPr marL="742950" lvl="1" indent="-285750">
               <a:buFont typeface="Arial" panose="020B0604020202020204" pitchFamily="34" charset="0"/>
               <a:buChar char="•"/>
             </a:pPr>
             <a:r>
-              <a:rPr lang="es-ES" strike="sngStrike" dirty="0" err="1" smtClean="0"/>
-              <a:t>Develop</a:t>
-            </a:r>
-            <a:r>
-              <a:rPr lang="es-ES" strike="sngStrike" dirty="0" smtClean="0"/>
+              <a:rPr lang="es-ES" sz="2000" dirty="0" err="1" smtClean="0"/>
+              <a:t>Pluralsight</a:t>
+            </a:r>
+            <a:r>
+              <a:rPr lang="es-ES" sz="2000" dirty="0" smtClean="0"/>
+              <a:t>: </a:t>
+            </a:r>
+            <a:r>
+              <a:rPr lang="es-ES" sz="2000" dirty="0" err="1" smtClean="0"/>
+              <a:t>Introduction</a:t>
+            </a:r>
+            <a:r>
+              <a:rPr lang="es-ES" sz="2000" dirty="0" smtClean="0"/>
+              <a:t> to Nancy: </a:t>
+            </a:r>
+            <a:r>
+              <a:rPr lang="es-ES" sz="2000" dirty="0" smtClean="0">
+                <a:hlinkClick r:id="rId5"/>
+              </a:rPr>
+              <a:t>https</a:t>
+            </a:r>
+            <a:r>
+              <a:rPr lang="es-ES" sz="2000" dirty="0">
+                <a:hlinkClick r:id="rId5"/>
+              </a:rPr>
+              <a:t>://www.pluralsight.com/courses/nancy</a:t>
+            </a:r>
+            <a:endParaRPr lang="es-ES" sz="2000" dirty="0"/>
+          </a:p>
+          <a:p>
+            <a:pPr lvl="1"/>
+            <a:endParaRPr lang="es-ES" sz="2000" dirty="0" smtClean="0"/>
+          </a:p>
+          <a:p>
+            <a:pPr marL="742950" lvl="1" indent="-285750">
+              <a:buFont typeface="Arial" panose="020B0604020202020204" pitchFamily="34" charset="0"/>
+              <a:buChar char="•"/>
+            </a:pPr>
+            <a:r>
+              <a:rPr lang="es-ES" sz="2000" dirty="0" err="1" smtClean="0"/>
+              <a:t>Pluralsight</a:t>
+            </a:r>
+            <a:r>
+              <a:rPr lang="es-ES" sz="2000" dirty="0" smtClean="0"/>
+              <a:t>: </a:t>
+            </a:r>
+            <a:r>
+              <a:rPr lang="en-US" sz="2000" dirty="0"/>
+              <a:t>Building Web Applications With </a:t>
+            </a:r>
+            <a:r>
+              <a:rPr lang="en-US" sz="2000" dirty="0" err="1" smtClean="0"/>
+              <a:t>NancyFX</a:t>
+            </a:r>
+            <a:endParaRPr lang="en-US" sz="2000" dirty="0" smtClean="0"/>
+          </a:p>
+          <a:p>
+            <a:pPr marL="742950" lvl="1" indent="-285750">
+              <a:buFont typeface="Arial" panose="020B0604020202020204" pitchFamily="34" charset="0"/>
+              <a:buChar char="•"/>
+            </a:pPr>
+            <a:endParaRPr lang="es-ES" sz="2000" dirty="0"/>
+          </a:p>
+          <a:p>
+            <a:pPr lvl="2"/>
+            <a:r>
+              <a:rPr lang="es-ES" sz="2000" dirty="0">
+                <a:hlinkClick r:id="rId6"/>
+              </a:rPr>
+              <a:t>https://</a:t>
+            </a:r>
+            <a:r>
+              <a:rPr lang="es-ES" sz="2000" dirty="0" smtClean="0">
+                <a:hlinkClick r:id="rId6"/>
+              </a:rPr>
+              <a:t>www.pluralsight.com/courses/building-web-apps-nancyfx</a:t>
+            </a:r>
+            <a:r>
+              <a:rPr lang="es-ES" sz="2000" dirty="0" smtClean="0"/>
               <a:t> </a:t>
             </a:r>
-            <a:r>
-              <a:rPr lang="es-ES" strike="sngStrike" dirty="0" err="1" smtClean="0"/>
-              <a:t>from</a:t>
-            </a:r>
-            <a:r>
-              <a:rPr lang="es-ES" strike="sngStrike" dirty="0" smtClean="0"/>
-              <a:t> </a:t>
-            </a:r>
-            <a:r>
-              <a:rPr lang="es-ES" strike="sngStrike" dirty="0" err="1" smtClean="0"/>
-              <a:t>scratch</a:t>
-            </a:r>
-            <a:r>
-              <a:rPr lang="es-ES" strike="sngStrike" dirty="0" smtClean="0"/>
-              <a:t> </a:t>
-            </a:r>
-          </a:p>
-          <a:p>
-            <a:endParaRPr lang="en-GB" dirty="0"/>
+            <a:endParaRPr lang="en-GB" sz="2000" dirty="0"/>
           </a:p>
         </p:txBody>
       </p:sp>
@@ -7129,1817 +7312,6 @@
     <p:tnLst>
       <p:par>
         <p:cTn id="1" dur="indefinite" restart="never" nodeType="tmRoot"/>
-      </p:par>
-    </p:tnLst>
-  </p:timing>
-</p:sld>
-</file>
-
-<file path=ppt/slides/slide11.xml><?xml version="1.0" encoding="utf-8"?>
-<p:sld xmlns:a="http://schemas.openxmlformats.org/drawingml/2006/main" xmlns:r="http://schemas.openxmlformats.org/officeDocument/2006/relationships" xmlns:p="http://schemas.openxmlformats.org/presentationml/2006/main">
-  <p:cSld>
-    <p:spTree>
-      <p:nvGrpSpPr>
-        <p:cNvPr id="1" name=""/>
-        <p:cNvGrpSpPr/>
-        <p:nvPr/>
-      </p:nvGrpSpPr>
-      <p:grpSpPr>
-        <a:xfrm>
-          <a:off x="0" y="0"/>
-          <a:ext cx="0" cy="0"/>
-          <a:chOff x="0" y="0"/>
-          <a:chExt cx="0" cy="0"/>
-        </a:xfrm>
-      </p:grpSpPr>
-      <p:pic>
-        <p:nvPicPr>
-          <p:cNvPr id="2" name="Picture 1"/>
-          <p:cNvPicPr>
-            <a:picLocks noChangeAspect="1"/>
-          </p:cNvPicPr>
-          <p:nvPr/>
-        </p:nvPicPr>
-        <p:blipFill>
-          <a:blip r:embed="rId2">
-            <a:extLst>
-              <a:ext uri="{28A0092B-C50C-407E-A947-70E740481C1C}">
-                <a14:useLocalDpi xmlns:a14="http://schemas.microsoft.com/office/drawing/2010/main" val="0"/>
-              </a:ext>
-            </a:extLst>
-          </a:blip>
-          <a:stretch>
-            <a:fillRect/>
-          </a:stretch>
-        </p:blipFill>
-        <p:spPr>
-          <a:xfrm>
-            <a:off x="678632" y="1875561"/>
-            <a:ext cx="6723784" cy="4019384"/>
-          </a:xfrm>
-          <a:prstGeom prst="rect">
-            <a:avLst/>
-          </a:prstGeom>
-        </p:spPr>
-      </p:pic>
-      <p:sp>
-        <p:nvSpPr>
-          <p:cNvPr id="3" name="Title 1"/>
-          <p:cNvSpPr txBox="1">
-            <a:spLocks/>
-          </p:cNvSpPr>
-          <p:nvPr/>
-        </p:nvSpPr>
-        <p:spPr>
-          <a:xfrm>
-            <a:off x="2549397" y="421090"/>
-            <a:ext cx="4894583" cy="1596177"/>
-          </a:xfrm>
-          <a:prstGeom prst="rect">
-            <a:avLst/>
-          </a:prstGeom>
-        </p:spPr>
-        <p:txBody>
-          <a:bodyPr/>
-          <a:lstStyle>
-            <a:lvl1pPr algn="ctr" defTabSz="914400" rtl="0" eaLnBrk="1" latinLnBrk="0" hangingPunct="1">
-              <a:lnSpc>
-                <a:spcPct val="90000"/>
-              </a:lnSpc>
-              <a:spcBef>
-                <a:spcPct val="0"/>
-              </a:spcBef>
-              <a:buNone/>
-              <a:defRPr sz="3600" kern="1200" cap="all" baseline="0">
-                <a:solidFill>
-                  <a:schemeClr val="tx1"/>
-                </a:solidFill>
-                <a:effectLst/>
-                <a:latin typeface="+mj-lt"/>
-                <a:ea typeface="+mj-ea"/>
-                <a:cs typeface="+mj-cs"/>
-              </a:defRPr>
-            </a:lvl1pPr>
-          </a:lstStyle>
-          <a:p>
-            <a:r>
-              <a:rPr lang="es-ES_tradnl" dirty="0" smtClean="0"/>
-              <a:t>HANGFIRE </a:t>
-            </a:r>
-            <a:r>
-              <a:rPr lang="es-ES_tradnl" dirty="0" err="1" smtClean="0"/>
-              <a:t>Architecture</a:t>
-            </a:r>
-            <a:endParaRPr lang="en-GB" dirty="0"/>
-          </a:p>
-        </p:txBody>
-      </p:sp>
-      <p:sp>
-        <p:nvSpPr>
-          <p:cNvPr id="4" name="Rectangle 3"/>
-          <p:cNvSpPr/>
-          <p:nvPr/>
-        </p:nvSpPr>
-        <p:spPr>
-          <a:xfrm>
-            <a:off x="8063345" y="1314450"/>
-            <a:ext cx="4010891" cy="5078313"/>
-          </a:xfrm>
-          <a:prstGeom prst="rect">
-            <a:avLst/>
-          </a:prstGeom>
-        </p:spPr>
-        <p:txBody>
-          <a:bodyPr wrap="square">
-            <a:spAutoFit/>
-          </a:bodyPr>
-          <a:lstStyle/>
-          <a:p>
-            <a:pPr marL="285750" indent="-285750">
-              <a:buFont typeface="Arial" panose="020B0604020202020204" pitchFamily="34" charset="0"/>
-              <a:buChar char="•"/>
-            </a:pPr>
-            <a:endParaRPr lang="es-ES" dirty="0" smtClean="0"/>
-          </a:p>
-          <a:p>
-            <a:pPr marL="285750" indent="-285750">
-              <a:buFont typeface="Arial" panose="020B0604020202020204" pitchFamily="34" charset="0"/>
-              <a:buChar char="•"/>
-            </a:pPr>
-            <a:r>
-              <a:rPr lang="es-ES" dirty="0" err="1" smtClean="0"/>
-              <a:t>Fire</a:t>
-            </a:r>
-            <a:r>
-              <a:rPr lang="es-ES" dirty="0" smtClean="0"/>
-              <a:t> &amp; </a:t>
-            </a:r>
-            <a:r>
-              <a:rPr lang="es-ES" dirty="0" err="1" smtClean="0"/>
-              <a:t>Forget</a:t>
-            </a:r>
-            <a:r>
-              <a:rPr lang="es-ES" dirty="0" smtClean="0"/>
-              <a:t> Jobs</a:t>
-            </a:r>
-          </a:p>
-          <a:p>
-            <a:pPr marL="285750" indent="-285750">
-              <a:buFont typeface="Arial" panose="020B0604020202020204" pitchFamily="34" charset="0"/>
-              <a:buChar char="•"/>
-            </a:pPr>
-            <a:endParaRPr lang="es-ES" dirty="0" smtClean="0"/>
-          </a:p>
-          <a:p>
-            <a:pPr marL="285750" indent="-285750">
-              <a:buFont typeface="Arial" panose="020B0604020202020204" pitchFamily="34" charset="0"/>
-              <a:buChar char="•"/>
-            </a:pPr>
-            <a:r>
-              <a:rPr lang="es-ES" dirty="0" err="1" smtClean="0"/>
-              <a:t>Delayed</a:t>
-            </a:r>
-            <a:r>
-              <a:rPr lang="es-ES" dirty="0" smtClean="0"/>
-              <a:t> Jobs</a:t>
-            </a:r>
-            <a:endParaRPr lang="es-ES" dirty="0"/>
-          </a:p>
-          <a:p>
-            <a:pPr marL="285750" indent="-285750">
-              <a:buFont typeface="Arial" panose="020B0604020202020204" pitchFamily="34" charset="0"/>
-              <a:buChar char="•"/>
-            </a:pPr>
-            <a:endParaRPr lang="es-ES" dirty="0" smtClean="0"/>
-          </a:p>
-          <a:p>
-            <a:pPr marL="285750" indent="-285750">
-              <a:buFont typeface="Arial" panose="020B0604020202020204" pitchFamily="34" charset="0"/>
-              <a:buChar char="•"/>
-            </a:pPr>
-            <a:r>
-              <a:rPr lang="es-ES" dirty="0" err="1" smtClean="0"/>
-              <a:t>Recurrent</a:t>
-            </a:r>
-            <a:r>
-              <a:rPr lang="es-ES" dirty="0" smtClean="0"/>
-              <a:t> Jobs</a:t>
-            </a:r>
-          </a:p>
-          <a:p>
-            <a:pPr marL="285750" indent="-285750">
-              <a:buFont typeface="Arial" panose="020B0604020202020204" pitchFamily="34" charset="0"/>
-              <a:buChar char="•"/>
-            </a:pPr>
-            <a:endParaRPr lang="es-ES" dirty="0"/>
-          </a:p>
-          <a:p>
-            <a:pPr marL="285750" indent="-285750">
-              <a:buFont typeface="Arial" panose="020B0604020202020204" pitchFamily="34" charset="0"/>
-              <a:buChar char="•"/>
-            </a:pPr>
-            <a:endParaRPr lang="es-ES" dirty="0" smtClean="0"/>
-          </a:p>
-          <a:p>
-            <a:pPr marL="285750" indent="-285750">
-              <a:buFont typeface="Arial" panose="020B0604020202020204" pitchFamily="34" charset="0"/>
-              <a:buChar char="•"/>
-            </a:pPr>
-            <a:endParaRPr lang="es-ES" dirty="0"/>
-          </a:p>
-          <a:p>
-            <a:r>
-              <a:rPr lang="es-ES" dirty="0" err="1" smtClean="0"/>
-              <a:t>All</a:t>
-            </a:r>
-            <a:r>
-              <a:rPr lang="es-ES" dirty="0" smtClean="0"/>
-              <a:t> of </a:t>
-            </a:r>
-            <a:r>
-              <a:rPr lang="es-ES" dirty="0" err="1" smtClean="0"/>
-              <a:t>them</a:t>
-            </a:r>
-            <a:r>
-              <a:rPr lang="es-ES" dirty="0" smtClean="0"/>
-              <a:t> </a:t>
-            </a:r>
-            <a:r>
-              <a:rPr lang="es-ES" dirty="0" err="1" smtClean="0"/>
-              <a:t>running</a:t>
-            </a:r>
-            <a:r>
-              <a:rPr lang="es-ES" dirty="0" smtClean="0"/>
-              <a:t> in a </a:t>
-            </a:r>
-            <a:r>
-              <a:rPr lang="es-ES" dirty="0" err="1" smtClean="0"/>
-              <a:t>background</a:t>
-            </a:r>
-            <a:r>
-              <a:rPr lang="es-ES" dirty="0" smtClean="0"/>
-              <a:t> </a:t>
-            </a:r>
-            <a:r>
-              <a:rPr lang="es-ES" dirty="0" err="1" smtClean="0"/>
-              <a:t>thread</a:t>
-            </a:r>
-            <a:r>
-              <a:rPr lang="es-ES" dirty="0" smtClean="0"/>
-              <a:t> </a:t>
-            </a:r>
-            <a:r>
-              <a:rPr lang="es-ES" dirty="0" err="1" smtClean="0"/>
-              <a:t>on</a:t>
-            </a:r>
-            <a:r>
-              <a:rPr lang="es-ES" dirty="0" smtClean="0"/>
-              <a:t> </a:t>
-            </a:r>
-            <a:r>
-              <a:rPr lang="es-ES" dirty="0" err="1" smtClean="0"/>
-              <a:t>same</a:t>
-            </a:r>
-            <a:r>
-              <a:rPr lang="es-ES" dirty="0" smtClean="0"/>
-              <a:t> server </a:t>
-            </a:r>
-            <a:r>
-              <a:rPr lang="es-ES" dirty="0" err="1" smtClean="0"/>
-              <a:t>or</a:t>
-            </a:r>
-            <a:r>
-              <a:rPr lang="es-ES" dirty="0" smtClean="0"/>
-              <a:t> </a:t>
-            </a:r>
-            <a:r>
-              <a:rPr lang="es-ES" dirty="0" err="1" smtClean="0"/>
-              <a:t>other</a:t>
-            </a:r>
-            <a:r>
-              <a:rPr lang="es-ES" dirty="0" smtClean="0"/>
-              <a:t> </a:t>
-            </a:r>
-            <a:r>
-              <a:rPr lang="es-ES" dirty="0" err="1" smtClean="0"/>
-              <a:t>one</a:t>
-            </a:r>
-            <a:endParaRPr lang="es-ES" dirty="0"/>
-          </a:p>
-          <a:p>
-            <a:endParaRPr lang="es-ES" dirty="0" smtClean="0"/>
-          </a:p>
-          <a:p>
-            <a:r>
-              <a:rPr lang="es-ES" dirty="0" smtClean="0"/>
-              <a:t>ASP.NET </a:t>
-            </a:r>
-            <a:r>
-              <a:rPr lang="es-ES" dirty="0" err="1" smtClean="0"/>
-              <a:t>Thread</a:t>
-            </a:r>
-            <a:r>
-              <a:rPr lang="es-ES" dirty="0" smtClean="0"/>
-              <a:t> Pool </a:t>
-            </a:r>
-            <a:r>
-              <a:rPr lang="es-ES" dirty="0" err="1" smtClean="0"/>
-              <a:t>safe</a:t>
-            </a:r>
-            <a:r>
-              <a:rPr lang="es-ES" dirty="0" smtClean="0"/>
-              <a:t>!</a:t>
-            </a:r>
-          </a:p>
-          <a:p>
-            <a:pPr marL="285750" indent="-285750">
-              <a:buFont typeface="Arial" panose="020B0604020202020204" pitchFamily="34" charset="0"/>
-              <a:buChar char="•"/>
-            </a:pPr>
-            <a:endParaRPr lang="es-ES" dirty="0"/>
-          </a:p>
-          <a:p>
-            <a:pPr marL="285750" indent="-285750">
-              <a:buFont typeface="Arial" panose="020B0604020202020204" pitchFamily="34" charset="0"/>
-              <a:buChar char="•"/>
-            </a:pPr>
-            <a:endParaRPr lang="es-ES" dirty="0" smtClean="0"/>
-          </a:p>
-          <a:p>
-            <a:pPr marL="285750" indent="-285750">
-              <a:buFont typeface="Arial" panose="020B0604020202020204" pitchFamily="34" charset="0"/>
-              <a:buChar char="•"/>
-            </a:pPr>
-            <a:endParaRPr lang="es-ES" dirty="0" smtClean="0"/>
-          </a:p>
-          <a:p>
-            <a:endParaRPr lang="en-GB" dirty="0"/>
-          </a:p>
-        </p:txBody>
-      </p:sp>
-    </p:spTree>
-    <p:extLst>
-      <p:ext uri="{BB962C8B-B14F-4D97-AF65-F5344CB8AC3E}">
-        <p14:creationId xmlns:p14="http://schemas.microsoft.com/office/powerpoint/2010/main" val="3813394069"/>
-      </p:ext>
-    </p:extLst>
-  </p:cSld>
-  <p:clrMapOvr>
-    <a:masterClrMapping/>
-  </p:clrMapOvr>
-  <p:timing>
-    <p:tnLst>
-      <p:par>
-        <p:cTn id="1" dur="indefinite" restart="never" nodeType="tmRoot"/>
-      </p:par>
-    </p:tnLst>
-  </p:timing>
-</p:sld>
-</file>
-
-<file path=ppt/slides/slide12.xml><?xml version="1.0" encoding="utf-8"?>
-<p:sld xmlns:a="http://schemas.openxmlformats.org/drawingml/2006/main" xmlns:r="http://schemas.openxmlformats.org/officeDocument/2006/relationships" xmlns:p="http://schemas.openxmlformats.org/presentationml/2006/main">
-  <p:cSld>
-    <p:spTree>
-      <p:nvGrpSpPr>
-        <p:cNvPr id="1" name=""/>
-        <p:cNvGrpSpPr/>
-        <p:nvPr/>
-      </p:nvGrpSpPr>
-      <p:grpSpPr>
-        <a:xfrm>
-          <a:off x="0" y="0"/>
-          <a:ext cx="0" cy="0"/>
-          <a:chOff x="0" y="0"/>
-          <a:chExt cx="0" cy="0"/>
-        </a:xfrm>
-      </p:grpSpPr>
-      <p:sp>
-        <p:nvSpPr>
-          <p:cNvPr id="2" name="Title 1"/>
-          <p:cNvSpPr>
-            <a:spLocks noGrp="1"/>
-          </p:cNvSpPr>
-          <p:nvPr>
-            <p:ph type="title"/>
-          </p:nvPr>
-        </p:nvSpPr>
-        <p:spPr/>
-        <p:txBody>
-          <a:bodyPr/>
-          <a:lstStyle/>
-          <a:p>
-            <a:r>
-              <a:rPr lang="es-ES_tradnl" dirty="0" err="1" smtClean="0"/>
-              <a:t>Launching</a:t>
-            </a:r>
-            <a:r>
-              <a:rPr lang="es-ES_tradnl" dirty="0" smtClean="0"/>
-              <a:t> </a:t>
-            </a:r>
-            <a:r>
-              <a:rPr lang="es-ES_tradnl" dirty="0" err="1" smtClean="0"/>
-              <a:t>tasks</a:t>
-            </a:r>
-            <a:endParaRPr lang="en-GB" dirty="0"/>
-          </a:p>
-        </p:txBody>
-      </p:sp>
-      <p:pic>
-        <p:nvPicPr>
-          <p:cNvPr id="5" name="Content Placeholder 4"/>
-          <p:cNvPicPr>
-            <a:picLocks noGrp="1" noChangeAspect="1"/>
-          </p:cNvPicPr>
-          <p:nvPr>
-            <p:ph sz="quarter" idx="13"/>
-          </p:nvPr>
-        </p:nvPicPr>
-        <p:blipFill>
-          <a:blip r:embed="rId2">
-            <a:extLst>
-              <a:ext uri="{28A0092B-C50C-407E-A947-70E740481C1C}">
-                <a14:useLocalDpi xmlns:a14="http://schemas.microsoft.com/office/drawing/2010/main" val="0"/>
-              </a:ext>
-            </a:extLst>
-          </a:blip>
-          <a:stretch>
-            <a:fillRect/>
-          </a:stretch>
-        </p:blipFill>
-        <p:spPr>
-          <a:xfrm>
-            <a:off x="6206055" y="633054"/>
-            <a:ext cx="4486189" cy="5134692"/>
-          </a:xfrm>
-        </p:spPr>
-      </p:pic>
-      <p:sp>
-        <p:nvSpPr>
-          <p:cNvPr id="4" name="Text Placeholder 3"/>
-          <p:cNvSpPr>
-            <a:spLocks noGrp="1"/>
-          </p:cNvSpPr>
-          <p:nvPr>
-            <p:ph type="body" sz="half" idx="2"/>
-          </p:nvPr>
-        </p:nvSpPr>
-        <p:spPr/>
-        <p:txBody>
-          <a:bodyPr/>
-          <a:lstStyle/>
-          <a:p>
-            <a:endParaRPr lang="en-GB" dirty="0"/>
-          </a:p>
-        </p:txBody>
-      </p:sp>
-      <p:pic>
-        <p:nvPicPr>
-          <p:cNvPr id="7" name="Picture 6"/>
-          <p:cNvPicPr>
-            <a:picLocks noChangeAspect="1"/>
-          </p:cNvPicPr>
-          <p:nvPr/>
-        </p:nvPicPr>
-        <p:blipFill>
-          <a:blip r:embed="rId3">
-            <a:extLst>
-              <a:ext uri="{28A0092B-C50C-407E-A947-70E740481C1C}">
-                <a14:useLocalDpi xmlns:a14="http://schemas.microsoft.com/office/drawing/2010/main" val="0"/>
-              </a:ext>
-            </a:extLst>
-          </a:blip>
-          <a:stretch>
-            <a:fillRect/>
-          </a:stretch>
-        </p:blipFill>
-        <p:spPr>
-          <a:xfrm>
-            <a:off x="1348959" y="2705589"/>
-            <a:ext cx="2857500" cy="2857500"/>
-          </a:xfrm>
-          <a:prstGeom prst="rect">
-            <a:avLst/>
-          </a:prstGeom>
-        </p:spPr>
-      </p:pic>
-    </p:spTree>
-    <p:extLst>
-      <p:ext uri="{BB962C8B-B14F-4D97-AF65-F5344CB8AC3E}">
-        <p14:creationId xmlns:p14="http://schemas.microsoft.com/office/powerpoint/2010/main" val="3561516454"/>
-      </p:ext>
-    </p:extLst>
-  </p:cSld>
-  <p:clrMapOvr>
-    <a:masterClrMapping/>
-  </p:clrMapOvr>
-  <p:timing>
-    <p:tnLst>
-      <p:par>
-        <p:cTn id="1" dur="indefinite" restart="never" nodeType="tmRoot"/>
-      </p:par>
-    </p:tnLst>
-  </p:timing>
-</p:sld>
-</file>
-
-<file path=ppt/slides/slide13.xml><?xml version="1.0" encoding="utf-8"?>
-<p:sld xmlns:a="http://schemas.openxmlformats.org/drawingml/2006/main" xmlns:r="http://schemas.openxmlformats.org/officeDocument/2006/relationships" xmlns:p="http://schemas.openxmlformats.org/presentationml/2006/main">
-  <p:cSld>
-    <p:spTree>
-      <p:nvGrpSpPr>
-        <p:cNvPr id="1" name=""/>
-        <p:cNvGrpSpPr/>
-        <p:nvPr/>
-      </p:nvGrpSpPr>
-      <p:grpSpPr>
-        <a:xfrm>
-          <a:off x="0" y="0"/>
-          <a:ext cx="0" cy="0"/>
-          <a:chOff x="0" y="0"/>
-          <a:chExt cx="0" cy="0"/>
-        </a:xfrm>
-      </p:grpSpPr>
-      <p:sp>
-        <p:nvSpPr>
-          <p:cNvPr id="2" name="Title 1"/>
-          <p:cNvSpPr>
-            <a:spLocks noGrp="1"/>
-          </p:cNvSpPr>
-          <p:nvPr>
-            <p:ph type="title"/>
-          </p:nvPr>
-        </p:nvSpPr>
-        <p:spPr/>
-        <p:txBody>
-          <a:bodyPr/>
-          <a:lstStyle/>
-          <a:p>
-            <a:r>
-              <a:rPr lang="es-ES_tradnl" dirty="0" err="1" smtClean="0"/>
-              <a:t>Launching</a:t>
-            </a:r>
-            <a:r>
-              <a:rPr lang="es-ES_tradnl" dirty="0" smtClean="0"/>
-              <a:t> BATCHES</a:t>
-            </a:r>
-            <a:endParaRPr lang="en-GB" dirty="0"/>
-          </a:p>
-        </p:txBody>
-      </p:sp>
-      <p:sp>
-        <p:nvSpPr>
-          <p:cNvPr id="4" name="Text Placeholder 3"/>
-          <p:cNvSpPr>
-            <a:spLocks noGrp="1"/>
-          </p:cNvSpPr>
-          <p:nvPr>
-            <p:ph type="body" sz="half" idx="2"/>
-          </p:nvPr>
-        </p:nvSpPr>
-        <p:spPr/>
-        <p:txBody>
-          <a:bodyPr/>
-          <a:lstStyle/>
-          <a:p>
-            <a:endParaRPr lang="en-GB" dirty="0"/>
-          </a:p>
-        </p:txBody>
-      </p:sp>
-      <p:pic>
-        <p:nvPicPr>
-          <p:cNvPr id="7" name="Picture 6"/>
-          <p:cNvPicPr>
-            <a:picLocks noChangeAspect="1"/>
-          </p:cNvPicPr>
-          <p:nvPr/>
-        </p:nvPicPr>
-        <p:blipFill>
-          <a:blip r:embed="rId2">
-            <a:extLst>
-              <a:ext uri="{28A0092B-C50C-407E-A947-70E740481C1C}">
-                <a14:useLocalDpi xmlns:a14="http://schemas.microsoft.com/office/drawing/2010/main" val="0"/>
-              </a:ext>
-            </a:extLst>
-          </a:blip>
-          <a:stretch>
-            <a:fillRect/>
-          </a:stretch>
-        </p:blipFill>
-        <p:spPr>
-          <a:xfrm>
-            <a:off x="1348959" y="2705589"/>
-            <a:ext cx="2857500" cy="2857500"/>
-          </a:xfrm>
-          <a:prstGeom prst="rect">
-            <a:avLst/>
-          </a:prstGeom>
-        </p:spPr>
-      </p:pic>
-      <p:sp>
-        <p:nvSpPr>
-          <p:cNvPr id="3" name="Content Placeholder 2"/>
-          <p:cNvSpPr>
-            <a:spLocks noGrp="1"/>
-          </p:cNvSpPr>
-          <p:nvPr>
-            <p:ph sz="quarter" idx="13"/>
-          </p:nvPr>
-        </p:nvSpPr>
-        <p:spPr/>
-        <p:txBody>
-          <a:bodyPr/>
-          <a:lstStyle/>
-          <a:p>
-            <a:endParaRPr lang="en-GB"/>
-          </a:p>
-        </p:txBody>
-      </p:sp>
-      <p:pic>
-        <p:nvPicPr>
-          <p:cNvPr id="6" name="Picture 5"/>
-          <p:cNvPicPr>
-            <a:picLocks noChangeAspect="1"/>
-          </p:cNvPicPr>
-          <p:nvPr/>
-        </p:nvPicPr>
-        <p:blipFill>
-          <a:blip r:embed="rId3"/>
-          <a:stretch>
-            <a:fillRect/>
-          </a:stretch>
-        </p:blipFill>
-        <p:spPr>
-          <a:xfrm>
-            <a:off x="5540468" y="1621226"/>
-            <a:ext cx="5275349" cy="2370804"/>
-          </a:xfrm>
-          <a:prstGeom prst="rect">
-            <a:avLst/>
-          </a:prstGeom>
-        </p:spPr>
-      </p:pic>
-    </p:spTree>
-    <p:extLst>
-      <p:ext uri="{BB962C8B-B14F-4D97-AF65-F5344CB8AC3E}">
-        <p14:creationId xmlns:p14="http://schemas.microsoft.com/office/powerpoint/2010/main" val="520801942"/>
-      </p:ext>
-    </p:extLst>
-  </p:cSld>
-  <p:clrMapOvr>
-    <a:masterClrMapping/>
-  </p:clrMapOvr>
-  <p:timing>
-    <p:tnLst>
-      <p:par>
-        <p:cTn id="1" dur="indefinite" restart="never" nodeType="tmRoot"/>
-      </p:par>
-    </p:tnLst>
-  </p:timing>
-</p:sld>
-</file>
-
-<file path=ppt/slides/slide14.xml><?xml version="1.0" encoding="utf-8"?>
-<p:sld xmlns:a="http://schemas.openxmlformats.org/drawingml/2006/main" xmlns:r="http://schemas.openxmlformats.org/officeDocument/2006/relationships" xmlns:p="http://schemas.openxmlformats.org/presentationml/2006/main">
-  <p:cSld>
-    <p:spTree>
-      <p:nvGrpSpPr>
-        <p:cNvPr id="1" name=""/>
-        <p:cNvGrpSpPr/>
-        <p:nvPr/>
-      </p:nvGrpSpPr>
-      <p:grpSpPr>
-        <a:xfrm>
-          <a:off x="0" y="0"/>
-          <a:ext cx="0" cy="0"/>
-          <a:chOff x="0" y="0"/>
-          <a:chExt cx="0" cy="0"/>
-        </a:xfrm>
-      </p:grpSpPr>
-      <p:sp>
-        <p:nvSpPr>
-          <p:cNvPr id="2" name="Title 1"/>
-          <p:cNvSpPr>
-            <a:spLocks noGrp="1"/>
-          </p:cNvSpPr>
-          <p:nvPr>
-            <p:ph type="title"/>
-          </p:nvPr>
-        </p:nvSpPr>
-        <p:spPr/>
-        <p:txBody>
-          <a:bodyPr/>
-          <a:lstStyle/>
-          <a:p>
-            <a:r>
-              <a:rPr lang="es-ES_tradnl" dirty="0" smtClean="0"/>
-              <a:t>Cron </a:t>
-            </a:r>
-            <a:r>
-              <a:rPr lang="es-ES_tradnl" dirty="0" err="1" smtClean="0"/>
-              <a:t>expressions</a:t>
-            </a:r>
-            <a:r>
-              <a:rPr lang="es-ES_tradnl" dirty="0" smtClean="0"/>
-              <a:t>?</a:t>
-            </a:r>
-            <a:endParaRPr lang="en-GB" dirty="0"/>
-          </a:p>
-        </p:txBody>
-      </p:sp>
-      <p:pic>
-        <p:nvPicPr>
-          <p:cNvPr id="4" name="Picture 3"/>
-          <p:cNvPicPr>
-            <a:picLocks noChangeAspect="1"/>
-          </p:cNvPicPr>
-          <p:nvPr/>
-        </p:nvPicPr>
-        <p:blipFill>
-          <a:blip r:embed="rId2"/>
-          <a:stretch>
-            <a:fillRect/>
-          </a:stretch>
-        </p:blipFill>
-        <p:spPr>
-          <a:xfrm>
-            <a:off x="768302" y="2412121"/>
-            <a:ext cx="9881754" cy="3812062"/>
-          </a:xfrm>
-          <a:prstGeom prst="rect">
-            <a:avLst/>
-          </a:prstGeom>
-        </p:spPr>
-      </p:pic>
-      <p:pic>
-        <p:nvPicPr>
-          <p:cNvPr id="5" name="Picture 4"/>
-          <p:cNvPicPr>
-            <a:picLocks noChangeAspect="1"/>
-          </p:cNvPicPr>
-          <p:nvPr/>
-        </p:nvPicPr>
-        <p:blipFill>
-          <a:blip r:embed="rId3"/>
-          <a:stretch>
-            <a:fillRect/>
-          </a:stretch>
-        </p:blipFill>
-        <p:spPr>
-          <a:xfrm>
-            <a:off x="3152774" y="1816378"/>
-            <a:ext cx="5200650" cy="381000"/>
-          </a:xfrm>
-          <a:prstGeom prst="rect">
-            <a:avLst/>
-          </a:prstGeom>
-        </p:spPr>
-      </p:pic>
-    </p:spTree>
-    <p:extLst>
-      <p:ext uri="{BB962C8B-B14F-4D97-AF65-F5344CB8AC3E}">
-        <p14:creationId xmlns:p14="http://schemas.microsoft.com/office/powerpoint/2010/main" val="186736957"/>
-      </p:ext>
-    </p:extLst>
-  </p:cSld>
-  <p:clrMapOvr>
-    <a:masterClrMapping/>
-  </p:clrMapOvr>
-  <p:timing>
-    <p:tnLst>
-      <p:par>
-        <p:cTn id="1" dur="indefinite" restart="never" nodeType="tmRoot"/>
-      </p:par>
-    </p:tnLst>
-  </p:timing>
-</p:sld>
-</file>
-
-<file path=ppt/slides/slide15.xml><?xml version="1.0" encoding="utf-8"?>
-<p:sld xmlns:a="http://schemas.openxmlformats.org/drawingml/2006/main" xmlns:r="http://schemas.openxmlformats.org/officeDocument/2006/relationships" xmlns:p="http://schemas.openxmlformats.org/presentationml/2006/main">
-  <p:cSld>
-    <p:spTree>
-      <p:nvGrpSpPr>
-        <p:cNvPr id="1" name=""/>
-        <p:cNvGrpSpPr/>
-        <p:nvPr/>
-      </p:nvGrpSpPr>
-      <p:grpSpPr>
-        <a:xfrm>
-          <a:off x="0" y="0"/>
-          <a:ext cx="0" cy="0"/>
-          <a:chOff x="0" y="0"/>
-          <a:chExt cx="0" cy="0"/>
-        </a:xfrm>
-      </p:grpSpPr>
-      <p:sp>
-        <p:nvSpPr>
-          <p:cNvPr id="2" name="Title 1"/>
-          <p:cNvSpPr>
-            <a:spLocks noGrp="1"/>
-          </p:cNvSpPr>
-          <p:nvPr>
-            <p:ph type="title"/>
-          </p:nvPr>
-        </p:nvSpPr>
-        <p:spPr/>
-        <p:txBody>
-          <a:bodyPr/>
-          <a:lstStyle/>
-          <a:p>
-            <a:r>
-              <a:rPr lang="es-ES_tradnl" dirty="0" smtClean="0"/>
-              <a:t>CONTINUING TASKS</a:t>
-            </a:r>
-            <a:endParaRPr lang="en-GB" dirty="0"/>
-          </a:p>
-        </p:txBody>
-      </p:sp>
-      <p:sp>
-        <p:nvSpPr>
-          <p:cNvPr id="4" name="Text Placeholder 3"/>
-          <p:cNvSpPr>
-            <a:spLocks noGrp="1"/>
-          </p:cNvSpPr>
-          <p:nvPr>
-            <p:ph type="body" sz="half" idx="2"/>
-          </p:nvPr>
-        </p:nvSpPr>
-        <p:spPr/>
-        <p:txBody>
-          <a:bodyPr/>
-          <a:lstStyle/>
-          <a:p>
-            <a:endParaRPr lang="en-GB" dirty="0"/>
-          </a:p>
-        </p:txBody>
-      </p:sp>
-      <p:pic>
-        <p:nvPicPr>
-          <p:cNvPr id="7" name="Picture 6"/>
-          <p:cNvPicPr>
-            <a:picLocks noChangeAspect="1"/>
-          </p:cNvPicPr>
-          <p:nvPr/>
-        </p:nvPicPr>
-        <p:blipFill>
-          <a:blip r:embed="rId2">
-            <a:extLst>
-              <a:ext uri="{28A0092B-C50C-407E-A947-70E740481C1C}">
-                <a14:useLocalDpi xmlns:a14="http://schemas.microsoft.com/office/drawing/2010/main" val="0"/>
-              </a:ext>
-            </a:extLst>
-          </a:blip>
-          <a:stretch>
-            <a:fillRect/>
-          </a:stretch>
-        </p:blipFill>
-        <p:spPr>
-          <a:xfrm>
-            <a:off x="1348959" y="2705589"/>
-            <a:ext cx="2857500" cy="2857500"/>
-          </a:xfrm>
-          <a:prstGeom prst="rect">
-            <a:avLst/>
-          </a:prstGeom>
-        </p:spPr>
-      </p:pic>
-      <p:pic>
-        <p:nvPicPr>
-          <p:cNvPr id="5" name="Picture 4"/>
-          <p:cNvPicPr>
-            <a:picLocks noChangeAspect="1"/>
-          </p:cNvPicPr>
-          <p:nvPr/>
-        </p:nvPicPr>
-        <p:blipFill>
-          <a:blip r:embed="rId3"/>
-          <a:stretch>
-            <a:fillRect/>
-          </a:stretch>
-        </p:blipFill>
-        <p:spPr>
-          <a:xfrm>
-            <a:off x="5576735" y="707989"/>
-            <a:ext cx="5202815" cy="5083210"/>
-          </a:xfrm>
-          <a:prstGeom prst="rect">
-            <a:avLst/>
-          </a:prstGeom>
-        </p:spPr>
-      </p:pic>
-    </p:spTree>
-    <p:extLst>
-      <p:ext uri="{BB962C8B-B14F-4D97-AF65-F5344CB8AC3E}">
-        <p14:creationId xmlns:p14="http://schemas.microsoft.com/office/powerpoint/2010/main" val="2379578308"/>
-      </p:ext>
-    </p:extLst>
-  </p:cSld>
-  <p:clrMapOvr>
-    <a:masterClrMapping/>
-  </p:clrMapOvr>
-  <p:timing>
-    <p:tnLst>
-      <p:par>
-        <p:cTn id="1" dur="indefinite" restart="never" nodeType="tmRoot"/>
-      </p:par>
-    </p:tnLst>
-  </p:timing>
-</p:sld>
-</file>
-
-<file path=ppt/slides/slide16.xml><?xml version="1.0" encoding="utf-8"?>
-<p:sld xmlns:a="http://schemas.openxmlformats.org/drawingml/2006/main" xmlns:r="http://schemas.openxmlformats.org/officeDocument/2006/relationships" xmlns:p="http://schemas.openxmlformats.org/presentationml/2006/main">
-  <p:cSld>
-    <p:spTree>
-      <p:nvGrpSpPr>
-        <p:cNvPr id="1" name=""/>
-        <p:cNvGrpSpPr/>
-        <p:nvPr/>
-      </p:nvGrpSpPr>
-      <p:grpSpPr>
-        <a:xfrm>
-          <a:off x="0" y="0"/>
-          <a:ext cx="0" cy="0"/>
-          <a:chOff x="0" y="0"/>
-          <a:chExt cx="0" cy="0"/>
-        </a:xfrm>
-      </p:grpSpPr>
-      <p:sp>
-        <p:nvSpPr>
-          <p:cNvPr id="2" name="Title 1"/>
-          <p:cNvSpPr>
-            <a:spLocks noGrp="1"/>
-          </p:cNvSpPr>
-          <p:nvPr>
-            <p:ph type="title"/>
-          </p:nvPr>
-        </p:nvSpPr>
-        <p:spPr/>
-        <p:txBody>
-          <a:bodyPr/>
-          <a:lstStyle/>
-          <a:p>
-            <a:r>
-              <a:rPr lang="es-ES_tradnl" dirty="0" err="1" smtClean="0"/>
-              <a:t>Method</a:t>
-            </a:r>
-            <a:r>
-              <a:rPr lang="es-ES_tradnl" dirty="0" smtClean="0"/>
-              <a:t> </a:t>
-            </a:r>
-            <a:r>
-              <a:rPr lang="es-ES_tradnl" dirty="0" err="1" smtClean="0"/>
-              <a:t>resolution</a:t>
-            </a:r>
-            <a:endParaRPr lang="en-GB" dirty="0"/>
-          </a:p>
-        </p:txBody>
-      </p:sp>
-      <p:sp>
-        <p:nvSpPr>
-          <p:cNvPr id="4" name="Content Placeholder 3"/>
-          <p:cNvSpPr>
-            <a:spLocks noGrp="1"/>
-          </p:cNvSpPr>
-          <p:nvPr>
-            <p:ph sz="quarter" idx="4294967295"/>
-          </p:nvPr>
-        </p:nvSpPr>
-        <p:spPr>
-          <a:xfrm>
-            <a:off x="0" y="2366963"/>
-            <a:ext cx="10571163" cy="3424237"/>
-          </a:xfrm>
-        </p:spPr>
-        <p:txBody>
-          <a:bodyPr/>
-          <a:lstStyle/>
-          <a:p>
-            <a:r>
-              <a:rPr lang="es-ES_tradnl" dirty="0" err="1"/>
-              <a:t>Statics</a:t>
-            </a:r>
-            <a:r>
-              <a:rPr lang="es-ES_tradnl" dirty="0"/>
-              <a:t> are </a:t>
-            </a:r>
-            <a:r>
-              <a:rPr lang="es-ES_tradnl" dirty="0" err="1"/>
-              <a:t>easy</a:t>
-            </a:r>
-            <a:r>
-              <a:rPr lang="es-ES_tradnl" dirty="0" smtClean="0"/>
-              <a:t>…</a:t>
-            </a:r>
-          </a:p>
-          <a:p>
-            <a:r>
-              <a:rPr lang="es-ES_tradnl" dirty="0" err="1" smtClean="0"/>
-              <a:t>But</a:t>
-            </a:r>
-            <a:r>
-              <a:rPr lang="es-ES_tradnl" dirty="0" smtClean="0"/>
-              <a:t> </a:t>
-            </a:r>
-            <a:r>
-              <a:rPr lang="es-ES_tradnl" dirty="0" err="1" smtClean="0"/>
-              <a:t>instance</a:t>
-            </a:r>
-            <a:r>
-              <a:rPr lang="es-ES_tradnl" dirty="0" smtClean="0"/>
-              <a:t> </a:t>
-            </a:r>
-            <a:r>
-              <a:rPr lang="es-ES_tradnl" dirty="0" err="1" smtClean="0"/>
-              <a:t>methods</a:t>
-            </a:r>
-            <a:r>
-              <a:rPr lang="es-ES_tradnl" dirty="0" smtClean="0"/>
-              <a:t> are </a:t>
-            </a:r>
-            <a:r>
-              <a:rPr lang="es-ES_tradnl" dirty="0" err="1" smtClean="0"/>
-              <a:t>also</a:t>
-            </a:r>
-            <a:r>
-              <a:rPr lang="es-ES_tradnl" dirty="0" smtClean="0"/>
-              <a:t> </a:t>
-            </a:r>
-            <a:r>
-              <a:rPr lang="es-ES_tradnl" dirty="0" err="1" smtClean="0"/>
-              <a:t>supported</a:t>
-            </a:r>
-            <a:endParaRPr lang="en-GB" dirty="0"/>
-          </a:p>
-        </p:txBody>
-      </p:sp>
-      <p:pic>
-        <p:nvPicPr>
-          <p:cNvPr id="5" name="Picture 4"/>
-          <p:cNvPicPr>
-            <a:picLocks noChangeAspect="1"/>
-          </p:cNvPicPr>
-          <p:nvPr/>
-        </p:nvPicPr>
-        <p:blipFill>
-          <a:blip r:embed="rId2"/>
-          <a:stretch>
-            <a:fillRect/>
-          </a:stretch>
-        </p:blipFill>
-        <p:spPr>
-          <a:xfrm>
-            <a:off x="7560251" y="2957539"/>
-            <a:ext cx="4389293" cy="1390326"/>
-          </a:xfrm>
-          <a:prstGeom prst="rect">
-            <a:avLst/>
-          </a:prstGeom>
-        </p:spPr>
-      </p:pic>
-      <p:sp>
-        <p:nvSpPr>
-          <p:cNvPr id="6" name="Rectangle 5"/>
-          <p:cNvSpPr/>
-          <p:nvPr/>
-        </p:nvSpPr>
-        <p:spPr>
-          <a:xfrm>
-            <a:off x="1208809" y="3424535"/>
-            <a:ext cx="6096000" cy="923330"/>
-          </a:xfrm>
-          <a:prstGeom prst="rect">
-            <a:avLst/>
-          </a:prstGeom>
-        </p:spPr>
-        <p:txBody>
-          <a:bodyPr>
-            <a:spAutoFit/>
-          </a:bodyPr>
-          <a:lstStyle/>
-          <a:p>
-            <a:r>
-              <a:rPr lang="en-GB" dirty="0"/>
-              <a:t>By default, the </a:t>
-            </a:r>
-            <a:r>
-              <a:rPr lang="en-GB" dirty="0" err="1"/>
-              <a:t>Activator.CreateInstace</a:t>
-            </a:r>
-            <a:r>
-              <a:rPr lang="en-GB" dirty="0"/>
-              <a:t> method is being used, so </a:t>
-            </a:r>
-            <a:r>
-              <a:rPr lang="en-GB" dirty="0" smtClean="0"/>
-              <a:t>only </a:t>
-            </a:r>
-            <a:r>
-              <a:rPr lang="en-GB" dirty="0"/>
-              <a:t>classes with default constructors are supported by default.</a:t>
-            </a:r>
-          </a:p>
-        </p:txBody>
-      </p:sp>
-      <p:pic>
-        <p:nvPicPr>
-          <p:cNvPr id="7" name="Picture 6"/>
-          <p:cNvPicPr>
-            <a:picLocks noChangeAspect="1"/>
-          </p:cNvPicPr>
-          <p:nvPr/>
-        </p:nvPicPr>
-        <p:blipFill>
-          <a:blip r:embed="rId3"/>
-          <a:stretch>
-            <a:fillRect/>
-          </a:stretch>
-        </p:blipFill>
-        <p:spPr>
-          <a:xfrm>
-            <a:off x="2028825" y="876597"/>
-            <a:ext cx="8134350" cy="5095875"/>
-          </a:xfrm>
-          <a:prstGeom prst="rect">
-            <a:avLst/>
-          </a:prstGeom>
-        </p:spPr>
-      </p:pic>
-    </p:spTree>
-    <p:extLst>
-      <p:ext uri="{BB962C8B-B14F-4D97-AF65-F5344CB8AC3E}">
-        <p14:creationId xmlns:p14="http://schemas.microsoft.com/office/powerpoint/2010/main" val="1537565026"/>
-      </p:ext>
-    </p:extLst>
-  </p:cSld>
-  <p:clrMapOvr>
-    <a:masterClrMapping/>
-  </p:clrMapOvr>
-  <p:timing>
-    <p:tnLst>
-      <p:par>
-        <p:cTn id="1" dur="indefinite" restart="never" nodeType="tmRoot">
-          <p:childTnLst>
-            <p:seq concurrent="1" nextAc="seek">
-              <p:cTn id="2" dur="indefinite" nodeType="mainSeq">
-                <p:childTnLst>
-                  <p:par>
-                    <p:cTn id="3" fill="hold">
-                      <p:stCondLst>
-                        <p:cond delay="indefinite"/>
-                      </p:stCondLst>
-                      <p:childTnLst>
-                        <p:par>
-                          <p:cTn id="4" fill="hold">
-                            <p:stCondLst>
-                              <p:cond delay="0"/>
-                            </p:stCondLst>
-                            <p:childTnLst>
-                              <p:par>
-                                <p:cTn id="5" presetID="10" presetClass="entr" presetSubtype="0" fill="hold" nodeType="clickEffect">
-                                  <p:stCondLst>
-                                    <p:cond delay="0"/>
-                                  </p:stCondLst>
-                                  <p:childTnLst>
-                                    <p:set>
-                                      <p:cBhvr>
-                                        <p:cTn id="6" dur="1" fill="hold">
-                                          <p:stCondLst>
-                                            <p:cond delay="0"/>
-                                          </p:stCondLst>
-                                        </p:cTn>
-                                        <p:tgtEl>
-                                          <p:spTgt spid="7"/>
-                                        </p:tgtEl>
-                                        <p:attrNameLst>
-                                          <p:attrName>style.visibility</p:attrName>
-                                        </p:attrNameLst>
-                                      </p:cBhvr>
-                                      <p:to>
-                                        <p:strVal val="visible"/>
-                                      </p:to>
-                                    </p:set>
-                                    <p:animEffect transition="in" filter="fade">
-                                      <p:cBhvr>
-                                        <p:cTn id="7" dur="500"/>
-                                        <p:tgtEl>
-                                          <p:spTgt spid="7"/>
-                                        </p:tgtEl>
-                                      </p:cBhvr>
-                                    </p:animEffect>
-                                  </p:childTnLst>
-                                </p:cTn>
-                              </p:par>
-                            </p:childTnLst>
-                          </p:cTn>
-                        </p:par>
-                      </p:childTnLst>
-                    </p:cTn>
-                  </p:par>
-                </p:childTnLst>
-              </p:cTn>
-              <p:prevCondLst>
-                <p:cond evt="onPrev" delay="0">
-                  <p:tgtEl>
-                    <p:sldTgt/>
-                  </p:tgtEl>
-                </p:cond>
-              </p:prevCondLst>
-              <p:nextCondLst>
-                <p:cond evt="onNext" delay="0">
-                  <p:tgtEl>
-                    <p:sldTgt/>
-                  </p:tgtEl>
-                </p:cond>
-              </p:nextCondLst>
-            </p:seq>
-          </p:childTnLst>
-        </p:cTn>
-      </p:par>
-    </p:tnLst>
-  </p:timing>
-</p:sld>
-</file>
-
-<file path=ppt/slides/slide17.xml><?xml version="1.0" encoding="utf-8"?>
-<p:sld xmlns:a="http://schemas.openxmlformats.org/drawingml/2006/main" xmlns:r="http://schemas.openxmlformats.org/officeDocument/2006/relationships" xmlns:p="http://schemas.openxmlformats.org/presentationml/2006/main">
-  <p:cSld>
-    <p:spTree>
-      <p:nvGrpSpPr>
-        <p:cNvPr id="1" name=""/>
-        <p:cNvGrpSpPr/>
-        <p:nvPr/>
-      </p:nvGrpSpPr>
-      <p:grpSpPr>
-        <a:xfrm>
-          <a:off x="0" y="0"/>
-          <a:ext cx="0" cy="0"/>
-          <a:chOff x="0" y="0"/>
-          <a:chExt cx="0" cy="0"/>
-        </a:xfrm>
-      </p:grpSpPr>
-      <p:sp>
-        <p:nvSpPr>
-          <p:cNvPr id="2" name="Title 1"/>
-          <p:cNvSpPr>
-            <a:spLocks noGrp="1"/>
-          </p:cNvSpPr>
-          <p:nvPr>
-            <p:ph type="title"/>
-          </p:nvPr>
-        </p:nvSpPr>
-        <p:spPr/>
-        <p:txBody>
-          <a:bodyPr/>
-          <a:lstStyle/>
-          <a:p>
-            <a:r>
-              <a:rPr lang="es-ES_tradnl" dirty="0" smtClean="0"/>
-              <a:t>Hosting </a:t>
-            </a:r>
-            <a:r>
-              <a:rPr lang="es-ES_tradnl" dirty="0" err="1" smtClean="0"/>
-              <a:t>the</a:t>
-            </a:r>
-            <a:r>
-              <a:rPr lang="es-ES_tradnl" dirty="0" smtClean="0"/>
-              <a:t> </a:t>
-            </a:r>
-            <a:r>
-              <a:rPr lang="es-ES_tradnl" dirty="0" err="1" smtClean="0"/>
-              <a:t>hangfire</a:t>
-            </a:r>
-            <a:r>
-              <a:rPr lang="es-ES_tradnl" dirty="0" smtClean="0"/>
-              <a:t> server</a:t>
-            </a:r>
-            <a:endParaRPr lang="en-GB" dirty="0"/>
-          </a:p>
-        </p:txBody>
-      </p:sp>
-      <p:sp>
-        <p:nvSpPr>
-          <p:cNvPr id="3" name="Content Placeholder 2"/>
-          <p:cNvSpPr>
-            <a:spLocks noGrp="1"/>
-          </p:cNvSpPr>
-          <p:nvPr>
-            <p:ph sz="quarter" idx="13"/>
-          </p:nvPr>
-        </p:nvSpPr>
-        <p:spPr>
-          <a:xfrm>
-            <a:off x="203488" y="2325528"/>
-            <a:ext cx="5106026" cy="3424107"/>
-          </a:xfrm>
-        </p:spPr>
-        <p:txBody>
-          <a:bodyPr/>
-          <a:lstStyle/>
-          <a:p>
-            <a:r>
-              <a:rPr lang="es-ES_tradnl" dirty="0" smtClean="0"/>
-              <a:t>IN ASP.NET</a:t>
-            </a:r>
-            <a:endParaRPr lang="en-GB" dirty="0"/>
-          </a:p>
-        </p:txBody>
-      </p:sp>
-      <p:sp>
-        <p:nvSpPr>
-          <p:cNvPr id="4" name="Content Placeholder 3"/>
-          <p:cNvSpPr>
-            <a:spLocks noGrp="1"/>
-          </p:cNvSpPr>
-          <p:nvPr>
-            <p:ph sz="quarter" idx="14"/>
-          </p:nvPr>
-        </p:nvSpPr>
-        <p:spPr>
-          <a:xfrm>
-            <a:off x="5652655" y="2367092"/>
-            <a:ext cx="6278707" cy="3424107"/>
-          </a:xfrm>
-        </p:spPr>
-        <p:txBody>
-          <a:bodyPr/>
-          <a:lstStyle/>
-          <a:p>
-            <a:r>
-              <a:rPr lang="es-ES_tradnl" dirty="0" smtClean="0"/>
-              <a:t>In a </a:t>
-            </a:r>
-            <a:r>
-              <a:rPr lang="es-ES_tradnl" dirty="0" err="1" smtClean="0"/>
-              <a:t>dedicated</a:t>
-            </a:r>
-            <a:r>
-              <a:rPr lang="es-ES_tradnl" dirty="0" smtClean="0"/>
-              <a:t> server (</a:t>
-            </a:r>
-            <a:r>
-              <a:rPr lang="es-ES_tradnl" dirty="0" err="1" smtClean="0"/>
-              <a:t>win</a:t>
-            </a:r>
-            <a:r>
-              <a:rPr lang="es-ES_tradnl" dirty="0" smtClean="0"/>
-              <a:t> </a:t>
-            </a:r>
-            <a:r>
-              <a:rPr lang="es-ES_tradnl" dirty="0" err="1" smtClean="0"/>
-              <a:t>srv</a:t>
-            </a:r>
-            <a:r>
-              <a:rPr lang="es-ES_tradnl" dirty="0" smtClean="0"/>
-              <a:t>, </a:t>
-            </a:r>
-            <a:r>
-              <a:rPr lang="es-ES_tradnl" dirty="0" err="1" smtClean="0"/>
-              <a:t>console</a:t>
-            </a:r>
-            <a:r>
-              <a:rPr lang="es-ES_tradnl" dirty="0" smtClean="0"/>
-              <a:t> app, etc…)</a:t>
-            </a:r>
-            <a:endParaRPr lang="en-GB" dirty="0"/>
-          </a:p>
-        </p:txBody>
-      </p:sp>
-      <p:pic>
-        <p:nvPicPr>
-          <p:cNvPr id="5" name="Picture 4"/>
-          <p:cNvPicPr>
-            <a:picLocks noChangeAspect="1"/>
-          </p:cNvPicPr>
-          <p:nvPr/>
-        </p:nvPicPr>
-        <p:blipFill>
-          <a:blip r:embed="rId2"/>
-          <a:stretch>
-            <a:fillRect/>
-          </a:stretch>
-        </p:blipFill>
-        <p:spPr>
-          <a:xfrm>
-            <a:off x="6019800" y="4660322"/>
-            <a:ext cx="5334000" cy="1028700"/>
-          </a:xfrm>
-          <a:prstGeom prst="rect">
-            <a:avLst/>
-          </a:prstGeom>
-        </p:spPr>
-      </p:pic>
-      <p:pic>
-        <p:nvPicPr>
-          <p:cNvPr id="6" name="Picture 5"/>
-          <p:cNvPicPr>
-            <a:picLocks noChangeAspect="1"/>
-          </p:cNvPicPr>
-          <p:nvPr/>
-        </p:nvPicPr>
-        <p:blipFill>
-          <a:blip r:embed="rId3"/>
-          <a:stretch>
-            <a:fillRect/>
-          </a:stretch>
-        </p:blipFill>
-        <p:spPr>
-          <a:xfrm>
-            <a:off x="6019800" y="3393499"/>
-            <a:ext cx="3190875" cy="1114425"/>
-          </a:xfrm>
-          <a:prstGeom prst="rect">
-            <a:avLst/>
-          </a:prstGeom>
-        </p:spPr>
-      </p:pic>
-      <p:pic>
-        <p:nvPicPr>
-          <p:cNvPr id="7" name="Picture 6"/>
-          <p:cNvPicPr>
-            <a:picLocks noChangeAspect="1"/>
-          </p:cNvPicPr>
-          <p:nvPr/>
-        </p:nvPicPr>
-        <p:blipFill>
-          <a:blip r:embed="rId4"/>
-          <a:stretch>
-            <a:fillRect/>
-          </a:stretch>
-        </p:blipFill>
-        <p:spPr>
-          <a:xfrm>
-            <a:off x="203488" y="2840335"/>
-            <a:ext cx="3286125" cy="1057275"/>
-          </a:xfrm>
-          <a:prstGeom prst="rect">
-            <a:avLst/>
-          </a:prstGeom>
-        </p:spPr>
-      </p:pic>
-      <p:pic>
-        <p:nvPicPr>
-          <p:cNvPr id="9" name="Picture 8"/>
-          <p:cNvPicPr>
-            <a:picLocks noChangeAspect="1"/>
-          </p:cNvPicPr>
-          <p:nvPr/>
-        </p:nvPicPr>
-        <p:blipFill>
-          <a:blip r:embed="rId5"/>
-          <a:stretch>
-            <a:fillRect/>
-          </a:stretch>
-        </p:blipFill>
-        <p:spPr>
-          <a:xfrm>
-            <a:off x="203488" y="4037582"/>
-            <a:ext cx="5238750" cy="2705100"/>
-          </a:xfrm>
-          <a:prstGeom prst="rect">
-            <a:avLst/>
-          </a:prstGeom>
-        </p:spPr>
-      </p:pic>
-    </p:spTree>
-    <p:extLst>
-      <p:ext uri="{BB962C8B-B14F-4D97-AF65-F5344CB8AC3E}">
-        <p14:creationId xmlns:p14="http://schemas.microsoft.com/office/powerpoint/2010/main" val="4240932492"/>
-      </p:ext>
-    </p:extLst>
-  </p:cSld>
-  <p:clrMapOvr>
-    <a:masterClrMapping/>
-  </p:clrMapOvr>
-  <p:timing>
-    <p:tnLst>
-      <p:par>
-        <p:cTn id="1" dur="indefinite" restart="never" nodeType="tmRoot"/>
-      </p:par>
-    </p:tnLst>
-  </p:timing>
-</p:sld>
-</file>
-
-<file path=ppt/slides/slide18.xml><?xml version="1.0" encoding="utf-8"?>
-<p:sld xmlns:a="http://schemas.openxmlformats.org/drawingml/2006/main" xmlns:r="http://schemas.openxmlformats.org/officeDocument/2006/relationships" xmlns:p="http://schemas.openxmlformats.org/presentationml/2006/main">
-  <p:cSld>
-    <p:spTree>
-      <p:nvGrpSpPr>
-        <p:cNvPr id="1" name=""/>
-        <p:cNvGrpSpPr/>
-        <p:nvPr/>
-      </p:nvGrpSpPr>
-      <p:grpSpPr>
-        <a:xfrm>
-          <a:off x="0" y="0"/>
-          <a:ext cx="0" cy="0"/>
-          <a:chOff x="0" y="0"/>
-          <a:chExt cx="0" cy="0"/>
-        </a:xfrm>
-      </p:grpSpPr>
-      <p:pic>
-        <p:nvPicPr>
-          <p:cNvPr id="3" name="Picture 2"/>
-          <p:cNvPicPr>
-            <a:picLocks noChangeAspect="1"/>
-          </p:cNvPicPr>
-          <p:nvPr/>
-        </p:nvPicPr>
-        <p:blipFill>
-          <a:blip r:embed="rId2">
-            <a:extLst>
-              <a:ext uri="{28A0092B-C50C-407E-A947-70E740481C1C}">
-                <a14:useLocalDpi xmlns:a14="http://schemas.microsoft.com/office/drawing/2010/main" val="0"/>
-              </a:ext>
-            </a:extLst>
-          </a:blip>
-          <a:stretch>
-            <a:fillRect/>
-          </a:stretch>
-        </p:blipFill>
-        <p:spPr>
-          <a:xfrm>
-            <a:off x="3525911" y="2111017"/>
-            <a:ext cx="6090247" cy="2107691"/>
-          </a:xfrm>
-          <a:prstGeom prst="rect">
-            <a:avLst/>
-          </a:prstGeom>
-        </p:spPr>
-      </p:pic>
-    </p:spTree>
-    <p:extLst>
-      <p:ext uri="{BB962C8B-B14F-4D97-AF65-F5344CB8AC3E}">
-        <p14:creationId xmlns:p14="http://schemas.microsoft.com/office/powerpoint/2010/main" val="1803789267"/>
-      </p:ext>
-    </p:extLst>
-  </p:cSld>
-  <p:clrMapOvr>
-    <a:masterClrMapping/>
-  </p:clrMapOvr>
-  <p:timing>
-    <p:tnLst>
-      <p:par>
-        <p:cTn id="1" dur="indefinite" restart="never" nodeType="tmRoot"/>
-      </p:par>
-    </p:tnLst>
-  </p:timing>
-</p:sld>
-</file>
-
-<file path=ppt/slides/slide19.xml><?xml version="1.0" encoding="utf-8"?>
-<p:sld xmlns:a="http://schemas.openxmlformats.org/drawingml/2006/main" xmlns:r="http://schemas.openxmlformats.org/officeDocument/2006/relationships" xmlns:p="http://schemas.openxmlformats.org/presentationml/2006/main">
-  <p:cSld>
-    <p:spTree>
-      <p:nvGrpSpPr>
-        <p:cNvPr id="1" name=""/>
-        <p:cNvGrpSpPr/>
-        <p:nvPr/>
-      </p:nvGrpSpPr>
-      <p:grpSpPr>
-        <a:xfrm>
-          <a:off x="0" y="0"/>
-          <a:ext cx="0" cy="0"/>
-          <a:chOff x="0" y="0"/>
-          <a:chExt cx="0" cy="0"/>
-        </a:xfrm>
-      </p:grpSpPr>
-      <p:sp>
-        <p:nvSpPr>
-          <p:cNvPr id="2" name="Title 1"/>
-          <p:cNvSpPr>
-            <a:spLocks noGrp="1"/>
-          </p:cNvSpPr>
-          <p:nvPr>
-            <p:ph type="title"/>
-          </p:nvPr>
-        </p:nvSpPr>
-        <p:spPr/>
-        <p:txBody>
-          <a:bodyPr/>
-          <a:lstStyle/>
-          <a:p>
-            <a:r>
-              <a:rPr lang="es-ES_tradnl" dirty="0" err="1" smtClean="0"/>
-              <a:t>The</a:t>
-            </a:r>
-            <a:r>
-              <a:rPr lang="es-ES_tradnl" dirty="0" smtClean="0"/>
-              <a:t> </a:t>
-            </a:r>
-            <a:r>
-              <a:rPr lang="es-ES_tradnl" dirty="0" err="1" smtClean="0"/>
-              <a:t>dashboard</a:t>
-            </a:r>
-            <a:endParaRPr lang="en-GB" dirty="0"/>
-          </a:p>
-        </p:txBody>
-      </p:sp>
-      <p:pic>
-        <p:nvPicPr>
-          <p:cNvPr id="11" name="Picture 10"/>
-          <p:cNvPicPr>
-            <a:picLocks noChangeAspect="1"/>
-          </p:cNvPicPr>
-          <p:nvPr/>
-        </p:nvPicPr>
-        <p:blipFill>
-          <a:blip r:embed="rId2"/>
-          <a:stretch>
-            <a:fillRect/>
-          </a:stretch>
-        </p:blipFill>
-        <p:spPr>
-          <a:xfrm>
-            <a:off x="221672" y="1745239"/>
-            <a:ext cx="7176655" cy="4317731"/>
-          </a:xfrm>
-          <a:prstGeom prst="rect">
-            <a:avLst/>
-          </a:prstGeom>
-        </p:spPr>
-      </p:pic>
-      <p:pic>
-        <p:nvPicPr>
-          <p:cNvPr id="12" name="Picture 11"/>
-          <p:cNvPicPr>
-            <a:picLocks noChangeAspect="1"/>
-          </p:cNvPicPr>
-          <p:nvPr/>
-        </p:nvPicPr>
-        <p:blipFill>
-          <a:blip r:embed="rId3">
-            <a:extLst>
-              <a:ext uri="{28A0092B-C50C-407E-A947-70E740481C1C}">
-                <a14:useLocalDpi xmlns:a14="http://schemas.microsoft.com/office/drawing/2010/main" val="0"/>
-              </a:ext>
-            </a:extLst>
-          </a:blip>
-          <a:stretch>
-            <a:fillRect/>
-          </a:stretch>
-        </p:blipFill>
-        <p:spPr>
-          <a:xfrm>
-            <a:off x="83126" y="1704240"/>
-            <a:ext cx="6114240" cy="3439260"/>
-          </a:xfrm>
-          <a:prstGeom prst="rect">
-            <a:avLst/>
-          </a:prstGeom>
-        </p:spPr>
-      </p:pic>
-      <p:pic>
-        <p:nvPicPr>
-          <p:cNvPr id="13" name="Picture 12"/>
-          <p:cNvPicPr>
-            <a:picLocks noChangeAspect="1"/>
-          </p:cNvPicPr>
-          <p:nvPr/>
-        </p:nvPicPr>
-        <p:blipFill>
-          <a:blip r:embed="rId4"/>
-          <a:stretch>
-            <a:fillRect/>
-          </a:stretch>
-        </p:blipFill>
-        <p:spPr>
-          <a:xfrm>
-            <a:off x="6488258" y="3119435"/>
-            <a:ext cx="5200650" cy="3324225"/>
-          </a:xfrm>
-          <a:prstGeom prst="rect">
-            <a:avLst/>
-          </a:prstGeom>
-        </p:spPr>
-      </p:pic>
-    </p:spTree>
-    <p:extLst>
-      <p:ext uri="{BB962C8B-B14F-4D97-AF65-F5344CB8AC3E}">
-        <p14:creationId xmlns:p14="http://schemas.microsoft.com/office/powerpoint/2010/main" val="2864901217"/>
-      </p:ext>
-    </p:extLst>
-  </p:cSld>
-  <p:clrMapOvr>
-    <a:masterClrMapping/>
-  </p:clrMapOvr>
-  <p:timing>
-    <p:tnLst>
-      <p:par>
-        <p:cTn id="1" dur="indefinite" restart="never" nodeType="tmRoot">
-          <p:childTnLst>
-            <p:seq concurrent="1" nextAc="seek">
-              <p:cTn id="2" dur="indefinite" nodeType="mainSeq">
-                <p:childTnLst>
-                  <p:par>
-                    <p:cTn id="3" fill="hold">
-                      <p:stCondLst>
-                        <p:cond delay="indefinite"/>
-                      </p:stCondLst>
-                      <p:childTnLst>
-                        <p:par>
-                          <p:cTn id="4" fill="hold">
-                            <p:stCondLst>
-                              <p:cond delay="0"/>
-                            </p:stCondLst>
-                            <p:childTnLst>
-                              <p:par>
-                                <p:cTn id="5" presetID="6" presetClass="entr" presetSubtype="16" fill="hold" nodeType="clickEffect">
-                                  <p:stCondLst>
-                                    <p:cond delay="0"/>
-                                  </p:stCondLst>
-                                  <p:childTnLst>
-                                    <p:set>
-                                      <p:cBhvr>
-                                        <p:cTn id="6" dur="1" fill="hold">
-                                          <p:stCondLst>
-                                            <p:cond delay="0"/>
-                                          </p:stCondLst>
-                                        </p:cTn>
-                                        <p:tgtEl>
-                                          <p:spTgt spid="12"/>
-                                        </p:tgtEl>
-                                        <p:attrNameLst>
-                                          <p:attrName>style.visibility</p:attrName>
-                                        </p:attrNameLst>
-                                      </p:cBhvr>
-                                      <p:to>
-                                        <p:strVal val="visible"/>
-                                      </p:to>
-                                    </p:set>
-                                    <p:animEffect transition="in" filter="circle(in)">
-                                      <p:cBhvr>
-                                        <p:cTn id="7" dur="2000"/>
-                                        <p:tgtEl>
-                                          <p:spTgt spid="12"/>
-                                        </p:tgtEl>
-                                      </p:cBhvr>
-                                    </p:animEffect>
-                                  </p:childTnLst>
-                                </p:cTn>
-                              </p:par>
-                              <p:par>
-                                <p:cTn id="8" presetID="6" presetClass="entr" presetSubtype="16" fill="hold" nodeType="withEffect">
-                                  <p:stCondLst>
-                                    <p:cond delay="0"/>
-                                  </p:stCondLst>
-                                  <p:childTnLst>
-                                    <p:set>
-                                      <p:cBhvr>
-                                        <p:cTn id="9" dur="1" fill="hold">
-                                          <p:stCondLst>
-                                            <p:cond delay="0"/>
-                                          </p:stCondLst>
-                                        </p:cTn>
-                                        <p:tgtEl>
-                                          <p:spTgt spid="13"/>
-                                        </p:tgtEl>
-                                        <p:attrNameLst>
-                                          <p:attrName>style.visibility</p:attrName>
-                                        </p:attrNameLst>
-                                      </p:cBhvr>
-                                      <p:to>
-                                        <p:strVal val="visible"/>
-                                      </p:to>
-                                    </p:set>
-                                    <p:animEffect transition="in" filter="circle(in)">
-                                      <p:cBhvr>
-                                        <p:cTn id="10" dur="2000"/>
-                                        <p:tgtEl>
-                                          <p:spTgt spid="13"/>
-                                        </p:tgtEl>
-                                      </p:cBhvr>
-                                    </p:animEffect>
-                                  </p:childTnLst>
-                                </p:cTn>
-                              </p:par>
-                            </p:childTnLst>
-                          </p:cTn>
-                        </p:par>
-                      </p:childTnLst>
-                    </p:cTn>
-                  </p:par>
-                </p:childTnLst>
-              </p:cTn>
-              <p:prevCondLst>
-                <p:cond evt="onPrev" delay="0">
-                  <p:tgtEl>
-                    <p:sldTgt/>
-                  </p:tgtEl>
-                </p:cond>
-              </p:prevCondLst>
-              <p:nextCondLst>
-                <p:cond evt="onNext" delay="0">
-                  <p:tgtEl>
-                    <p:sldTgt/>
-                  </p:tgtEl>
-                </p:cond>
-              </p:nextCondLst>
-            </p:seq>
-          </p:childTnLst>
-        </p:cTn>
       </p:par>
     </p:tnLst>
   </p:timing>
@@ -9282,321 +7654,6 @@
     <p:tnLst>
       <p:par>
         <p:cTn id="1" dur="indefinite" restart="never" nodeType="tmRoot"/>
-      </p:par>
-    </p:tnLst>
-  </p:timing>
-</p:sld>
-</file>
-
-<file path=ppt/slides/slide20.xml><?xml version="1.0" encoding="utf-8"?>
-<p:sld xmlns:a="http://schemas.openxmlformats.org/drawingml/2006/main" xmlns:r="http://schemas.openxmlformats.org/officeDocument/2006/relationships" xmlns:p="http://schemas.openxmlformats.org/presentationml/2006/main">
-  <p:cSld>
-    <p:spTree>
-      <p:nvGrpSpPr>
-        <p:cNvPr id="1" name=""/>
-        <p:cNvGrpSpPr/>
-        <p:nvPr/>
-      </p:nvGrpSpPr>
-      <p:grpSpPr>
-        <a:xfrm>
-          <a:off x="0" y="0"/>
-          <a:ext cx="0" cy="0"/>
-          <a:chOff x="0" y="0"/>
-          <a:chExt cx="0" cy="0"/>
-        </a:xfrm>
-      </p:grpSpPr>
-      <p:pic>
-        <p:nvPicPr>
-          <p:cNvPr id="3" name="Picture 2"/>
-          <p:cNvPicPr>
-            <a:picLocks noChangeAspect="1"/>
-          </p:cNvPicPr>
-          <p:nvPr/>
-        </p:nvPicPr>
-        <p:blipFill>
-          <a:blip r:embed="rId2">
-            <a:extLst>
-              <a:ext uri="{28A0092B-C50C-407E-A947-70E740481C1C}">
-                <a14:useLocalDpi xmlns:a14="http://schemas.microsoft.com/office/drawing/2010/main" val="0"/>
-              </a:ext>
-            </a:extLst>
-          </a:blip>
-          <a:stretch>
-            <a:fillRect/>
-          </a:stretch>
-        </p:blipFill>
-        <p:spPr>
-          <a:xfrm>
-            <a:off x="3525911" y="2111017"/>
-            <a:ext cx="6090247" cy="2107691"/>
-          </a:xfrm>
-          <a:prstGeom prst="rect">
-            <a:avLst/>
-          </a:prstGeom>
-        </p:spPr>
-      </p:pic>
-    </p:spTree>
-    <p:extLst>
-      <p:ext uri="{BB962C8B-B14F-4D97-AF65-F5344CB8AC3E}">
-        <p14:creationId xmlns:p14="http://schemas.microsoft.com/office/powerpoint/2010/main" val="903350047"/>
-      </p:ext>
-    </p:extLst>
-  </p:cSld>
-  <p:clrMapOvr>
-    <a:masterClrMapping/>
-  </p:clrMapOvr>
-  <p:timing>
-    <p:tnLst>
-      <p:par>
-        <p:cTn id="1" dur="indefinite" restart="never" nodeType="tmRoot"/>
-      </p:par>
-    </p:tnLst>
-  </p:timing>
-</p:sld>
-</file>
-
-<file path=ppt/slides/slide21.xml><?xml version="1.0" encoding="utf-8"?>
-<p:sld xmlns:a="http://schemas.openxmlformats.org/drawingml/2006/main" xmlns:r="http://schemas.openxmlformats.org/officeDocument/2006/relationships" xmlns:p="http://schemas.openxmlformats.org/presentationml/2006/main">
-  <p:cSld>
-    <p:spTree>
-      <p:nvGrpSpPr>
-        <p:cNvPr id="1" name=""/>
-        <p:cNvGrpSpPr/>
-        <p:nvPr/>
-      </p:nvGrpSpPr>
-      <p:grpSpPr>
-        <a:xfrm>
-          <a:off x="0" y="0"/>
-          <a:ext cx="0" cy="0"/>
-          <a:chOff x="0" y="0"/>
-          <a:chExt cx="0" cy="0"/>
-        </a:xfrm>
-      </p:grpSpPr>
-      <p:sp>
-        <p:nvSpPr>
-          <p:cNvPr id="2" name="Title 1"/>
-          <p:cNvSpPr>
-            <a:spLocks noGrp="1"/>
-          </p:cNvSpPr>
-          <p:nvPr>
-            <p:ph type="title"/>
-          </p:nvPr>
-        </p:nvSpPr>
-        <p:spPr/>
-        <p:txBody>
-          <a:bodyPr/>
-          <a:lstStyle/>
-          <a:p>
-            <a:r>
-              <a:rPr lang="es-ES_tradnl" dirty="0" err="1" smtClean="0"/>
-              <a:t>DIStributed</a:t>
-            </a:r>
-            <a:r>
-              <a:rPr lang="es-ES_tradnl" dirty="0" smtClean="0"/>
-              <a:t> </a:t>
-            </a:r>
-            <a:r>
-              <a:rPr lang="es-ES_tradnl" dirty="0" err="1" smtClean="0"/>
-              <a:t>task</a:t>
-            </a:r>
-            <a:r>
-              <a:rPr lang="es-ES_tradnl" dirty="0" smtClean="0"/>
-              <a:t>?</a:t>
-            </a:r>
-            <a:endParaRPr lang="en-GB" dirty="0"/>
-          </a:p>
-        </p:txBody>
-      </p:sp>
-      <p:pic>
-        <p:nvPicPr>
-          <p:cNvPr id="3" name="Picture 2"/>
-          <p:cNvPicPr>
-            <a:picLocks noChangeAspect="1"/>
-          </p:cNvPicPr>
-          <p:nvPr/>
-        </p:nvPicPr>
-        <p:blipFill>
-          <a:blip r:embed="rId2"/>
-          <a:stretch>
-            <a:fillRect/>
-          </a:stretch>
-        </p:blipFill>
-        <p:spPr>
-          <a:xfrm>
-            <a:off x="577128" y="1894609"/>
-            <a:ext cx="3743325" cy="4876800"/>
-          </a:xfrm>
-          <a:prstGeom prst="rect">
-            <a:avLst/>
-          </a:prstGeom>
-        </p:spPr>
-      </p:pic>
-      <p:pic>
-        <p:nvPicPr>
-          <p:cNvPr id="7" name="Picture 6"/>
-          <p:cNvPicPr>
-            <a:picLocks noChangeAspect="1"/>
-          </p:cNvPicPr>
-          <p:nvPr/>
-        </p:nvPicPr>
-        <p:blipFill>
-          <a:blip r:embed="rId3">
-            <a:extLst>
-              <a:ext uri="{28A0092B-C50C-407E-A947-70E740481C1C}">
-                <a14:useLocalDpi xmlns:a14="http://schemas.microsoft.com/office/drawing/2010/main" val="0"/>
-              </a:ext>
-            </a:extLst>
-          </a:blip>
-          <a:stretch>
-            <a:fillRect/>
-          </a:stretch>
-        </p:blipFill>
-        <p:spPr>
-          <a:xfrm>
-            <a:off x="5313148" y="3108544"/>
-            <a:ext cx="6090247" cy="2107691"/>
-          </a:xfrm>
-          <a:prstGeom prst="rect">
-            <a:avLst/>
-          </a:prstGeom>
-        </p:spPr>
-      </p:pic>
-    </p:spTree>
-    <p:extLst>
-      <p:ext uri="{BB962C8B-B14F-4D97-AF65-F5344CB8AC3E}">
-        <p14:creationId xmlns:p14="http://schemas.microsoft.com/office/powerpoint/2010/main" val="1709841113"/>
-      </p:ext>
-    </p:extLst>
-  </p:cSld>
-  <p:clrMapOvr>
-    <a:masterClrMapping/>
-  </p:clrMapOvr>
-  <p:timing>
-    <p:tnLst>
-      <p:par>
-        <p:cTn id="1" dur="indefinite" restart="never" nodeType="tmRoot">
-          <p:childTnLst>
-            <p:seq concurrent="1" nextAc="seek">
-              <p:cTn id="2" dur="indefinite" nodeType="mainSeq">
-                <p:childTnLst>
-                  <p:par>
-                    <p:cTn id="3" fill="hold">
-                      <p:stCondLst>
-                        <p:cond delay="indefinite"/>
-                      </p:stCondLst>
-                      <p:childTnLst>
-                        <p:par>
-                          <p:cTn id="4" fill="hold">
-                            <p:stCondLst>
-                              <p:cond delay="0"/>
-                            </p:stCondLst>
-                            <p:childTnLst>
-                              <p:par>
-                                <p:cTn id="5" presetID="42" presetClass="entr" presetSubtype="0" fill="hold" nodeType="clickEffect">
-                                  <p:stCondLst>
-                                    <p:cond delay="0"/>
-                                  </p:stCondLst>
-                                  <p:childTnLst>
-                                    <p:set>
-                                      <p:cBhvr>
-                                        <p:cTn id="6" dur="1" fill="hold">
-                                          <p:stCondLst>
-                                            <p:cond delay="0"/>
-                                          </p:stCondLst>
-                                        </p:cTn>
-                                        <p:tgtEl>
-                                          <p:spTgt spid="7"/>
-                                        </p:tgtEl>
-                                        <p:attrNameLst>
-                                          <p:attrName>style.visibility</p:attrName>
-                                        </p:attrNameLst>
-                                      </p:cBhvr>
-                                      <p:to>
-                                        <p:strVal val="visible"/>
-                                      </p:to>
-                                    </p:set>
-                                    <p:animEffect transition="in" filter="fade">
-                                      <p:cBhvr>
-                                        <p:cTn id="7" dur="1000"/>
-                                        <p:tgtEl>
-                                          <p:spTgt spid="7"/>
-                                        </p:tgtEl>
-                                      </p:cBhvr>
-                                    </p:animEffect>
-                                    <p:anim calcmode="lin" valueType="num">
-                                      <p:cBhvr>
-                                        <p:cTn id="8" dur="1000" fill="hold"/>
-                                        <p:tgtEl>
-                                          <p:spTgt spid="7"/>
-                                        </p:tgtEl>
-                                        <p:attrNameLst>
-                                          <p:attrName>ppt_x</p:attrName>
-                                        </p:attrNameLst>
-                                      </p:cBhvr>
-                                      <p:tavLst>
-                                        <p:tav tm="0">
-                                          <p:val>
-                                            <p:strVal val="#ppt_x"/>
-                                          </p:val>
-                                        </p:tav>
-                                        <p:tav tm="100000">
-                                          <p:val>
-                                            <p:strVal val="#ppt_x"/>
-                                          </p:val>
-                                        </p:tav>
-                                      </p:tavLst>
-                                    </p:anim>
-                                    <p:anim calcmode="lin" valueType="num">
-                                      <p:cBhvr>
-                                        <p:cTn id="9" dur="1000" fill="hold"/>
-                                        <p:tgtEl>
-                                          <p:spTgt spid="7"/>
-                                        </p:tgtEl>
-                                        <p:attrNameLst>
-                                          <p:attrName>ppt_y</p:attrName>
-                                        </p:attrNameLst>
-                                      </p:cBhvr>
-                                      <p:tavLst>
-                                        <p:tav tm="0">
-                                          <p:val>
-                                            <p:strVal val="#ppt_y+.1"/>
-                                          </p:val>
-                                        </p:tav>
-                                        <p:tav tm="100000">
-                                          <p:val>
-                                            <p:strVal val="#ppt_y"/>
-                                          </p:val>
-                                        </p:tav>
-                                      </p:tavLst>
-                                    </p:anim>
-                                  </p:childTnLst>
-                                </p:cTn>
-                              </p:par>
-                            </p:childTnLst>
-                          </p:cTn>
-                        </p:par>
-                      </p:childTnLst>
-                    </p:cTn>
-                  </p:par>
-                </p:childTnLst>
-              </p:cTn>
-              <p:prevCondLst>
-                <p:cond evt="onPrev" delay="0">
-                  <p:tgtEl>
-                    <p:sldTgt/>
-                  </p:tgtEl>
-                </p:cond>
-              </p:prevCondLst>
-              <p:nextCondLst>
-                <p:cond evt="onNext" delay="0">
-                  <p:tgtEl>
-                    <p:sldTgt/>
-                  </p:tgtEl>
-                </p:cond>
-              </p:nextCondLst>
-            </p:seq>
-          </p:childTnLst>
-        </p:cTn>
       </p:par>
     </p:tnLst>
   </p:timing>
@@ -10361,36 +8418,6 @@
           <p:nvPr/>
         </p:nvPicPr>
         <p:blipFill>
-          <a:blip r:embed="rId2">
-            <a:extLst>
-              <a:ext uri="{28A0092B-C50C-407E-A947-70E740481C1C}">
-                <a14:useLocalDpi xmlns:a14="http://schemas.microsoft.com/office/drawing/2010/main" val="0"/>
-              </a:ext>
-            </a:extLst>
-          </a:blip>
-          <a:stretch>
-            <a:fillRect/>
-          </a:stretch>
-        </p:blipFill>
-        <p:spPr>
-          <a:xfrm>
-            <a:off x="3525911" y="2111017"/>
-            <a:ext cx="6090247" cy="2107691"/>
-          </a:xfrm>
-          <a:prstGeom prst="rect">
-            <a:avLst/>
-          </a:prstGeom>
-        </p:spPr>
-      </p:pic>
-      <p:pic>
-        <p:nvPicPr>
-          <p:cNvPr id="4" name="Imagen 3"/>
-          <p:cNvPicPr>
-            <a:picLocks noChangeAspect="1"/>
-          </p:cNvPicPr>
-          <p:nvPr/>
-        </p:nvPicPr>
-        <p:blipFill>
           <a:blip r:embed="rId3">
             <a:extLst>
               <a:ext uri="{28A0092B-C50C-407E-A947-70E740481C1C}">
@@ -10404,14 +8431,80 @@
         </p:blipFill>
         <p:spPr>
           <a:xfrm>
-            <a:off x="10273086" y="71854"/>
-            <a:ext cx="1735077" cy="2028491"/>
+            <a:off x="3525911" y="2111017"/>
+            <a:ext cx="6090247" cy="2107691"/>
           </a:xfrm>
           <a:prstGeom prst="rect">
             <a:avLst/>
           </a:prstGeom>
         </p:spPr>
       </p:pic>
+      <p:pic>
+        <p:nvPicPr>
+          <p:cNvPr id="4" name="Imagen 3"/>
+          <p:cNvPicPr>
+            <a:picLocks noChangeAspect="1"/>
+          </p:cNvPicPr>
+          <p:nvPr/>
+        </p:nvPicPr>
+        <p:blipFill>
+          <a:blip r:embed="rId4">
+            <a:extLst>
+              <a:ext uri="{28A0092B-C50C-407E-A947-70E740481C1C}">
+                <a14:useLocalDpi xmlns:a14="http://schemas.microsoft.com/office/drawing/2010/main" val="0"/>
+              </a:ext>
+            </a:extLst>
+          </a:blip>
+          <a:stretch>
+            <a:fillRect/>
+          </a:stretch>
+        </p:blipFill>
+        <p:spPr>
+          <a:xfrm>
+            <a:off x="10273086" y="71854"/>
+            <a:ext cx="1735077" cy="2028491"/>
+          </a:xfrm>
+          <a:prstGeom prst="rect">
+            <a:avLst/>
+          </a:prstGeom>
+        </p:spPr>
+      </p:pic>
+      <p:sp>
+        <p:nvSpPr>
+          <p:cNvPr id="5" name="Título 1"/>
+          <p:cNvSpPr>
+            <a:spLocks noGrp="1"/>
+          </p:cNvSpPr>
+          <p:nvPr>
+            <p:ph type="title"/>
+          </p:nvPr>
+        </p:nvSpPr>
+        <p:spPr>
+          <a:xfrm>
+            <a:off x="-1137663" y="4863548"/>
+            <a:ext cx="10364452" cy="1235104"/>
+          </a:xfrm>
+        </p:spPr>
+        <p:txBody>
+          <a:bodyPr/>
+          <a:lstStyle/>
+          <a:p>
+            <a:r>
+              <a:rPr lang="es-ES" dirty="0" err="1" smtClean="0"/>
+              <a:t>Product</a:t>
+            </a:r>
+            <a:r>
+              <a:rPr lang="es-ES" dirty="0" smtClean="0"/>
+              <a:t> catalogue </a:t>
+            </a:r>
+            <a:r>
+              <a:rPr lang="es-ES" dirty="0" err="1" smtClean="0"/>
+              <a:t>microservice</a:t>
+            </a:r>
+            <a:endParaRPr lang="en-US" dirty="0"/>
+          </a:p>
+        </p:txBody>
+      </p:sp>
     </p:spTree>
     <p:extLst>
       <p:ext uri="{BB962C8B-B14F-4D97-AF65-F5344CB8AC3E}">
@@ -10451,7 +8544,7 @@
       </p:grpSpPr>
       <p:sp>
         <p:nvSpPr>
-          <p:cNvPr id="2" name="Title 1"/>
+          <p:cNvPr id="2" name="Título 1"/>
           <p:cNvSpPr>
             <a:spLocks noGrp="1"/>
           </p:cNvSpPr>
@@ -10459,378 +8552,256 @@
             <p:ph type="title"/>
           </p:nvPr>
         </p:nvSpPr>
-        <p:spPr/>
+        <p:spPr>
+          <a:xfrm>
+            <a:off x="913774" y="609600"/>
+            <a:ext cx="10364452" cy="1235104"/>
+          </a:xfrm>
+        </p:spPr>
         <p:txBody>
           <a:bodyPr/>
           <a:lstStyle/>
           <a:p>
             <a:r>
-              <a:rPr lang="es-ES_tradnl" dirty="0" err="1" smtClean="0"/>
-              <a:t>Background</a:t>
-            </a:r>
-            <a:r>
-              <a:rPr lang="es-ES_tradnl" dirty="0" smtClean="0"/>
+              <a:rPr lang="es-ES" dirty="0" err="1" smtClean="0"/>
+              <a:t>What</a:t>
+            </a:r>
+            <a:r>
+              <a:rPr lang="es-ES" dirty="0" smtClean="0"/>
               <a:t> </a:t>
             </a:r>
             <a:r>
-              <a:rPr lang="es-ES_tradnl" dirty="0" err="1" smtClean="0"/>
-              <a:t>tasks</a:t>
-            </a:r>
-            <a:endParaRPr lang="en-GB" dirty="0"/>
-          </a:p>
-        </p:txBody>
-      </p:sp>
-      <p:sp>
-        <p:nvSpPr>
-          <p:cNvPr id="6" name="Rectangle 5"/>
-          <p:cNvSpPr/>
+              <a:rPr lang="es-ES" dirty="0" err="1" smtClean="0"/>
+              <a:t>we</a:t>
+            </a:r>
+            <a:r>
+              <a:rPr lang="es-ES" dirty="0" smtClean="0"/>
+              <a:t> </a:t>
+            </a:r>
+            <a:r>
+              <a:rPr lang="es-ES" dirty="0" err="1" smtClean="0"/>
+              <a:t>have</a:t>
+            </a:r>
+            <a:r>
+              <a:rPr lang="es-ES" dirty="0" smtClean="0"/>
+              <a:t> </a:t>
+            </a:r>
+            <a:r>
+              <a:rPr lang="es-ES" dirty="0" err="1" smtClean="0"/>
+              <a:t>seen</a:t>
+            </a:r>
+            <a:r>
+              <a:rPr lang="es-ES" dirty="0" smtClean="0"/>
+              <a:t> so </a:t>
+            </a:r>
+            <a:r>
+              <a:rPr lang="es-ES" dirty="0" err="1" smtClean="0"/>
+              <a:t>far</a:t>
+            </a:r>
+            <a:endParaRPr lang="en-US" dirty="0"/>
+          </a:p>
+        </p:txBody>
+      </p:sp>
+      <p:sp>
+        <p:nvSpPr>
+          <p:cNvPr id="3" name="Marcador de texto 2"/>
+          <p:cNvSpPr>
+            <a:spLocks noGrp="1"/>
+          </p:cNvSpPr>
+          <p:nvPr>
+            <p:ph type="body" sz="half" idx="2"/>
+          </p:nvPr>
+        </p:nvSpPr>
+        <p:spPr>
+          <a:xfrm>
+            <a:off x="913775" y="1693628"/>
+            <a:ext cx="10364452" cy="4097573"/>
+          </a:xfrm>
+        </p:spPr>
+        <p:txBody>
+          <a:bodyPr/>
+          <a:lstStyle/>
+          <a:p>
+            <a:pPr marL="342900" indent="-342900" algn="l">
+              <a:buFont typeface="Arial" panose="020B0604020202020204" pitchFamily="34" charset="0"/>
+              <a:buChar char="•"/>
+            </a:pPr>
+            <a:r>
+              <a:rPr lang="es-ES" sz="2000" dirty="0" err="1" smtClean="0"/>
+              <a:t>Modules,routes</a:t>
+            </a:r>
+            <a:r>
+              <a:rPr lang="es-ES" sz="2000" dirty="0" smtClean="0"/>
+              <a:t> and http </a:t>
+            </a:r>
+            <a:r>
+              <a:rPr lang="es-ES" sz="2000" dirty="0" err="1" smtClean="0"/>
+              <a:t>vervbs</a:t>
+            </a:r>
+            <a:endParaRPr lang="es-ES" sz="2000" dirty="0" smtClean="0"/>
+          </a:p>
+          <a:p>
+            <a:pPr marL="342900" indent="-342900" algn="l">
+              <a:buFont typeface="Arial" panose="020B0604020202020204" pitchFamily="34" charset="0"/>
+              <a:buChar char="•"/>
+            </a:pPr>
+            <a:r>
+              <a:rPr lang="es-ES" sz="2000" dirty="0" smtClean="0"/>
+              <a:t>ROUTE </a:t>
+            </a:r>
+            <a:r>
+              <a:rPr lang="es-ES" sz="2000" dirty="0" err="1" smtClean="0"/>
+              <a:t>parameters</a:t>
+            </a:r>
+            <a:r>
+              <a:rPr lang="es-ES" sz="2000" dirty="0" smtClean="0"/>
+              <a:t> and </a:t>
+            </a:r>
+            <a:r>
+              <a:rPr lang="es-ES" sz="2000" dirty="0" err="1" smtClean="0"/>
+              <a:t>query</a:t>
+            </a:r>
+            <a:r>
+              <a:rPr lang="es-ES" sz="2000" dirty="0" smtClean="0"/>
+              <a:t> </a:t>
+            </a:r>
+            <a:r>
+              <a:rPr lang="es-ES" sz="2000" dirty="0" err="1" smtClean="0"/>
+              <a:t>string</a:t>
+            </a:r>
+            <a:r>
+              <a:rPr lang="es-ES" sz="2000" dirty="0" smtClean="0"/>
+              <a:t> </a:t>
+            </a:r>
+            <a:r>
+              <a:rPr lang="es-ES" sz="2000" dirty="0" err="1" smtClean="0"/>
+              <a:t>parameters</a:t>
+            </a:r>
+            <a:endParaRPr lang="es-ES" sz="2000" dirty="0" smtClean="0"/>
+          </a:p>
+          <a:p>
+            <a:pPr marL="342900" indent="-342900" algn="l">
+              <a:buFont typeface="Arial" panose="020B0604020202020204" pitchFamily="34" charset="0"/>
+              <a:buChar char="•"/>
+            </a:pPr>
+            <a:r>
+              <a:rPr lang="es-ES" sz="2000" dirty="0" err="1" smtClean="0"/>
+              <a:t>Model</a:t>
+            </a:r>
+            <a:r>
+              <a:rPr lang="es-ES" sz="2000" dirty="0" smtClean="0"/>
+              <a:t> </a:t>
+            </a:r>
+            <a:r>
+              <a:rPr lang="es-ES" sz="2000" dirty="0" err="1" smtClean="0"/>
+              <a:t>binding</a:t>
+            </a:r>
+            <a:endParaRPr lang="es-ES" sz="2000" dirty="0" smtClean="0"/>
+          </a:p>
+          <a:p>
+            <a:pPr marL="342900" indent="-342900" algn="l">
+              <a:buFont typeface="Arial" panose="020B0604020202020204" pitchFamily="34" charset="0"/>
+              <a:buChar char="•"/>
+            </a:pPr>
+            <a:r>
+              <a:rPr lang="es-ES" sz="2000" dirty="0" smtClean="0"/>
+              <a:t>Content </a:t>
+            </a:r>
+            <a:r>
+              <a:rPr lang="es-ES" sz="2000" dirty="0" err="1" smtClean="0"/>
+              <a:t>negociation</a:t>
+            </a:r>
+            <a:endParaRPr lang="es-ES" sz="2000" dirty="0" smtClean="0"/>
+          </a:p>
+          <a:p>
+            <a:pPr marL="342900" indent="-342900" algn="l">
+              <a:buFont typeface="Arial" panose="020B0604020202020204" pitchFamily="34" charset="0"/>
+              <a:buChar char="•"/>
+            </a:pPr>
+            <a:r>
+              <a:rPr lang="es-ES" sz="2000" dirty="0" err="1" smtClean="0"/>
+              <a:t>Dependency</a:t>
+            </a:r>
+            <a:r>
+              <a:rPr lang="es-ES" sz="2000" dirty="0" smtClean="0"/>
+              <a:t> </a:t>
+            </a:r>
+            <a:r>
+              <a:rPr lang="es-ES" sz="2000" dirty="0" err="1" smtClean="0"/>
+              <a:t>injection</a:t>
+            </a:r>
+            <a:endParaRPr lang="es-ES" sz="2000" dirty="0" smtClean="0"/>
+          </a:p>
+          <a:p>
+            <a:pPr marL="342900" indent="-342900" algn="l">
+              <a:buFont typeface="Arial" panose="020B0604020202020204" pitchFamily="34" charset="0"/>
+              <a:buChar char="•"/>
+            </a:pPr>
+            <a:r>
+              <a:rPr lang="es-ES" sz="2000" dirty="0" smtClean="0"/>
+              <a:t>Module </a:t>
+            </a:r>
+            <a:r>
+              <a:rPr lang="es-ES" sz="2000" dirty="0" err="1" smtClean="0"/>
+              <a:t>hooks</a:t>
+            </a:r>
+            <a:endParaRPr lang="es-ES" sz="2000" dirty="0" smtClean="0"/>
+          </a:p>
+          <a:p>
+            <a:pPr marL="342900" indent="-342900" algn="l">
+              <a:buFont typeface="Arial" panose="020B0604020202020204" pitchFamily="34" charset="0"/>
+              <a:buChar char="•"/>
+            </a:pPr>
+            <a:r>
+              <a:rPr lang="es-ES" sz="2000" dirty="0" err="1" smtClean="0"/>
+              <a:t>Asynchronous</a:t>
+            </a:r>
+            <a:r>
+              <a:rPr lang="es-ES" sz="2000" dirty="0" smtClean="0"/>
+              <a:t> </a:t>
+            </a:r>
+            <a:r>
+              <a:rPr lang="es-ES" sz="2000" dirty="0" err="1" smtClean="0"/>
+              <a:t>actions</a:t>
+            </a:r>
+            <a:endParaRPr lang="en-US" dirty="0"/>
+          </a:p>
+        </p:txBody>
+      </p:sp>
+      <p:pic>
+        <p:nvPicPr>
+          <p:cNvPr id="4" name="Imagen 3"/>
+          <p:cNvPicPr>
+            <a:picLocks noChangeAspect="1"/>
+          </p:cNvPicPr>
           <p:nvPr/>
-        </p:nvSpPr>
-        <p:spPr>
-          <a:xfrm>
-            <a:off x="913775" y="1840621"/>
-            <a:ext cx="9955116" cy="5078313"/>
+        </p:nvPicPr>
+        <p:blipFill>
+          <a:blip r:embed="rId2">
+            <a:extLst>
+              <a:ext uri="{28A0092B-C50C-407E-A947-70E740481C1C}">
+                <a14:useLocalDpi xmlns:a14="http://schemas.microsoft.com/office/drawing/2010/main" val="0"/>
+              </a:ext>
+            </a:extLst>
+          </a:blip>
+          <a:stretch>
+            <a:fillRect/>
+          </a:stretch>
+        </p:blipFill>
+        <p:spPr>
+          <a:xfrm>
+            <a:off x="10281037" y="95708"/>
+            <a:ext cx="1735077" cy="2028491"/>
           </a:xfrm>
           <a:prstGeom prst="rect">
             <a:avLst/>
           </a:prstGeom>
         </p:spPr>
-        <p:txBody>
-          <a:bodyPr wrap="square">
-            <a:spAutoFit/>
-          </a:bodyPr>
-          <a:lstStyle/>
-          <a:p>
-            <a:r>
-              <a:rPr lang="es-ES" b="1" dirty="0" err="1" smtClean="0"/>
-              <a:t>Sorts</a:t>
-            </a:r>
-            <a:r>
-              <a:rPr lang="es-ES" b="1" dirty="0" smtClean="0"/>
-              <a:t> of </a:t>
-            </a:r>
-            <a:r>
-              <a:rPr lang="es-ES" b="1" dirty="0" err="1" smtClean="0"/>
-              <a:t>background</a:t>
-            </a:r>
-            <a:r>
-              <a:rPr lang="es-ES" b="1" dirty="0" smtClean="0"/>
-              <a:t> </a:t>
-            </a:r>
-            <a:r>
-              <a:rPr lang="es-ES" b="1" dirty="0" err="1" smtClean="0"/>
-              <a:t>tasks</a:t>
-            </a:r>
-            <a:endParaRPr lang="es-ES" b="1" dirty="0"/>
-          </a:p>
-          <a:p>
-            <a:endParaRPr lang="es-ES" dirty="0" smtClean="0"/>
-          </a:p>
-          <a:p>
-            <a:pPr marL="285750" indent="-285750">
-              <a:buFont typeface="Arial" panose="020B0604020202020204" pitchFamily="34" charset="0"/>
-              <a:buChar char="•"/>
-            </a:pPr>
-            <a:endParaRPr lang="es-ES" dirty="0" smtClean="0"/>
-          </a:p>
-          <a:p>
-            <a:pPr marL="285750" indent="-285750">
-              <a:buFont typeface="Arial" panose="020B0604020202020204" pitchFamily="34" charset="0"/>
-              <a:buChar char="•"/>
-            </a:pPr>
-            <a:r>
-              <a:rPr lang="es-ES" dirty="0" err="1" smtClean="0"/>
-              <a:t>Fire</a:t>
-            </a:r>
-            <a:r>
-              <a:rPr lang="es-ES" dirty="0" smtClean="0"/>
-              <a:t> &amp; </a:t>
-            </a:r>
-            <a:r>
-              <a:rPr lang="es-ES" dirty="0" err="1" smtClean="0"/>
-              <a:t>Forget</a:t>
-            </a:r>
-            <a:endParaRPr lang="es-ES" dirty="0" smtClean="0"/>
-          </a:p>
-          <a:p>
-            <a:pPr marL="285750" indent="-285750">
-              <a:buFont typeface="Arial" panose="020B0604020202020204" pitchFamily="34" charset="0"/>
-              <a:buChar char="•"/>
-            </a:pPr>
-            <a:endParaRPr lang="es-ES" dirty="0" smtClean="0"/>
-          </a:p>
-          <a:p>
-            <a:pPr marL="742950" lvl="1" indent="-285750">
-              <a:buFont typeface="Arial" panose="020B0604020202020204" pitchFamily="34" charset="0"/>
-              <a:buChar char="•"/>
-            </a:pPr>
-            <a:r>
-              <a:rPr lang="es-ES" dirty="0" err="1"/>
-              <a:t>Send</a:t>
-            </a:r>
-            <a:r>
-              <a:rPr lang="es-ES" dirty="0"/>
-              <a:t> </a:t>
-            </a:r>
-            <a:r>
-              <a:rPr lang="es-ES" dirty="0" err="1"/>
-              <a:t>an</a:t>
-            </a:r>
-            <a:r>
-              <a:rPr lang="es-ES" dirty="0"/>
-              <a:t> email </a:t>
-            </a:r>
-            <a:r>
-              <a:rPr lang="es-ES" dirty="0" err="1"/>
-              <a:t>due</a:t>
-            </a:r>
-            <a:r>
-              <a:rPr lang="es-ES" dirty="0"/>
-              <a:t> to </a:t>
-            </a:r>
-            <a:r>
-              <a:rPr lang="es-ES" dirty="0" err="1"/>
-              <a:t>an</a:t>
-            </a:r>
-            <a:r>
-              <a:rPr lang="es-ES" dirty="0"/>
-              <a:t> </a:t>
-            </a:r>
-            <a:r>
-              <a:rPr lang="es-ES" dirty="0" err="1"/>
-              <a:t>action</a:t>
-            </a:r>
-            <a:endParaRPr lang="es-ES" dirty="0"/>
-          </a:p>
-          <a:p>
-            <a:pPr marL="285750" indent="-285750">
-              <a:buFont typeface="Arial" panose="020B0604020202020204" pitchFamily="34" charset="0"/>
-              <a:buChar char="•"/>
-            </a:pPr>
-            <a:endParaRPr lang="es-ES" dirty="0"/>
-          </a:p>
-          <a:p>
-            <a:pPr marL="285750" indent="-285750">
-              <a:buFont typeface="Arial" panose="020B0604020202020204" pitchFamily="34" charset="0"/>
-              <a:buChar char="•"/>
-            </a:pPr>
-            <a:r>
-              <a:rPr lang="es-ES" dirty="0" err="1" smtClean="0"/>
-              <a:t>Delayed</a:t>
-            </a:r>
-            <a:endParaRPr lang="es-ES" dirty="0" smtClean="0"/>
-          </a:p>
-          <a:p>
-            <a:pPr marL="285750" indent="-285750">
-              <a:buFont typeface="Arial" panose="020B0604020202020204" pitchFamily="34" charset="0"/>
-              <a:buChar char="•"/>
-            </a:pPr>
-            <a:endParaRPr lang="es-ES" dirty="0" smtClean="0"/>
-          </a:p>
-          <a:p>
-            <a:pPr marL="742950" lvl="1" indent="-285750">
-              <a:buFont typeface="Arial" panose="020B0604020202020204" pitchFamily="34" charset="0"/>
-              <a:buChar char="•"/>
-            </a:pPr>
-            <a:r>
-              <a:rPr lang="es-ES" dirty="0" err="1" smtClean="0"/>
-              <a:t>Automatic</a:t>
-            </a:r>
-            <a:r>
-              <a:rPr lang="es-ES" dirty="0" smtClean="0"/>
-              <a:t> </a:t>
-            </a:r>
-            <a:r>
-              <a:rPr lang="es-ES" dirty="0" err="1" smtClean="0"/>
-              <a:t>subscription</a:t>
-            </a:r>
-            <a:r>
-              <a:rPr lang="es-ES" dirty="0" smtClean="0"/>
-              <a:t> </a:t>
-            </a:r>
-            <a:r>
-              <a:rPr lang="es-ES" dirty="0" err="1" smtClean="0"/>
-              <a:t>renewal</a:t>
-            </a:r>
-            <a:endParaRPr lang="es-ES" dirty="0"/>
-          </a:p>
-          <a:p>
-            <a:pPr marL="285750" indent="-285750">
-              <a:buFont typeface="Arial" panose="020B0604020202020204" pitchFamily="34" charset="0"/>
-              <a:buChar char="•"/>
-            </a:pPr>
-            <a:endParaRPr lang="es-ES" dirty="0"/>
-          </a:p>
-          <a:p>
-            <a:pPr marL="285750" indent="-285750">
-              <a:buFont typeface="Arial" panose="020B0604020202020204" pitchFamily="34" charset="0"/>
-              <a:buChar char="•"/>
-            </a:pPr>
-            <a:r>
-              <a:rPr lang="es-ES" dirty="0" err="1" smtClean="0"/>
-              <a:t>Periodic</a:t>
-            </a:r>
-            <a:r>
-              <a:rPr lang="es-ES" dirty="0" smtClean="0"/>
-              <a:t> &amp; </a:t>
-            </a:r>
-            <a:r>
-              <a:rPr lang="es-ES" dirty="0" err="1" smtClean="0"/>
-              <a:t>schedulled</a:t>
-            </a:r>
-            <a:endParaRPr lang="es-ES" dirty="0" smtClean="0"/>
-          </a:p>
-          <a:p>
-            <a:pPr marL="285750" indent="-285750">
-              <a:buFont typeface="Arial" panose="020B0604020202020204" pitchFamily="34" charset="0"/>
-              <a:buChar char="•"/>
-            </a:pPr>
-            <a:endParaRPr lang="es-ES" dirty="0"/>
-          </a:p>
-          <a:p>
-            <a:pPr marL="742950" lvl="1" indent="-285750">
-              <a:buFont typeface="Arial" panose="020B0604020202020204" pitchFamily="34" charset="0"/>
-              <a:buChar char="•"/>
-            </a:pPr>
-            <a:r>
-              <a:rPr lang="es-ES" dirty="0" err="1"/>
-              <a:t>Invoice</a:t>
-            </a:r>
-            <a:r>
-              <a:rPr lang="es-ES" dirty="0"/>
-              <a:t> </a:t>
-            </a:r>
-            <a:r>
-              <a:rPr lang="es-ES" dirty="0" err="1"/>
-              <a:t>generation</a:t>
-            </a:r>
-            <a:r>
-              <a:rPr lang="es-ES" dirty="0"/>
-              <a:t> at </a:t>
-            </a:r>
-            <a:r>
-              <a:rPr lang="es-ES" dirty="0" err="1"/>
-              <a:t>the</a:t>
-            </a:r>
-            <a:r>
-              <a:rPr lang="es-ES" dirty="0"/>
-              <a:t> </a:t>
-            </a:r>
-            <a:r>
-              <a:rPr lang="es-ES" dirty="0" err="1"/>
-              <a:t>end</a:t>
-            </a:r>
-            <a:r>
-              <a:rPr lang="es-ES" dirty="0"/>
-              <a:t> of </a:t>
-            </a:r>
-            <a:r>
-              <a:rPr lang="es-ES" dirty="0" err="1"/>
-              <a:t>very</a:t>
-            </a:r>
-            <a:r>
-              <a:rPr lang="es-ES" dirty="0"/>
-              <a:t> </a:t>
-            </a:r>
-            <a:r>
-              <a:rPr lang="es-ES" dirty="0" err="1"/>
-              <a:t>billing</a:t>
-            </a:r>
-            <a:r>
-              <a:rPr lang="es-ES" dirty="0"/>
-              <a:t> </a:t>
-            </a:r>
-            <a:r>
-              <a:rPr lang="es-ES" dirty="0" err="1"/>
-              <a:t>period</a:t>
-            </a:r>
-            <a:endParaRPr lang="es-ES" dirty="0"/>
-          </a:p>
-          <a:p>
-            <a:pPr marL="742950" lvl="1" indent="-285750">
-              <a:buFont typeface="Arial" panose="020B0604020202020204" pitchFamily="34" charset="0"/>
-              <a:buChar char="•"/>
-            </a:pPr>
-            <a:endParaRPr lang="es-ES" dirty="0"/>
-          </a:p>
-          <a:p>
-            <a:pPr marL="285750" indent="-285750">
-              <a:buFont typeface="Arial" panose="020B0604020202020204" pitchFamily="34" charset="0"/>
-              <a:buChar char="•"/>
-            </a:pPr>
-            <a:endParaRPr lang="es-ES" dirty="0"/>
-          </a:p>
-          <a:p>
-            <a:pPr marL="285750" indent="-285750">
-              <a:buFont typeface="Arial" panose="020B0604020202020204" pitchFamily="34" charset="0"/>
-              <a:buChar char="•"/>
-            </a:pPr>
-            <a:endParaRPr lang="es-ES" dirty="0" smtClean="0"/>
-          </a:p>
-          <a:p>
-            <a:endParaRPr lang="en-GB" dirty="0"/>
-          </a:p>
-        </p:txBody>
-      </p:sp>
-      <p:sp>
-        <p:nvSpPr>
-          <p:cNvPr id="3" name="Rectangle 2"/>
-          <p:cNvSpPr/>
-          <p:nvPr/>
-        </p:nvSpPr>
-        <p:spPr>
-          <a:xfrm>
-            <a:off x="7177227" y="4297371"/>
-            <a:ext cx="2847254" cy="923330"/>
-          </a:xfrm>
-          <a:prstGeom prst="rect">
-            <a:avLst/>
-          </a:prstGeom>
-          <a:noFill/>
-        </p:spPr>
-        <p:txBody>
-          <a:bodyPr wrap="none" lIns="91440" tIns="45720" rIns="91440" bIns="45720">
-            <a:spAutoFit/>
-          </a:bodyPr>
-          <a:lstStyle/>
-          <a:p>
-            <a:pPr algn="ctr"/>
-            <a:r>
-              <a:rPr lang="en-US" sz="5400" b="0" cap="none" spc="0" dirty="0" smtClean="0">
-                <a:ln w="0"/>
-                <a:solidFill>
-                  <a:schemeClr val="accent1"/>
-                </a:solidFill>
-                <a:effectLst>
-                  <a:outerShdw blurRad="38100" dist="25400" dir="5400000" algn="ctr" rotWithShape="0">
-                    <a:srgbClr val="6E747A">
-                      <a:alpha val="43000"/>
-                    </a:srgbClr>
-                  </a:outerShdw>
-                </a:effectLst>
-              </a:rPr>
-              <a:t>How to?</a:t>
-            </a:r>
-            <a:endParaRPr lang="en-US" sz="5400" b="0" cap="none" spc="0" dirty="0">
-              <a:ln w="0"/>
-              <a:solidFill>
-                <a:schemeClr val="accent1"/>
-              </a:solidFill>
-              <a:effectLst>
-                <a:outerShdw blurRad="38100" dist="25400" dir="5400000" algn="ctr" rotWithShape="0">
-                  <a:srgbClr val="6E747A">
-                    <a:alpha val="43000"/>
-                  </a:srgbClr>
-                </a:outerShdw>
-              </a:effectLst>
-            </a:endParaRPr>
-          </a:p>
-        </p:txBody>
-      </p:sp>
+      </p:pic>
     </p:spTree>
     <p:extLst>
       <p:ext uri="{BB962C8B-B14F-4D97-AF65-F5344CB8AC3E}">
-        <p14:creationId xmlns:p14="http://schemas.microsoft.com/office/powerpoint/2010/main" val="2902302318"/>
+        <p14:creationId xmlns:p14="http://schemas.microsoft.com/office/powerpoint/2010/main" val="3353158677"/>
       </p:ext>
     </p:extLst>
   </p:cSld>

</xml_diff>

<commit_message>
Added UI module and tests
</commit_message>
<xml_diff>
--- a/nancyFx.pptx
+++ b/nancyFx.pptx
@@ -5,7 +5,7 @@
     <p:sldMasterId id="2147483648" r:id="rId1"/>
   </p:sldMasterIdLst>
   <p:notesMasterIdLst>
-    <p:notesMasterId r:id="rId16"/>
+    <p:notesMasterId r:id="rId18"/>
   </p:notesMasterIdLst>
   <p:sldIdLst>
     <p:sldId id="256" r:id="rId2"/>
@@ -20,8 +20,10 @@
     <p:sldId id="283" r:id="rId11"/>
     <p:sldId id="284" r:id="rId12"/>
     <p:sldId id="282" r:id="rId13"/>
-    <p:sldId id="266" r:id="rId14"/>
-    <p:sldId id="269" r:id="rId15"/>
+    <p:sldId id="285" r:id="rId14"/>
+    <p:sldId id="286" r:id="rId15"/>
+    <p:sldId id="269" r:id="rId16"/>
+    <p:sldId id="266" r:id="rId17"/>
   </p:sldIdLst>
   <p:sldSz cx="12192000" cy="6858000"/>
   <p:notesSz cx="6858000" cy="9144000"/>
@@ -210,7 +212,7 @@
           <a:p>
             <a:fld id="{C328CA5A-09E4-4726-8295-C267034F4634}" type="datetimeFigureOut">
               <a:rPr lang="en-US" smtClean="0"/>
-              <a:t>1/2/2017</a:t>
+              <a:t>1/9/2017</a:t>
             </a:fld>
             <a:endParaRPr lang="en-US"/>
           </a:p>
@@ -369,7 +371,7 @@
           <a:p>
             <a:fld id="{D747081D-8EB8-4652-8843-002442BDA9DD}" type="slidenum">
               <a:rPr lang="en-US" smtClean="0"/>
-              <a:t>‹Nº›</a:t>
+              <a:t>‹#›</a:t>
             </a:fld>
             <a:endParaRPr lang="en-US"/>
           </a:p>
@@ -1333,7 +1335,7 @@
           <a:p>
             <a:fld id="{48A87A34-81AB-432B-8DAE-1953F412C126}" type="datetimeFigureOut">
               <a:rPr lang="en-US" dirty="0"/>
-              <a:t>1/2/2017</a:t>
+              <a:t>1/9/2017</a:t>
             </a:fld>
             <a:endParaRPr lang="en-US" dirty="0"/>
           </a:p>
@@ -1375,7 +1377,7 @@
           <a:p>
             <a:fld id="{6D22F896-40B5-4ADD-8801-0D06FADFA095}" type="slidenum">
               <a:rPr lang="en-US" dirty="0"/>
-              <a:t>‹Nº›</a:t>
+              <a:t>‹#›</a:t>
             </a:fld>
             <a:endParaRPr lang="en-US" dirty="0"/>
           </a:p>
@@ -1640,7 +1642,7 @@
           <a:p>
             <a:fld id="{48A87A34-81AB-432B-8DAE-1953F412C126}" type="datetimeFigureOut">
               <a:rPr lang="en-US" dirty="0"/>
-              <a:t>1/2/2017</a:t>
+              <a:t>1/9/2017</a:t>
             </a:fld>
             <a:endParaRPr lang="en-US" dirty="0"/>
           </a:p>
@@ -1682,7 +1684,7 @@
           <a:p>
             <a:fld id="{6D22F896-40B5-4ADD-8801-0D06FADFA095}" type="slidenum">
               <a:rPr lang="en-US" dirty="0"/>
-              <a:t>‹Nº›</a:t>
+              <a:t>‹#›</a:t>
             </a:fld>
             <a:endParaRPr lang="en-US" dirty="0"/>
           </a:p>
@@ -1857,7 +1859,7 @@
           <a:p>
             <a:fld id="{48A87A34-81AB-432B-8DAE-1953F412C126}" type="datetimeFigureOut">
               <a:rPr lang="en-US" dirty="0"/>
-              <a:t>1/2/2017</a:t>
+              <a:t>1/9/2017</a:t>
             </a:fld>
             <a:endParaRPr lang="en-US" dirty="0"/>
           </a:p>
@@ -1899,7 +1901,7 @@
           <a:p>
             <a:fld id="{6D22F896-40B5-4ADD-8801-0D06FADFA095}" type="slidenum">
               <a:rPr lang="en-US" dirty="0"/>
-              <a:t>‹Nº›</a:t>
+              <a:t>‹#›</a:t>
             </a:fld>
             <a:endParaRPr lang="en-US" dirty="0"/>
           </a:p>
@@ -2143,7 +2145,7 @@
           <a:p>
             <a:fld id="{48A87A34-81AB-432B-8DAE-1953F412C126}" type="datetimeFigureOut">
               <a:rPr lang="en-US" dirty="0"/>
-              <a:t>1/2/2017</a:t>
+              <a:t>1/9/2017</a:t>
             </a:fld>
             <a:endParaRPr lang="en-US" dirty="0"/>
           </a:p>
@@ -2185,7 +2187,7 @@
           <a:p>
             <a:fld id="{6D22F896-40B5-4ADD-8801-0D06FADFA095}" type="slidenum">
               <a:rPr lang="en-US" dirty="0"/>
-              <a:t>‹Nº›</a:t>
+              <a:t>‹#›</a:t>
             </a:fld>
             <a:endParaRPr lang="en-US" dirty="0"/>
           </a:p>
@@ -2592,7 +2594,7 @@
           <a:p>
             <a:fld id="{48A87A34-81AB-432B-8DAE-1953F412C126}" type="datetimeFigureOut">
               <a:rPr lang="en-US" dirty="0"/>
-              <a:t>1/2/2017</a:t>
+              <a:t>1/9/2017</a:t>
             </a:fld>
             <a:endParaRPr lang="en-US" dirty="0"/>
           </a:p>
@@ -2634,7 +2636,7 @@
           <a:p>
             <a:fld id="{6D22F896-40B5-4ADD-8801-0D06FADFA095}" type="slidenum">
               <a:rPr lang="en-US" dirty="0"/>
-              <a:t>‹Nº›</a:t>
+              <a:t>‹#›</a:t>
             </a:fld>
             <a:endParaRPr lang="en-US" dirty="0"/>
           </a:p>
@@ -3163,7 +3165,7 @@
           <a:p>
             <a:fld id="{48A87A34-81AB-432B-8DAE-1953F412C126}" type="datetimeFigureOut">
               <a:rPr lang="en-US" dirty="0"/>
-              <a:t>1/2/2017</a:t>
+              <a:t>1/9/2017</a:t>
             </a:fld>
             <a:endParaRPr lang="en-US" dirty="0"/>
           </a:p>
@@ -3205,7 +3207,7 @@
           <a:p>
             <a:fld id="{6D22F896-40B5-4ADD-8801-0D06FADFA095}" type="slidenum">
               <a:rPr lang="en-US" dirty="0"/>
-              <a:t>‹Nº›</a:t>
+              <a:t>‹#›</a:t>
             </a:fld>
             <a:endParaRPr lang="en-US" dirty="0"/>
           </a:p>
@@ -4010,7 +4012,7 @@
           <a:p>
             <a:fld id="{48A87A34-81AB-432B-8DAE-1953F412C126}" type="datetimeFigureOut">
               <a:rPr lang="en-US" dirty="0"/>
-              <a:t>1/2/2017</a:t>
+              <a:t>1/9/2017</a:t>
             </a:fld>
             <a:endParaRPr lang="en-US" dirty="0"/>
           </a:p>
@@ -4052,7 +4054,7 @@
           <a:p>
             <a:fld id="{6D22F896-40B5-4ADD-8801-0D06FADFA095}" type="slidenum">
               <a:rPr lang="en-US" dirty="0"/>
-              <a:t>‹Nº›</a:t>
+              <a:t>‹#›</a:t>
             </a:fld>
             <a:endParaRPr lang="en-US" dirty="0"/>
           </a:p>
@@ -4210,7 +4212,7 @@
           <a:p>
             <a:fld id="{48A87A34-81AB-432B-8DAE-1953F412C126}" type="datetimeFigureOut">
               <a:rPr lang="en-US" dirty="0"/>
-              <a:t>1/2/2017</a:t>
+              <a:t>1/9/2017</a:t>
             </a:fld>
             <a:endParaRPr lang="en-US" dirty="0"/>
           </a:p>
@@ -4252,7 +4254,7 @@
           <a:p>
             <a:fld id="{6D22F896-40B5-4ADD-8801-0D06FADFA095}" type="slidenum">
               <a:rPr lang="en-US" dirty="0"/>
-              <a:t>‹Nº›</a:t>
+              <a:t>‹#›</a:t>
             </a:fld>
             <a:endParaRPr lang="en-US" dirty="0"/>
           </a:p>
@@ -4419,7 +4421,7 @@
           <a:p>
             <a:fld id="{48A87A34-81AB-432B-8DAE-1953F412C126}" type="datetimeFigureOut">
               <a:rPr lang="en-US" dirty="0"/>
-              <a:t>1/2/2017</a:t>
+              <a:t>1/9/2017</a:t>
             </a:fld>
             <a:endParaRPr lang="en-US" dirty="0"/>
           </a:p>
@@ -4461,7 +4463,7 @@
           <a:p>
             <a:fld id="{6D22F896-40B5-4ADD-8801-0D06FADFA095}" type="slidenum">
               <a:rPr lang="en-US" dirty="0"/>
-              <a:t>‹Nº›</a:t>
+              <a:t>‹#›</a:t>
             </a:fld>
             <a:endParaRPr lang="en-US" dirty="0"/>
           </a:p>
@@ -4619,7 +4621,7 @@
           <a:p>
             <a:fld id="{48A87A34-81AB-432B-8DAE-1953F412C126}" type="datetimeFigureOut">
               <a:rPr lang="en-US" dirty="0"/>
-              <a:t>1/2/2017</a:t>
+              <a:t>1/9/2017</a:t>
             </a:fld>
             <a:endParaRPr lang="en-US" dirty="0"/>
           </a:p>
@@ -4661,7 +4663,7 @@
           <a:p>
             <a:fld id="{6D22F896-40B5-4ADD-8801-0D06FADFA095}" type="slidenum">
               <a:rPr lang="en-US" dirty="0"/>
-              <a:t>‹Nº›</a:t>
+              <a:t>‹#›</a:t>
             </a:fld>
             <a:endParaRPr lang="en-US" dirty="0"/>
           </a:p>
@@ -4894,7 +4896,7 @@
           <a:p>
             <a:fld id="{48A87A34-81AB-432B-8DAE-1953F412C126}" type="datetimeFigureOut">
               <a:rPr lang="en-US" dirty="0"/>
-              <a:t>1/2/2017</a:t>
+              <a:t>1/9/2017</a:t>
             </a:fld>
             <a:endParaRPr lang="en-US" dirty="0"/>
           </a:p>
@@ -4936,7 +4938,7 @@
           <a:p>
             <a:fld id="{6D22F896-40B5-4ADD-8801-0D06FADFA095}" type="slidenum">
               <a:rPr lang="en-US" dirty="0"/>
-              <a:t>‹Nº›</a:t>
+              <a:t>‹#›</a:t>
             </a:fld>
             <a:endParaRPr lang="en-US" dirty="0"/>
           </a:p>
@@ -5156,7 +5158,7 @@
           <a:p>
             <a:fld id="{48A87A34-81AB-432B-8DAE-1953F412C126}" type="datetimeFigureOut">
               <a:rPr lang="en-US" dirty="0"/>
-              <a:t>1/2/2017</a:t>
+              <a:t>1/9/2017</a:t>
             </a:fld>
             <a:endParaRPr lang="en-US" dirty="0"/>
           </a:p>
@@ -5198,7 +5200,7 @@
           <a:p>
             <a:fld id="{6D22F896-40B5-4ADD-8801-0D06FADFA095}" type="slidenum">
               <a:rPr lang="en-US" dirty="0"/>
-              <a:t>‹Nº›</a:t>
+              <a:t>‹#›</a:t>
             </a:fld>
             <a:endParaRPr lang="en-US" dirty="0"/>
           </a:p>
@@ -5566,7 +5568,7 @@
           <a:p>
             <a:fld id="{48A87A34-81AB-432B-8DAE-1953F412C126}" type="datetimeFigureOut">
               <a:rPr lang="en-US" dirty="0"/>
-              <a:t>1/2/2017</a:t>
+              <a:t>1/9/2017</a:t>
             </a:fld>
             <a:endParaRPr lang="en-US" dirty="0"/>
           </a:p>
@@ -5608,7 +5610,7 @@
           <a:p>
             <a:fld id="{6D22F896-40B5-4ADD-8801-0D06FADFA095}" type="slidenum">
               <a:rPr lang="en-US" dirty="0"/>
-              <a:t>‹Nº›</a:t>
+              <a:t>‹#›</a:t>
             </a:fld>
             <a:endParaRPr lang="en-US" dirty="0"/>
           </a:p>
@@ -5709,7 +5711,7 @@
           <a:p>
             <a:fld id="{48A87A34-81AB-432B-8DAE-1953F412C126}" type="datetimeFigureOut">
               <a:rPr lang="en-US" dirty="0"/>
-              <a:t>1/2/2017</a:t>
+              <a:t>1/9/2017</a:t>
             </a:fld>
             <a:endParaRPr lang="en-US" dirty="0"/>
           </a:p>
@@ -5751,7 +5753,7 @@
           <a:p>
             <a:fld id="{6D22F896-40B5-4ADD-8801-0D06FADFA095}" type="slidenum">
               <a:rPr lang="en-US" dirty="0"/>
-              <a:t>‹Nº›</a:t>
+              <a:t>‹#›</a:t>
             </a:fld>
             <a:endParaRPr lang="en-US" dirty="0"/>
           </a:p>
@@ -5829,7 +5831,7 @@
           <a:p>
             <a:fld id="{48A87A34-81AB-432B-8DAE-1953F412C126}" type="datetimeFigureOut">
               <a:rPr lang="en-US" dirty="0"/>
-              <a:t>1/2/2017</a:t>
+              <a:t>1/9/2017</a:t>
             </a:fld>
             <a:endParaRPr lang="en-US" dirty="0"/>
           </a:p>
@@ -5871,7 +5873,7 @@
           <a:p>
             <a:fld id="{6D22F896-40B5-4ADD-8801-0D06FADFA095}" type="slidenum">
               <a:rPr lang="en-US" dirty="0"/>
-              <a:t>‹Nº›</a:t>
+              <a:t>‹#›</a:t>
             </a:fld>
             <a:endParaRPr lang="en-US" dirty="0"/>
           </a:p>
@@ -6103,7 +6105,7 @@
           <a:p>
             <a:fld id="{48A87A34-81AB-432B-8DAE-1953F412C126}" type="datetimeFigureOut">
               <a:rPr lang="en-US" dirty="0"/>
-              <a:t>1/2/2017</a:t>
+              <a:t>1/9/2017</a:t>
             </a:fld>
             <a:endParaRPr lang="en-US" dirty="0"/>
           </a:p>
@@ -6145,7 +6147,7 @@
           <a:p>
             <a:fld id="{6D22F896-40B5-4ADD-8801-0D06FADFA095}" type="slidenum">
               <a:rPr lang="en-US" dirty="0"/>
-              <a:t>‹Nº›</a:t>
+              <a:t>‹#›</a:t>
             </a:fld>
             <a:endParaRPr lang="en-US" dirty="0"/>
           </a:p>
@@ -6410,7 +6412,7 @@
           <a:p>
             <a:fld id="{48A87A34-81AB-432B-8DAE-1953F412C126}" type="datetimeFigureOut">
               <a:rPr lang="en-US" dirty="0"/>
-              <a:t>1/2/2017</a:t>
+              <a:t>1/9/2017</a:t>
             </a:fld>
             <a:endParaRPr lang="en-US" dirty="0"/>
           </a:p>
@@ -6452,7 +6454,7 @@
           <a:p>
             <a:fld id="{6D22F896-40B5-4ADD-8801-0D06FADFA095}" type="slidenum">
               <a:rPr lang="en-US" dirty="0"/>
-              <a:t>‹Nº›</a:t>
+              <a:t>‹#›</a:t>
             </a:fld>
             <a:endParaRPr lang="en-US" dirty="0"/>
           </a:p>
@@ -6659,7 +6661,7 @@
             <a:fld id="{48A87A34-81AB-432B-8DAE-1953F412C126}" type="datetimeFigureOut">
               <a:rPr lang="en-US" dirty="0"/>
               <a:pPr/>
-              <a:t>1/2/2017</a:t>
+              <a:t>1/9/2017</a:t>
             </a:fld>
             <a:endParaRPr lang="en-US" dirty="0"/>
           </a:p>
@@ -6734,7 +6736,7 @@
             <a:fld id="{6D22F896-40B5-4ADD-8801-0D06FADFA095}" type="slidenum">
               <a:rPr lang="en-US" dirty="0"/>
               <a:pPr/>
-              <a:t>‹Nº›</a:t>
+              <a:t>‹#›</a:t>
             </a:fld>
             <a:endParaRPr lang="en-US" dirty="0"/>
           </a:p>
@@ -7499,7 +7501,6 @@
               <a:rPr lang="es-ES" sz="2000" dirty="0" smtClean="0"/>
               <a:t> to test</a:t>
             </a:r>
-            <a:endParaRPr lang="es-ES" sz="2000" dirty="0" smtClean="0"/>
           </a:p>
           <a:p>
             <a:pPr marL="342900" indent="-342900" algn="l">
@@ -7512,7 +7513,7 @@
             </a:r>
             <a:r>
               <a:rPr lang="es-ES" sz="2000" dirty="0" smtClean="0"/>
-              <a:t> </a:t>
+              <a:t> CONFIGURABLE </a:t>
             </a:r>
             <a:r>
               <a:rPr lang="es-ES" sz="2000" dirty="0" err="1" smtClean="0"/>
@@ -7730,9 +7731,144 @@
           <a:chExt cx="0" cy="0"/>
         </a:xfrm>
       </p:grpSpPr>
+      <p:sp>
+        <p:nvSpPr>
+          <p:cNvPr id="2" name="Título 1"/>
+          <p:cNvSpPr>
+            <a:spLocks noGrp="1"/>
+          </p:cNvSpPr>
+          <p:nvPr>
+            <p:ph type="title"/>
+          </p:nvPr>
+        </p:nvSpPr>
+        <p:spPr>
+          <a:xfrm>
+            <a:off x="913774" y="609600"/>
+            <a:ext cx="10364452" cy="1235104"/>
+          </a:xfrm>
+        </p:spPr>
+        <p:txBody>
+          <a:bodyPr/>
+          <a:lstStyle/>
+          <a:p>
+            <a:r>
+              <a:rPr lang="es-ES" dirty="0" err="1" smtClean="0"/>
+              <a:t>What</a:t>
+            </a:r>
+            <a:r>
+              <a:rPr lang="es-ES" dirty="0" smtClean="0"/>
+              <a:t> </a:t>
+            </a:r>
+            <a:r>
+              <a:rPr lang="es-ES" dirty="0" err="1" smtClean="0"/>
+              <a:t>we</a:t>
+            </a:r>
+            <a:r>
+              <a:rPr lang="es-ES" dirty="0" smtClean="0"/>
+              <a:t> </a:t>
+            </a:r>
+            <a:r>
+              <a:rPr lang="es-ES" dirty="0" err="1" smtClean="0"/>
+              <a:t>have</a:t>
+            </a:r>
+            <a:r>
+              <a:rPr lang="es-ES" dirty="0" smtClean="0"/>
+              <a:t> </a:t>
+            </a:r>
+            <a:r>
+              <a:rPr lang="es-ES" dirty="0" err="1" smtClean="0"/>
+              <a:t>seen</a:t>
+            </a:r>
+            <a:r>
+              <a:rPr lang="es-ES" dirty="0" smtClean="0"/>
+              <a:t> so </a:t>
+            </a:r>
+            <a:r>
+              <a:rPr lang="es-ES" dirty="0" err="1" smtClean="0"/>
+              <a:t>far</a:t>
+            </a:r>
+            <a:endParaRPr lang="en-US" dirty="0"/>
+          </a:p>
+        </p:txBody>
+      </p:sp>
+      <p:sp>
+        <p:nvSpPr>
+          <p:cNvPr id="3" name="Marcador de texto 2"/>
+          <p:cNvSpPr>
+            <a:spLocks noGrp="1"/>
+          </p:cNvSpPr>
+          <p:nvPr>
+            <p:ph type="body" sz="half" idx="2"/>
+          </p:nvPr>
+        </p:nvSpPr>
+        <p:spPr>
+          <a:xfrm>
+            <a:off x="913775" y="1693628"/>
+            <a:ext cx="10364452" cy="4097573"/>
+          </a:xfrm>
+        </p:spPr>
+        <p:txBody>
+          <a:bodyPr/>
+          <a:lstStyle/>
+          <a:p>
+            <a:pPr marL="342900" indent="-342900" algn="l">
+              <a:buFont typeface="Arial" panose="020B0604020202020204" pitchFamily="34" charset="0"/>
+              <a:buChar char="•"/>
+            </a:pPr>
+            <a:r>
+              <a:rPr lang="es-ES" sz="2000" dirty="0" smtClean="0"/>
+              <a:t>THE </a:t>
+            </a:r>
+            <a:r>
+              <a:rPr lang="es-ES" sz="2000" dirty="0" err="1" smtClean="0"/>
+              <a:t>suPER</a:t>
+            </a:r>
+            <a:r>
+              <a:rPr lang="es-ES" sz="2000" dirty="0" smtClean="0"/>
+              <a:t> SIMPLE VIEW </a:t>
+            </a:r>
+            <a:r>
+              <a:rPr lang="es-ES" sz="2000" dirty="0" err="1" smtClean="0"/>
+              <a:t>ENgine</a:t>
+            </a:r>
+            <a:endParaRPr lang="es-ES" sz="2000" dirty="0" smtClean="0"/>
+          </a:p>
+          <a:p>
+            <a:pPr marL="342900" indent="-342900" algn="l">
+              <a:buFont typeface="Arial" panose="020B0604020202020204" pitchFamily="34" charset="0"/>
+              <a:buChar char="•"/>
+            </a:pPr>
+            <a:r>
+              <a:rPr lang="es-ES" sz="2000" dirty="0" err="1" smtClean="0"/>
+              <a:t>How</a:t>
+            </a:r>
+            <a:r>
+              <a:rPr lang="es-ES" sz="2000" dirty="0" smtClean="0"/>
+              <a:t> to </a:t>
+            </a:r>
+            <a:r>
+              <a:rPr lang="es-ES" sz="2000" dirty="0" err="1" smtClean="0"/>
+              <a:t>override</a:t>
+            </a:r>
+            <a:r>
+              <a:rPr lang="es-ES" sz="2000" dirty="0" smtClean="0"/>
+              <a:t> (configure) </a:t>
+            </a:r>
+            <a:r>
+              <a:rPr lang="es-ES" sz="2000" dirty="0" err="1" smtClean="0"/>
+              <a:t>conventions</a:t>
+            </a:r>
+            <a:r>
+              <a:rPr lang="es-ES" sz="2000" dirty="0" smtClean="0"/>
+              <a:t>: BOOTSTRAPPER</a:t>
+            </a:r>
+            <a:endParaRPr lang="en-US" dirty="0"/>
+          </a:p>
+        </p:txBody>
+      </p:sp>
       <p:pic>
         <p:nvPicPr>
-          <p:cNvPr id="2" name="Picture 1"/>
+          <p:cNvPr id="4" name="Imagen 3"/>
           <p:cNvPicPr>
             <a:picLocks noChangeAspect="1"/>
           </p:cNvPicPr>
@@ -7752,104 +7888,18 @@
         </p:blipFill>
         <p:spPr>
           <a:xfrm>
-            <a:off x="858982" y="1063770"/>
-            <a:ext cx="10165773" cy="4244210"/>
+            <a:off x="10281037" y="95708"/>
+            <a:ext cx="1735077" cy="2028491"/>
           </a:xfrm>
           <a:prstGeom prst="rect">
             <a:avLst/>
           </a:prstGeom>
         </p:spPr>
       </p:pic>
-      <p:sp>
-        <p:nvSpPr>
-          <p:cNvPr id="3" name="Rectangle 2"/>
-          <p:cNvSpPr/>
-          <p:nvPr/>
-        </p:nvSpPr>
-        <p:spPr>
-          <a:xfrm>
-            <a:off x="583192" y="5519943"/>
-            <a:ext cx="11222944" cy="1200329"/>
-          </a:xfrm>
-          <a:prstGeom prst="rect">
-            <a:avLst/>
-          </a:prstGeom>
-        </p:spPr>
-        <p:txBody>
-          <a:bodyPr wrap="none">
-            <a:spAutoFit/>
-          </a:bodyPr>
-          <a:lstStyle/>
-          <a:p>
-            <a:r>
-              <a:rPr lang="es-ES" b="1" dirty="0"/>
-              <a:t>"Yo... he visto cosas que vosotros no creeríais: Atacar naves en </a:t>
-            </a:r>
-            <a:r>
-              <a:rPr lang="es-ES" b="1" dirty="0" smtClean="0"/>
-              <a:t>llamas </a:t>
-            </a:r>
-            <a:r>
-              <a:rPr lang="es-ES" b="1" dirty="0"/>
-              <a:t>más allá de Orión. </a:t>
-            </a:r>
-            <a:endParaRPr lang="es-ES" b="1" dirty="0" smtClean="0"/>
-          </a:p>
-          <a:p>
-            <a:r>
-              <a:rPr lang="es-ES" b="1" dirty="0" smtClean="0"/>
-              <a:t>He </a:t>
-            </a:r>
-            <a:r>
-              <a:rPr lang="es-ES" b="1" dirty="0"/>
-              <a:t>visto rayos C brillar en la oscuridad cerca de la Puerta de </a:t>
-            </a:r>
-            <a:r>
-              <a:rPr lang="es-ES" b="1" dirty="0" err="1"/>
-              <a:t>Tannhäuser</a:t>
-            </a:r>
-            <a:r>
-              <a:rPr lang="es-ES" b="1" dirty="0"/>
-              <a:t>. </a:t>
-            </a:r>
-            <a:endParaRPr lang="es-ES" b="1" dirty="0" smtClean="0"/>
-          </a:p>
-          <a:p>
-            <a:r>
-              <a:rPr lang="es-ES" b="1" dirty="0" smtClean="0"/>
-              <a:t>Todos </a:t>
-            </a:r>
-            <a:r>
-              <a:rPr lang="es-ES" b="1" dirty="0"/>
-              <a:t>esos momentos se perderán... en el tiempo... como lágrimas en la lluvia. Es hora de morir"</a:t>
-            </a:r>
-            <a:r>
-              <a:rPr lang="es-ES" dirty="0"/>
-              <a:t> </a:t>
-            </a:r>
-            <a:endParaRPr lang="es-ES" dirty="0" smtClean="0"/>
-          </a:p>
-          <a:p>
-            <a:r>
-              <a:rPr lang="es-ES" dirty="0" smtClean="0"/>
-              <a:t>- </a:t>
-            </a:r>
-            <a:r>
-              <a:rPr lang="es-ES" dirty="0"/>
-              <a:t>Roy </a:t>
-            </a:r>
-            <a:r>
-              <a:rPr lang="es-ES" dirty="0" err="1"/>
-              <a:t>Batty</a:t>
-            </a:r>
-            <a:endParaRPr lang="en-GB" dirty="0"/>
-          </a:p>
-        </p:txBody>
-      </p:sp>
     </p:spTree>
     <p:extLst>
       <p:ext uri="{BB962C8B-B14F-4D97-AF65-F5344CB8AC3E}">
-        <p14:creationId xmlns:p14="http://schemas.microsoft.com/office/powerpoint/2010/main" val="2448366926"/>
+        <p14:creationId xmlns:p14="http://schemas.microsoft.com/office/powerpoint/2010/main" val="419076812"/>
       </p:ext>
     </p:extLst>
   </p:cSld>
@@ -7885,6 +7935,166 @@
       </p:grpSpPr>
       <p:sp>
         <p:nvSpPr>
+          <p:cNvPr id="2" name="Título 1"/>
+          <p:cNvSpPr>
+            <a:spLocks noGrp="1"/>
+          </p:cNvSpPr>
+          <p:nvPr>
+            <p:ph type="title"/>
+          </p:nvPr>
+        </p:nvSpPr>
+        <p:spPr>
+          <a:xfrm>
+            <a:off x="913774" y="609600"/>
+            <a:ext cx="10364452" cy="1235104"/>
+          </a:xfrm>
+        </p:spPr>
+        <p:txBody>
+          <a:bodyPr/>
+          <a:lstStyle/>
+          <a:p>
+            <a:r>
+              <a:rPr lang="es-ES" dirty="0" err="1" smtClean="0"/>
+              <a:t>What</a:t>
+            </a:r>
+            <a:r>
+              <a:rPr lang="es-ES" dirty="0" smtClean="0"/>
+              <a:t> </a:t>
+            </a:r>
+            <a:r>
+              <a:rPr lang="es-ES" dirty="0" err="1" smtClean="0"/>
+              <a:t>we</a:t>
+            </a:r>
+            <a:r>
+              <a:rPr lang="es-ES" dirty="0" smtClean="0"/>
+              <a:t> </a:t>
+            </a:r>
+            <a:r>
+              <a:rPr lang="es-ES" dirty="0" smtClean="0"/>
+              <a:t>MISSED?</a:t>
+            </a:r>
+            <a:endParaRPr lang="en-US" dirty="0"/>
+          </a:p>
+        </p:txBody>
+      </p:sp>
+      <p:sp>
+        <p:nvSpPr>
+          <p:cNvPr id="3" name="Marcador de texto 2"/>
+          <p:cNvSpPr>
+            <a:spLocks noGrp="1"/>
+          </p:cNvSpPr>
+          <p:nvPr>
+            <p:ph type="body" sz="half" idx="2"/>
+          </p:nvPr>
+        </p:nvSpPr>
+        <p:spPr>
+          <a:xfrm>
+            <a:off x="913775" y="1693628"/>
+            <a:ext cx="10364452" cy="4097573"/>
+          </a:xfrm>
+        </p:spPr>
+        <p:txBody>
+          <a:bodyPr/>
+          <a:lstStyle/>
+          <a:p>
+            <a:pPr marL="342900" indent="-342900" algn="l">
+              <a:buFont typeface="Arial" panose="020B0604020202020204" pitchFamily="34" charset="0"/>
+              <a:buChar char="•"/>
+            </a:pPr>
+            <a:r>
+              <a:rPr lang="es-ES" sz="2000" dirty="0" smtClean="0"/>
+              <a:t>VALIDATIONS</a:t>
+            </a:r>
+          </a:p>
+          <a:p>
+            <a:pPr marL="342900" indent="-342900" algn="l">
+              <a:buFont typeface="Arial" panose="020B0604020202020204" pitchFamily="34" charset="0"/>
+              <a:buChar char="•"/>
+            </a:pPr>
+            <a:r>
+              <a:rPr lang="es-ES" sz="2000" dirty="0" smtClean="0"/>
+              <a:t>AUTHENTICATION</a:t>
+            </a:r>
+            <a:endParaRPr lang="es-ES" sz="2000" dirty="0" smtClean="0"/>
+          </a:p>
+          <a:p>
+            <a:pPr marL="342900" indent="-342900" algn="l">
+              <a:buFont typeface="Arial" panose="020B0604020202020204" pitchFamily="34" charset="0"/>
+              <a:buChar char="•"/>
+            </a:pPr>
+            <a:endParaRPr lang="en-US" dirty="0"/>
+          </a:p>
+        </p:txBody>
+      </p:sp>
+      <p:pic>
+        <p:nvPicPr>
+          <p:cNvPr id="4" name="Imagen 3"/>
+          <p:cNvPicPr>
+            <a:picLocks noChangeAspect="1"/>
+          </p:cNvPicPr>
+          <p:nvPr/>
+        </p:nvPicPr>
+        <p:blipFill>
+          <a:blip r:embed="rId2">
+            <a:extLst>
+              <a:ext uri="{28A0092B-C50C-407E-A947-70E740481C1C}">
+                <a14:useLocalDpi xmlns:a14="http://schemas.microsoft.com/office/drawing/2010/main" val="0"/>
+              </a:ext>
+            </a:extLst>
+          </a:blip>
+          <a:stretch>
+            <a:fillRect/>
+          </a:stretch>
+        </p:blipFill>
+        <p:spPr>
+          <a:xfrm>
+            <a:off x="10281037" y="95708"/>
+            <a:ext cx="1735077" cy="2028491"/>
+          </a:xfrm>
+          <a:prstGeom prst="rect">
+            <a:avLst/>
+          </a:prstGeom>
+        </p:spPr>
+      </p:pic>
+    </p:spTree>
+    <p:extLst>
+      <p:ext uri="{BB962C8B-B14F-4D97-AF65-F5344CB8AC3E}">
+        <p14:creationId xmlns:p14="http://schemas.microsoft.com/office/powerpoint/2010/main" val="4069871460"/>
+      </p:ext>
+    </p:extLst>
+  </p:cSld>
+  <p:clrMapOvr>
+    <a:masterClrMapping/>
+  </p:clrMapOvr>
+  <p:timing>
+    <p:tnLst>
+      <p:par>
+        <p:cTn id="1" dur="indefinite" restart="never" nodeType="tmRoot"/>
+      </p:par>
+    </p:tnLst>
+  </p:timing>
+</p:sld>
+</file>
+
+<file path=ppt/slides/slide15.xml><?xml version="1.0" encoding="utf-8"?>
+<p:sld xmlns:a="http://schemas.openxmlformats.org/drawingml/2006/main" xmlns:r="http://schemas.openxmlformats.org/officeDocument/2006/relationships" xmlns:p="http://schemas.openxmlformats.org/presentationml/2006/main">
+  <p:cSld>
+    <p:spTree>
+      <p:nvGrpSpPr>
+        <p:cNvPr id="1" name=""/>
+        <p:cNvGrpSpPr/>
+        <p:nvPr/>
+      </p:nvGrpSpPr>
+      <p:grpSpPr>
+        <a:xfrm>
+          <a:off x="0" y="0"/>
+          <a:ext cx="0" cy="0"/>
+          <a:chOff x="0" y="0"/>
+          <a:chExt cx="0" cy="0"/>
+        </a:xfrm>
+      </p:grpSpPr>
+      <p:sp>
+        <p:nvSpPr>
           <p:cNvPr id="2" name="Title 1"/>
           <p:cNvSpPr>
             <a:spLocks noGrp="1"/>
@@ -7895,8 +8105,8 @@
         </p:nvSpPr>
         <p:spPr>
           <a:xfrm>
-            <a:off x="913775" y="85780"/>
-            <a:ext cx="10364451" cy="1596177"/>
+            <a:off x="913775" y="1"/>
+            <a:ext cx="10364451" cy="925829"/>
           </a:xfrm>
         </p:spPr>
         <p:txBody>
@@ -7919,8 +8129,8 @@
         </p:nvSpPr>
         <p:spPr>
           <a:xfrm>
-            <a:off x="913775" y="1395710"/>
-            <a:ext cx="9955116" cy="4985980"/>
+            <a:off x="228600" y="925830"/>
+            <a:ext cx="11395709" cy="5078313"/>
           </a:xfrm>
           <a:prstGeom prst="rect">
             <a:avLst/>
@@ -7931,6 +8141,43 @@
             <a:spAutoFit/>
           </a:bodyPr>
           <a:lstStyle/>
+          <a:p>
+            <a:pPr marL="285750" indent="-285750">
+              <a:buFont typeface="Arial" panose="020B0604020202020204" pitchFamily="34" charset="0"/>
+              <a:buChar char="•"/>
+            </a:pPr>
+            <a:endParaRPr lang="es-ES" sz="1600" dirty="0" smtClean="0"/>
+          </a:p>
+          <a:p>
+            <a:pPr marL="285750" indent="-285750">
+              <a:buFont typeface="Arial" panose="020B0604020202020204" pitchFamily="34" charset="0"/>
+              <a:buChar char="•"/>
+            </a:pPr>
+            <a:r>
+              <a:rPr lang="es-ES" dirty="0" err="1" smtClean="0"/>
+              <a:t>NancyFx</a:t>
+            </a:r>
+            <a:r>
+              <a:rPr lang="es-ES" dirty="0"/>
+              <a:t>: </a:t>
+            </a:r>
+            <a:r>
+              <a:rPr lang="es-ES" dirty="0">
+                <a:hlinkClick r:id="rId2"/>
+              </a:rPr>
+              <a:t>http://nancyfx.org</a:t>
+            </a:r>
+            <a:r>
+              <a:rPr lang="es-ES" dirty="0" smtClean="0">
+                <a:hlinkClick r:id="rId2"/>
+              </a:rPr>
+              <a:t>/</a:t>
+            </a:r>
+            <a:r>
+              <a:rPr lang="es-ES" dirty="0" smtClean="0"/>
+              <a:t> </a:t>
+            </a:r>
+          </a:p>
           <a:p>
             <a:pPr marL="285750" indent="-285750">
               <a:buFont typeface="Arial" panose="020B0604020202020204" pitchFamily="34" charset="0"/>
@@ -7939,58 +8186,206 @@
             <a:endParaRPr lang="es-ES" dirty="0" smtClean="0"/>
           </a:p>
           <a:p>
+            <a:pPr marL="742950" lvl="1" indent="-285750">
+              <a:buFont typeface="Arial" panose="020B0604020202020204" pitchFamily="34" charset="0"/>
+              <a:buChar char="•"/>
+            </a:pPr>
+            <a:r>
+              <a:rPr lang="es-ES" dirty="0" smtClean="0"/>
+              <a:t>V2 (</a:t>
+            </a:r>
+            <a:r>
+              <a:rPr lang="es-ES" dirty="0" err="1" smtClean="0"/>
+              <a:t>core</a:t>
+            </a:r>
+            <a:r>
+              <a:rPr lang="es-ES" dirty="0" smtClean="0"/>
+              <a:t> </a:t>
+            </a:r>
+            <a:r>
+              <a:rPr lang="es-ES" dirty="0" err="1" smtClean="0"/>
+              <a:t>support</a:t>
+            </a:r>
+            <a:r>
+              <a:rPr lang="es-ES" dirty="0" smtClean="0"/>
+              <a:t>) </a:t>
+            </a:r>
+            <a:r>
+              <a:rPr lang="es-ES" dirty="0" err="1" smtClean="0"/>
+              <a:t>changes</a:t>
+            </a:r>
+            <a:r>
+              <a:rPr lang="es-ES" dirty="0" smtClean="0"/>
+              <a:t> and </a:t>
+            </a:r>
+            <a:r>
+              <a:rPr lang="es-ES" dirty="0" err="1" smtClean="0"/>
+              <a:t>documentation</a:t>
+            </a:r>
+            <a:r>
+              <a:rPr lang="es-ES" dirty="0" smtClean="0"/>
+              <a:t>: </a:t>
+            </a:r>
+            <a:r>
+              <a:rPr lang="en-GB" sz="1600" dirty="0" smtClean="0">
+                <a:hlinkClick r:id="rId3"/>
+              </a:rPr>
+              <a:t>https</a:t>
+            </a:r>
+            <a:r>
+              <a:rPr lang="en-GB" sz="1600" dirty="0">
+                <a:hlinkClick r:id="rId3"/>
+              </a:rPr>
+              <a:t>://</a:t>
+            </a:r>
+            <a:r>
+              <a:rPr lang="en-GB" sz="1600" dirty="0" smtClean="0">
+                <a:hlinkClick r:id="rId3"/>
+              </a:rPr>
+              <a:t>github.com/NancyFx/Nancy/issues/2396</a:t>
+            </a:r>
+            <a:r>
+              <a:rPr lang="en-GB" sz="1600" dirty="0" smtClean="0"/>
+              <a:t> </a:t>
+            </a:r>
+            <a:endParaRPr lang="es-ES" sz="1600" dirty="0"/>
+          </a:p>
+          <a:p>
             <a:pPr marL="285750" indent="-285750">
               <a:buFont typeface="Arial" panose="020B0604020202020204" pitchFamily="34" charset="0"/>
               <a:buChar char="•"/>
             </a:pPr>
-            <a:r>
-              <a:rPr lang="es-ES" sz="2000" dirty="0" err="1" smtClean="0"/>
-              <a:t>NancyFx</a:t>
-            </a:r>
-            <a:r>
-              <a:rPr lang="es-ES" sz="2000" dirty="0"/>
-              <a:t>: </a:t>
-            </a:r>
-            <a:r>
-              <a:rPr lang="es-ES" sz="2000" dirty="0">
-                <a:hlinkClick r:id="rId2"/>
-              </a:rPr>
-              <a:t>http://nancyfx.org</a:t>
-            </a:r>
-            <a:r>
-              <a:rPr lang="es-ES" sz="2000" dirty="0" smtClean="0">
-                <a:hlinkClick r:id="rId2"/>
-              </a:rPr>
-              <a:t>/</a:t>
-            </a:r>
-            <a:r>
-              <a:rPr lang="es-ES" sz="2000" dirty="0" smtClean="0"/>
-              <a:t> </a:t>
-            </a:r>
+            <a:endParaRPr lang="es-ES" dirty="0" smtClean="0"/>
           </a:p>
           <a:p>
             <a:pPr marL="285750" indent="-285750">
               <a:buFont typeface="Arial" panose="020B0604020202020204" pitchFamily="34" charset="0"/>
               <a:buChar char="•"/>
             </a:pPr>
-            <a:endParaRPr lang="es-ES" sz="2000" dirty="0" smtClean="0"/>
+            <a:r>
+              <a:rPr lang="es-ES" dirty="0" err="1" smtClean="0"/>
+              <a:t>Books</a:t>
+            </a:r>
+            <a:r>
+              <a:rPr lang="es-ES" dirty="0" smtClean="0"/>
+              <a:t>:</a:t>
+            </a:r>
+          </a:p>
+          <a:p>
+            <a:endParaRPr lang="es-ES" dirty="0" smtClean="0"/>
+          </a:p>
+          <a:p>
+            <a:pPr marL="742950" lvl="1" indent="-285750">
+              <a:buFont typeface="Arial" panose="020B0604020202020204" pitchFamily="34" charset="0"/>
+              <a:buChar char="•"/>
+            </a:pPr>
+            <a:r>
+              <a:rPr lang="es-ES" dirty="0" err="1" smtClean="0"/>
+              <a:t>NancyFx</a:t>
+            </a:r>
+            <a:r>
+              <a:rPr lang="es-ES" dirty="0"/>
+              <a:t> </a:t>
+            </a:r>
+            <a:r>
+              <a:rPr lang="es-ES" dirty="0" err="1" smtClean="0"/>
+              <a:t>Succinctly</a:t>
+            </a:r>
+            <a:r>
+              <a:rPr lang="es-ES" dirty="0"/>
+              <a:t>: </a:t>
+            </a:r>
+            <a:r>
+              <a:rPr lang="es-ES" sz="1600" dirty="0">
+                <a:hlinkClick r:id="rId4"/>
+              </a:rPr>
+              <a:t>https://</a:t>
+            </a:r>
+            <a:r>
+              <a:rPr lang="es-ES" sz="1600" dirty="0" smtClean="0">
+                <a:hlinkClick r:id="rId4"/>
+              </a:rPr>
+              <a:t>www.syncfusion.com/resources/techportal/details/ebooks/nancyfx</a:t>
+            </a:r>
+            <a:r>
+              <a:rPr lang="es-ES" sz="1600" dirty="0" smtClean="0"/>
+              <a:t> </a:t>
+            </a:r>
+          </a:p>
+          <a:p>
+            <a:pPr marL="742950" lvl="1" indent="-285750">
+              <a:buFont typeface="Arial" panose="020B0604020202020204" pitchFamily="34" charset="0"/>
+              <a:buChar char="•"/>
+            </a:pPr>
+            <a:r>
+              <a:rPr lang="es-ES" dirty="0" err="1" smtClean="0"/>
+              <a:t>Microservices</a:t>
+            </a:r>
+            <a:r>
+              <a:rPr lang="es-ES" dirty="0" smtClean="0"/>
+              <a:t> in </a:t>
+            </a:r>
+            <a:r>
+              <a:rPr lang="es-ES" dirty="0" err="1" smtClean="0"/>
+              <a:t>.Net</a:t>
+            </a:r>
+            <a:r>
+              <a:rPr lang="es-ES" dirty="0"/>
+              <a:t> Core</a:t>
+            </a:r>
+            <a:r>
+              <a:rPr lang="es-ES" sz="1600" dirty="0"/>
+              <a:t>: </a:t>
+            </a:r>
+            <a:r>
+              <a:rPr lang="es-ES" sz="1600" dirty="0">
+                <a:hlinkClick r:id="rId5"/>
+              </a:rPr>
+              <a:t>https://</a:t>
+            </a:r>
+            <a:r>
+              <a:rPr lang="es-ES" sz="1600" dirty="0" smtClean="0">
+                <a:hlinkClick r:id="rId5"/>
+              </a:rPr>
+              <a:t>www.manning.com/books/microservices-in-net-core</a:t>
+            </a:r>
+            <a:r>
+              <a:rPr lang="es-ES" sz="1600" dirty="0" smtClean="0"/>
+              <a:t> </a:t>
+            </a:r>
+            <a:endParaRPr lang="es-ES" dirty="0" smtClean="0"/>
           </a:p>
           <a:p>
             <a:pPr marL="285750" indent="-285750">
               <a:buFont typeface="Arial" panose="020B0604020202020204" pitchFamily="34" charset="0"/>
               <a:buChar char="•"/>
             </a:pPr>
-            <a:r>
-              <a:rPr lang="es-ES" sz="2000" dirty="0" err="1" smtClean="0"/>
-              <a:t>Books</a:t>
-            </a:r>
-            <a:r>
-              <a:rPr lang="es-ES" sz="2000" dirty="0" smtClean="0"/>
+            <a:endParaRPr lang="es-ES" dirty="0"/>
+          </a:p>
+          <a:p>
+            <a:pPr marL="285750" indent="-285750">
+              <a:buFont typeface="Arial" panose="020B0604020202020204" pitchFamily="34" charset="0"/>
+              <a:buChar char="•"/>
+            </a:pPr>
+            <a:r>
+              <a:rPr lang="es-ES" dirty="0" smtClean="0"/>
+              <a:t>Online </a:t>
+            </a:r>
+            <a:r>
+              <a:rPr lang="es-ES" dirty="0" err="1" smtClean="0"/>
+              <a:t>courses</a:t>
+            </a:r>
+            <a:r>
+              <a:rPr lang="es-ES" dirty="0" smtClean="0"/>
               <a:t>:</a:t>
             </a:r>
           </a:p>
           <a:p>
-            <a:endParaRPr lang="es-ES" sz="2000" dirty="0" smtClean="0"/>
+            <a:pPr marL="285750" indent="-285750">
+              <a:buFont typeface="Arial" panose="020B0604020202020204" pitchFamily="34" charset="0"/>
+              <a:buChar char="•"/>
+            </a:pPr>
+            <a:endParaRPr lang="es-ES" dirty="0" smtClean="0"/>
           </a:p>
           <a:p>
             <a:pPr marL="742950" lvl="1" indent="-285750">
@@ -7998,37 +8393,52 @@
               <a:buChar char="•"/>
             </a:pPr>
             <a:r>
-              <a:rPr lang="es-ES" sz="2000" dirty="0" err="1" smtClean="0"/>
-              <a:t>NancyFx</a:t>
-            </a:r>
-            <a:r>
-              <a:rPr lang="es-ES" sz="2000" dirty="0"/>
-              <a:t> </a:t>
-            </a:r>
-            <a:r>
-              <a:rPr lang="es-ES" sz="2000" dirty="0" err="1" smtClean="0"/>
-              <a:t>Succinctly</a:t>
-            </a:r>
-            <a:r>
-              <a:rPr lang="es-ES" sz="2000" dirty="0"/>
+              <a:rPr lang="es-ES" dirty="0" err="1" smtClean="0"/>
+              <a:t>Pluralsight</a:t>
+            </a:r>
+            <a:r>
+              <a:rPr lang="es-ES" dirty="0" smtClean="0"/>
               <a:t>: </a:t>
             </a:r>
             <a:r>
-              <a:rPr lang="es-ES" sz="2000" dirty="0">
-                <a:hlinkClick r:id="rId3"/>
+              <a:rPr lang="es-ES" dirty="0" err="1" smtClean="0"/>
+              <a:t>Introduction</a:t>
+            </a:r>
+            <a:r>
+              <a:rPr lang="es-ES" dirty="0" smtClean="0"/>
+              <a:t> to </a:t>
+            </a:r>
+            <a:r>
+              <a:rPr lang="es-ES" dirty="0" smtClean="0"/>
+              <a:t>Nancy (</a:t>
+            </a:r>
+            <a:r>
+              <a:rPr lang="es-ES" sz="1600" dirty="0" smtClean="0">
+                <a:hlinkClick r:id="rId6"/>
               </a:rPr>
-              <a:t>https://</a:t>
-            </a:r>
-            <a:r>
-              <a:rPr lang="es-ES" sz="2000" dirty="0" smtClean="0">
-                <a:hlinkClick r:id="rId3"/>
+              <a:t>https</a:t>
+            </a:r>
+            <a:r>
+              <a:rPr lang="es-ES" sz="1600" dirty="0">
+                <a:hlinkClick r:id="rId6"/>
               </a:rPr>
-              <a:t>www.syncfusion.com/resources/techportal/details/ebooks/nancyfx</a:t>
-            </a:r>
-            <a:r>
-              <a:rPr lang="es-ES" sz="2000" dirty="0" smtClean="0"/>
-              <a:t> </a:t>
-            </a:r>
+              <a:t>://</a:t>
+            </a:r>
+            <a:r>
+              <a:rPr lang="es-ES" sz="1600" dirty="0" smtClean="0">
+                <a:hlinkClick r:id="rId6"/>
+              </a:rPr>
+              <a:t>www.pluralsight.com/courses/Nancy</a:t>
+            </a:r>
+            <a:r>
+              <a:rPr lang="es-ES" dirty="0" smtClean="0"/>
+              <a:t>)</a:t>
+            </a:r>
+            <a:endParaRPr lang="es-ES" dirty="0"/>
+          </a:p>
+          <a:p>
+            <a:pPr lvl="1"/>
+            <a:endParaRPr lang="es-ES" dirty="0" smtClean="0"/>
           </a:p>
           <a:p>
             <a:pPr marL="742950" lvl="1" indent="-285750">
@@ -8036,158 +8446,73 @@
               <a:buChar char="•"/>
             </a:pPr>
             <a:r>
-              <a:rPr lang="es-ES" sz="2000" dirty="0" err="1" smtClean="0"/>
-              <a:t>Microservices</a:t>
-            </a:r>
-            <a:r>
-              <a:rPr lang="es-ES" sz="2000" dirty="0" smtClean="0"/>
-              <a:t> in </a:t>
-            </a:r>
-            <a:r>
-              <a:rPr lang="es-ES" sz="2000" dirty="0" err="1" smtClean="0"/>
-              <a:t>.Net</a:t>
-            </a:r>
-            <a:r>
-              <a:rPr lang="es-ES" sz="2000" dirty="0"/>
-              <a:t> Core: </a:t>
-            </a:r>
-            <a:r>
-              <a:rPr lang="es-ES" sz="2000" dirty="0">
-                <a:hlinkClick r:id="rId4"/>
+              <a:rPr lang="es-ES" dirty="0" err="1" smtClean="0"/>
+              <a:t>Pluralsight</a:t>
+            </a:r>
+            <a:r>
+              <a:rPr lang="es-ES" dirty="0" smtClean="0"/>
+              <a:t>: </a:t>
+            </a:r>
+            <a:r>
+              <a:rPr lang="en-US" dirty="0"/>
+              <a:t>Building Web Applications With </a:t>
+            </a:r>
+            <a:r>
+              <a:rPr lang="en-US" dirty="0" err="1" smtClean="0"/>
+              <a:t>NancyFX</a:t>
+            </a:r>
+            <a:r>
+              <a:rPr lang="en-US" dirty="0" smtClean="0"/>
+              <a:t> </a:t>
+            </a:r>
+            <a:r>
+              <a:rPr lang="en-US" sz="1600" dirty="0" smtClean="0"/>
+              <a:t>(</a:t>
+            </a:r>
+            <a:r>
+              <a:rPr lang="es-ES" sz="1400" dirty="0" smtClean="0">
+                <a:hlinkClick r:id="rId7"/>
               </a:rPr>
-              <a:t>https://</a:t>
-            </a:r>
-            <a:r>
-              <a:rPr lang="es-ES" sz="2000" dirty="0" smtClean="0">
-                <a:hlinkClick r:id="rId4"/>
+              <a:t>https</a:t>
+            </a:r>
+            <a:r>
+              <a:rPr lang="es-ES" sz="1400" dirty="0">
+                <a:hlinkClick r:id="rId7"/>
               </a:rPr>
-              <a:t>www.manning.com/books/microservices-in-net-core</a:t>
-            </a:r>
-            <a:r>
-              <a:rPr lang="es-ES" sz="2000" dirty="0" smtClean="0"/>
-              <a:t> </a:t>
-            </a:r>
-          </a:p>
-          <a:p>
-            <a:pPr marL="285750" indent="-285750">
-              <a:buFont typeface="Arial" panose="020B0604020202020204" pitchFamily="34" charset="0"/>
-              <a:buChar char="•"/>
-            </a:pPr>
-            <a:endParaRPr lang="es-ES" sz="2000" dirty="0"/>
-          </a:p>
-          <a:p>
-            <a:pPr marL="285750" indent="-285750">
-              <a:buFont typeface="Arial" panose="020B0604020202020204" pitchFamily="34" charset="0"/>
-              <a:buChar char="•"/>
-            </a:pPr>
-            <a:r>
-              <a:rPr lang="es-ES" sz="2000" dirty="0" smtClean="0"/>
-              <a:t>Online </a:t>
-            </a:r>
-            <a:r>
-              <a:rPr lang="es-ES" sz="2000" dirty="0" err="1" smtClean="0"/>
-              <a:t>courses</a:t>
-            </a:r>
-            <a:r>
-              <a:rPr lang="es-ES" sz="2000" dirty="0" smtClean="0"/>
-              <a:t>:</a:t>
-            </a:r>
-          </a:p>
-          <a:p>
-            <a:pPr marL="285750" indent="-285750">
-              <a:buFont typeface="Arial" panose="020B0604020202020204" pitchFamily="34" charset="0"/>
-              <a:buChar char="•"/>
-            </a:pPr>
-            <a:endParaRPr lang="es-ES" sz="2000" dirty="0" smtClean="0"/>
+              <a:t>://</a:t>
+            </a:r>
+            <a:r>
+              <a:rPr lang="es-ES" sz="1400" dirty="0" smtClean="0">
+                <a:hlinkClick r:id="rId7"/>
+              </a:rPr>
+              <a:t>www.pluralsight.com/courses/building-web-apps-nancyfx</a:t>
+            </a:r>
+            <a:r>
+              <a:rPr lang="es-ES" sz="1400" dirty="0" smtClean="0"/>
+              <a:t>)</a:t>
+            </a:r>
+            <a:endParaRPr lang="en-GB" sz="1400" dirty="0"/>
           </a:p>
           <a:p>
             <a:pPr marL="742950" lvl="1" indent="-285750">
               <a:buFont typeface="Arial" panose="020B0604020202020204" pitchFamily="34" charset="0"/>
               <a:buChar char="•"/>
             </a:pPr>
-            <a:r>
-              <a:rPr lang="es-ES" sz="2000" dirty="0" err="1" smtClean="0"/>
-              <a:t>Pluralsight</a:t>
-            </a:r>
-            <a:r>
-              <a:rPr lang="es-ES" sz="2000" dirty="0" smtClean="0"/>
-              <a:t>: </a:t>
-            </a:r>
-            <a:r>
-              <a:rPr lang="es-ES" sz="2000" dirty="0" err="1" smtClean="0"/>
-              <a:t>Introduction</a:t>
-            </a:r>
-            <a:r>
-              <a:rPr lang="es-ES" sz="2000" dirty="0" smtClean="0"/>
-              <a:t> to Nancy: </a:t>
-            </a:r>
-            <a:r>
-              <a:rPr lang="es-ES" sz="2000" dirty="0" smtClean="0">
-                <a:hlinkClick r:id="rId5"/>
-              </a:rPr>
-              <a:t>https</a:t>
-            </a:r>
-            <a:r>
-              <a:rPr lang="es-ES" sz="2000" dirty="0">
-                <a:hlinkClick r:id="rId5"/>
-              </a:rPr>
-              <a:t>://www.pluralsight.com/courses/nancy</a:t>
-            </a:r>
-            <a:endParaRPr lang="es-ES" sz="2000" dirty="0"/>
-          </a:p>
-          <a:p>
-            <a:pPr lvl="1"/>
-            <a:endParaRPr lang="es-ES" sz="2000" dirty="0" smtClean="0"/>
+            <a:endParaRPr lang="es-ES_tradnl" sz="1400" dirty="0"/>
           </a:p>
           <a:p>
             <a:pPr marL="742950" lvl="1" indent="-285750">
               <a:buFont typeface="Arial" panose="020B0604020202020204" pitchFamily="34" charset="0"/>
               <a:buChar char="•"/>
             </a:pPr>
-            <a:r>
-              <a:rPr lang="es-ES" sz="2000" dirty="0" err="1" smtClean="0"/>
-              <a:t>Pluralsight</a:t>
-            </a:r>
-            <a:r>
-              <a:rPr lang="es-ES" sz="2000" dirty="0" smtClean="0"/>
-              <a:t>: </a:t>
-            </a:r>
-            <a:r>
-              <a:rPr lang="en-US" sz="2000" dirty="0"/>
-              <a:t>Building Web Applications With </a:t>
-            </a:r>
-            <a:r>
-              <a:rPr lang="en-US" sz="2000" dirty="0" err="1" smtClean="0"/>
-              <a:t>NancyFX</a:t>
-            </a:r>
-            <a:endParaRPr lang="en-US" sz="2000" dirty="0" smtClean="0"/>
+            <a:endParaRPr lang="es-ES_tradnl" sz="1400" dirty="0"/>
           </a:p>
           <a:p>
             <a:pPr marL="742950" lvl="1" indent="-285750">
               <a:buFont typeface="Arial" panose="020B0604020202020204" pitchFamily="34" charset="0"/>
               <a:buChar char="•"/>
             </a:pPr>
-            <a:endParaRPr lang="es-ES" sz="2000" dirty="0"/>
-          </a:p>
-          <a:p>
-            <a:pPr lvl="2"/>
-            <a:r>
-              <a:rPr lang="es-ES" sz="2000" dirty="0">
-                <a:hlinkClick r:id="rId6"/>
-              </a:rPr>
-              <a:t>https://</a:t>
-            </a:r>
-            <a:r>
-              <a:rPr lang="es-ES" sz="2000" dirty="0" smtClean="0">
-                <a:hlinkClick r:id="rId6"/>
-              </a:rPr>
-              <a:t>www.pluralsight.com/courses/building-web-apps-nancyfx</a:t>
-            </a:r>
-            <a:r>
-              <a:rPr lang="es-ES" sz="2000" dirty="0" smtClean="0"/>
-              <a:t> </a:t>
-            </a:r>
-            <a:endParaRPr lang="en-GB" sz="2000" dirty="0"/>
+            <a:endParaRPr lang="es-ES" sz="1400" dirty="0" smtClean="0"/>
           </a:p>
         </p:txBody>
       </p:sp>
@@ -8195,6 +8520,159 @@
     <p:extLst>
       <p:ext uri="{BB962C8B-B14F-4D97-AF65-F5344CB8AC3E}">
         <p14:creationId xmlns:p14="http://schemas.microsoft.com/office/powerpoint/2010/main" val="3538907069"/>
+      </p:ext>
+    </p:extLst>
+  </p:cSld>
+  <p:clrMapOvr>
+    <a:masterClrMapping/>
+  </p:clrMapOvr>
+  <p:timing>
+    <p:tnLst>
+      <p:par>
+        <p:cTn id="1" dur="indefinite" restart="never" nodeType="tmRoot"/>
+      </p:par>
+    </p:tnLst>
+  </p:timing>
+</p:sld>
+</file>
+
+<file path=ppt/slides/slide16.xml><?xml version="1.0" encoding="utf-8"?>
+<p:sld xmlns:a="http://schemas.openxmlformats.org/drawingml/2006/main" xmlns:r="http://schemas.openxmlformats.org/officeDocument/2006/relationships" xmlns:p="http://schemas.openxmlformats.org/presentationml/2006/main">
+  <p:cSld>
+    <p:spTree>
+      <p:nvGrpSpPr>
+        <p:cNvPr id="1" name=""/>
+        <p:cNvGrpSpPr/>
+        <p:nvPr/>
+      </p:nvGrpSpPr>
+      <p:grpSpPr>
+        <a:xfrm>
+          <a:off x="0" y="0"/>
+          <a:ext cx="0" cy="0"/>
+          <a:chOff x="0" y="0"/>
+          <a:chExt cx="0" cy="0"/>
+        </a:xfrm>
+      </p:grpSpPr>
+      <p:pic>
+        <p:nvPicPr>
+          <p:cNvPr id="2" name="Picture 1"/>
+          <p:cNvPicPr>
+            <a:picLocks noChangeAspect="1"/>
+          </p:cNvPicPr>
+          <p:nvPr/>
+        </p:nvPicPr>
+        <p:blipFill>
+          <a:blip r:embed="rId2">
+            <a:extLst>
+              <a:ext uri="{28A0092B-C50C-407E-A947-70E740481C1C}">
+                <a14:useLocalDpi xmlns:a14="http://schemas.microsoft.com/office/drawing/2010/main" val="0"/>
+              </a:ext>
+            </a:extLst>
+          </a:blip>
+          <a:stretch>
+            <a:fillRect/>
+          </a:stretch>
+        </p:blipFill>
+        <p:spPr>
+          <a:xfrm>
+            <a:off x="858982" y="1063770"/>
+            <a:ext cx="10165773" cy="4244210"/>
+          </a:xfrm>
+          <a:prstGeom prst="rect">
+            <a:avLst/>
+          </a:prstGeom>
+        </p:spPr>
+      </p:pic>
+      <p:sp>
+        <p:nvSpPr>
+          <p:cNvPr id="3" name="Rectangle 2"/>
+          <p:cNvSpPr/>
+          <p:nvPr/>
+        </p:nvSpPr>
+        <p:spPr>
+          <a:xfrm>
+            <a:off x="583192" y="5519943"/>
+            <a:ext cx="11222944" cy="1200329"/>
+          </a:xfrm>
+          <a:prstGeom prst="rect">
+            <a:avLst/>
+          </a:prstGeom>
+        </p:spPr>
+        <p:txBody>
+          <a:bodyPr wrap="none">
+            <a:spAutoFit/>
+          </a:bodyPr>
+          <a:lstStyle/>
+          <a:p>
+            <a:r>
+              <a:rPr lang="es-ES" b="1" dirty="0"/>
+              <a:t>"Yo... he visto cosas que vosotros no creeríais: Atacar naves en </a:t>
+            </a:r>
+            <a:r>
+              <a:rPr lang="es-ES" b="1" dirty="0" smtClean="0"/>
+              <a:t>llamas </a:t>
+            </a:r>
+            <a:r>
+              <a:rPr lang="es-ES" b="1" dirty="0"/>
+              <a:t>más allá de Orión. </a:t>
+            </a:r>
+            <a:endParaRPr lang="es-ES" b="1" dirty="0" smtClean="0"/>
+          </a:p>
+          <a:p>
+            <a:r>
+              <a:rPr lang="es-ES" b="1" dirty="0" smtClean="0"/>
+              <a:t>He </a:t>
+            </a:r>
+            <a:r>
+              <a:rPr lang="es-ES" b="1" dirty="0"/>
+              <a:t>visto rayos C brillar en la oscuridad cerca de la Puerta de </a:t>
+            </a:r>
+            <a:r>
+              <a:rPr lang="es-ES" b="1" dirty="0" err="1"/>
+              <a:t>Tannhäuser</a:t>
+            </a:r>
+            <a:r>
+              <a:rPr lang="es-ES" b="1" dirty="0"/>
+              <a:t>. </a:t>
+            </a:r>
+            <a:endParaRPr lang="es-ES" b="1" dirty="0" smtClean="0"/>
+          </a:p>
+          <a:p>
+            <a:r>
+              <a:rPr lang="es-ES" b="1" dirty="0" smtClean="0"/>
+              <a:t>Todos </a:t>
+            </a:r>
+            <a:r>
+              <a:rPr lang="es-ES" b="1" dirty="0"/>
+              <a:t>esos momentos se perderán... en el tiempo... como lágrimas en la lluvia. Es hora de morir"</a:t>
+            </a:r>
+            <a:r>
+              <a:rPr lang="es-ES" dirty="0"/>
+              <a:t> </a:t>
+            </a:r>
+            <a:endParaRPr lang="es-ES" dirty="0" smtClean="0"/>
+          </a:p>
+          <a:p>
+            <a:r>
+              <a:rPr lang="es-ES" dirty="0" smtClean="0"/>
+              <a:t>- </a:t>
+            </a:r>
+            <a:r>
+              <a:rPr lang="es-ES" dirty="0"/>
+              <a:t>Roy </a:t>
+            </a:r>
+            <a:r>
+              <a:rPr lang="es-ES" dirty="0" err="1"/>
+              <a:t>Batty</a:t>
+            </a:r>
+            <a:endParaRPr lang="en-GB" dirty="0"/>
+          </a:p>
+        </p:txBody>
+      </p:sp>
+    </p:spTree>
+    <p:extLst>
+      <p:ext uri="{BB962C8B-B14F-4D97-AF65-F5344CB8AC3E}">
+        <p14:creationId xmlns:p14="http://schemas.microsoft.com/office/powerpoint/2010/main" val="2448366926"/>
       </p:ext>
     </p:extLst>
   </p:cSld>
@@ -9151,7 +9629,7 @@
         </p:spPr>
         <p:txBody>
           <a:bodyPr>
-            <a:normAutofit lnSpcReduction="10000"/>
+            <a:normAutofit fontScale="92500"/>
           </a:bodyPr>
           <a:lstStyle/>
           <a:p>
@@ -9521,11 +9999,7 @@
             </a:pPr>
             <a:r>
               <a:rPr lang="es-ES" sz="2000" dirty="0" smtClean="0"/>
-              <a:t>Modules</a:t>
-            </a:r>
-            <a:r>
-              <a:rPr lang="es-ES" sz="2000" dirty="0" smtClean="0"/>
-              <a:t>, </a:t>
+              <a:t>Modules, </a:t>
             </a:r>
             <a:r>
               <a:rPr lang="es-ES" sz="2000" dirty="0" err="1" smtClean="0"/>
@@ -9533,11 +10007,7 @@
             </a:r>
             <a:r>
               <a:rPr lang="es-ES" sz="2000" dirty="0" smtClean="0"/>
-              <a:t> </a:t>
-            </a:r>
-            <a:r>
-              <a:rPr lang="es-ES" sz="2000" dirty="0" smtClean="0"/>
-              <a:t>and http </a:t>
+              <a:t> and http </a:t>
             </a:r>
             <a:r>
               <a:rPr lang="es-ES" sz="2000" dirty="0" err="1" smtClean="0"/>
@@ -9647,7 +10117,6 @@
               <a:rPr lang="es-ES" sz="2000" dirty="0" smtClean="0"/>
               <a:t> IOC)</a:t>
             </a:r>
-            <a:endParaRPr lang="es-ES" sz="2000" dirty="0" smtClean="0"/>
           </a:p>
           <a:p>
             <a:pPr marL="342900" indent="-342900" algn="l">

</xml_diff>